<commit_message>
changed theme of Endpoints photo
</commit_message>
<xml_diff>
--- a/Finance Tracker Web Application.pptx
+++ b/Finance Tracker Web Application.pptx
@@ -114,6 +114,11 @@
       </a:defRPr>
     </a:lvl9pPr>
   </p:defaultTextStyle>
+  <p:extLst>
+    <p:ext uri="{EFAFB233-063F-42B5-8137-9DF3F51BA10A}">
+      <p15:sldGuideLst xmlns:p15="http://schemas.microsoft.com/office/powerpoint/2012/main"/>
+    </p:ext>
+  </p:extLst>
 </p:presentation>
 </file>
 
@@ -9381,10 +9386,10 @@
       </p:sp>
       <p:pic>
         <p:nvPicPr>
-          <p:cNvPr id="3" name="Картина 2">
+          <p:cNvPr id="5" name="Картина 4">
             <a:extLst>
               <a:ext uri="{FF2B5EF4-FFF2-40B4-BE49-F238E27FC236}">
-                <a16:creationId xmlns:a16="http://schemas.microsoft.com/office/drawing/2014/main" id="{7864E3F7-9013-4830-8C0F-7BB5BBE57320}"/>
+                <a16:creationId xmlns:a16="http://schemas.microsoft.com/office/drawing/2014/main" id="{23F319D3-2915-4E2C-AD68-B185FC1F668C}"/>
               </a:ext>
             </a:extLst>
           </p:cNvPr>
@@ -9407,8 +9412,8 @@
         </p:blipFill>
         <p:spPr>
           <a:xfrm>
-            <a:off x="1007341" y="187248"/>
-            <a:ext cx="11102420" cy="6483504"/>
+            <a:off x="998930" y="214956"/>
+            <a:ext cx="11047175" cy="6483504"/>
           </a:xfrm>
           <a:prstGeom prst="rect">
             <a:avLst/>

</xml_diff>

<commit_message>
Removed unnecessary @Modyfing annotations; some update to powerpoint
</commit_message>
<xml_diff>
--- a/Finance Tracker Web Application.pptx
+++ b/Finance Tracker Web Application.pptx
@@ -896,8 +896,16 @@
         <a:lstStyle/>
         <a:p>
           <a:r>
+            <a:rPr lang="en-US" sz="2800" dirty="0" err="1"/>
+            <a:t>Dimitar</a:t>
+          </a:r>
+          <a:r>
             <a:rPr lang="en-US" sz="2800" dirty="0"/>
-            <a:t>Medical student</a:t>
+            <a:t> </a:t>
+          </a:r>
+          <a:r>
+            <a:rPr lang="en-US" sz="2800" dirty="0" err="1"/>
+            <a:t>Karazapryanov</a:t>
           </a:r>
           <a:endParaRPr lang="en-GB" sz="2800" dirty="0"/>
         </a:p>
@@ -973,7 +981,7 @@
       <dgm:spPr/>
     </dgm:pt>
     <dgm:pt modelId="{51A7C881-55EE-4A4F-9183-BE8E4C048076}" type="pres">
-      <dgm:prSet presAssocID="{84E56BA5-7B0A-478A-9DA3-0E812016857E}" presName="text_1" presStyleLbl="node1" presStyleIdx="0" presStyleCnt="0" custScaleX="238727" custLinFactY="69114" custLinFactNeighborX="-45601" custLinFactNeighborY="100000">
+      <dgm:prSet presAssocID="{84E56BA5-7B0A-478A-9DA3-0E812016857E}" presName="text_1" presStyleLbl="node1" presStyleIdx="0" presStyleCnt="0" custScaleX="312500" custLinFactY="69114" custLinFactNeighborX="-45601" custLinFactNeighborY="100000">
         <dgm:presLayoutVars>
           <dgm:bulletEnabled val="1"/>
         </dgm:presLayoutVars>
@@ -1069,7 +1077,7 @@
       <dsp:spPr>
         <a:xfrm>
           <a:off x="0" y="3107382"/>
-          <a:ext cx="3127529" cy="675513"/>
+          <a:ext cx="4094020" cy="675513"/>
         </a:xfrm>
         <a:prstGeom prst="rect">
           <a:avLst/>
@@ -1115,15 +1123,23 @@
             <a:buNone/>
           </a:pPr>
           <a:r>
+            <a:rPr lang="en-US" sz="2800" kern="1200" dirty="0" err="1"/>
+            <a:t>Dimitar</a:t>
+          </a:r>
+          <a:r>
             <a:rPr lang="en-US" sz="2800" kern="1200" dirty="0"/>
-            <a:t>Medical student</a:t>
+            <a:t> </a:t>
+          </a:r>
+          <a:r>
+            <a:rPr lang="en-US" sz="2800" kern="1200" dirty="0" err="1"/>
+            <a:t>Karazapryanov</a:t>
           </a:r>
           <a:endParaRPr lang="en-GB" sz="2800" kern="1200" dirty="0"/>
         </a:p>
       </dsp:txBody>
       <dsp:txXfrm>
         <a:off x="0" y="3107382"/>
-        <a:ext cx="3127529" cy="675513"/>
+        <a:ext cx="4094020" cy="675513"/>
       </dsp:txXfrm>
     </dsp:sp>
   </dsp:spTree>
@@ -8501,7 +8517,7 @@
           <p:nvPr>
             <p:extLst>
               <p:ext uri="{D42A27DB-BD31-4B8C-83A1-F6EECF244321}">
-                <p14:modId xmlns:p14="http://schemas.microsoft.com/office/powerpoint/2010/main" val="2671969345"/>
+                <p14:modId xmlns:p14="http://schemas.microsoft.com/office/powerpoint/2010/main" val="2226468548"/>
               </p:ext>
             </p:extLst>
           </p:nvPr>
@@ -8565,6 +8581,92 @@
           <a:p>
             <a:pPr algn="ctr"/>
             <a:endParaRPr lang="en-GB"/>
+          </a:p>
+        </p:txBody>
+      </p:sp>
+      <p:sp>
+        <p:nvSpPr>
+          <p:cNvPr id="3" name="Текстово поле 2">
+            <a:extLst>
+              <a:ext uri="{FF2B5EF4-FFF2-40B4-BE49-F238E27FC236}">
+                <a16:creationId xmlns:a16="http://schemas.microsoft.com/office/drawing/2014/main" id="{D2BDC8D8-C27C-49DE-B549-9740EA413A29}"/>
+              </a:ext>
+            </a:extLst>
+          </p:cNvPr>
+          <p:cNvSpPr txBox="1"/>
+          <p:nvPr/>
+        </p:nvSpPr>
+        <p:spPr>
+          <a:xfrm>
+            <a:off x="6720291" y="5601028"/>
+            <a:ext cx="3735272" cy="923330"/>
+          </a:xfrm>
+          <a:prstGeom prst="rect">
+            <a:avLst/>
+          </a:prstGeom>
+          <a:noFill/>
+        </p:spPr>
+        <p:txBody>
+          <a:bodyPr wrap="square" rtlCol="0">
+            <a:spAutoFit/>
+          </a:bodyPr>
+          <a:lstStyle/>
+          <a:p>
+            <a:r>
+              <a:rPr lang="en-US" dirty="0"/>
+              <a:t>Former barman.</a:t>
+            </a:r>
+          </a:p>
+          <a:p>
+            <a:r>
+              <a:rPr lang="en-US" dirty="0"/>
+              <a:t>Turns into a master debugger after a glass of wine.</a:t>
+            </a:r>
+            <a:endParaRPr lang="en-GB" dirty="0"/>
+          </a:p>
+        </p:txBody>
+      </p:sp>
+      <p:sp>
+        <p:nvSpPr>
+          <p:cNvPr id="7" name="Текстово поле 6">
+            <a:extLst>
+              <a:ext uri="{FF2B5EF4-FFF2-40B4-BE49-F238E27FC236}">
+                <a16:creationId xmlns:a16="http://schemas.microsoft.com/office/drawing/2014/main" id="{FBC3227B-6388-4462-9CD2-50229B8CB119}"/>
+              </a:ext>
+            </a:extLst>
+          </p:cNvPr>
+          <p:cNvSpPr txBox="1"/>
+          <p:nvPr/>
+        </p:nvSpPr>
+        <p:spPr>
+          <a:xfrm>
+            <a:off x="1926619" y="5688360"/>
+            <a:ext cx="3735272" cy="1200329"/>
+          </a:xfrm>
+          <a:prstGeom prst="rect">
+            <a:avLst/>
+          </a:prstGeom>
+          <a:noFill/>
+        </p:spPr>
+        <p:txBody>
+          <a:bodyPr wrap="square" rtlCol="0">
+            <a:spAutoFit/>
+          </a:bodyPr>
+          <a:lstStyle/>
+          <a:p>
+            <a:r>
+              <a:rPr lang="en-US" dirty="0"/>
+              <a:t>Medical student.</a:t>
+            </a:r>
+          </a:p>
+          <a:p>
+            <a:r>
+              <a:rPr lang="en-US" dirty="0"/>
+              <a:t>Found out he might have OCD, while working on the project.</a:t>
+            </a:r>
+          </a:p>
+          <a:p>
+            <a:endParaRPr lang="en-GB" dirty="0"/>
           </a:p>
         </p:txBody>
       </p:sp>
@@ -10300,7 +10402,7 @@
         </p:nvSpPr>
         <p:spPr>
           <a:xfrm>
-            <a:off x="492488" y="1463790"/>
+            <a:off x="435908" y="308619"/>
             <a:ext cx="2867765" cy="461665"/>
           </a:xfrm>
           <a:prstGeom prst="rect">
@@ -10351,7 +10453,7 @@
         </p:nvSpPr>
         <p:spPr>
           <a:xfrm>
-            <a:off x="8319289" y="1491696"/>
+            <a:off x="4427431" y="1621005"/>
             <a:ext cx="2577738" cy="461665"/>
           </a:xfrm>
           <a:prstGeom prst="rect">
@@ -10410,7 +10512,7 @@
         </p:blipFill>
         <p:spPr>
           <a:xfrm>
-            <a:off x="8006590" y="1936441"/>
+            <a:off x="4114732" y="2065750"/>
             <a:ext cx="3203137" cy="3852570"/>
           </a:xfrm>
           <a:prstGeom prst="rect">
@@ -10440,7 +10542,7 @@
         </p:blipFill>
         <p:spPr>
           <a:xfrm>
-            <a:off x="492488" y="1936441"/>
+            <a:off x="435908" y="781270"/>
             <a:ext cx="2867765" cy="3745215"/>
           </a:xfrm>
           <a:prstGeom prst="rect">
@@ -10462,7 +10564,7 @@
         </p:nvSpPr>
         <p:spPr>
           <a:xfrm>
-            <a:off x="4313895" y="2760120"/>
+            <a:off x="597222" y="4886224"/>
             <a:ext cx="2577738" cy="461665"/>
           </a:xfrm>
           <a:prstGeom prst="rect">
@@ -10521,7 +10623,7 @@
         </p:blipFill>
         <p:spPr>
           <a:xfrm>
-            <a:off x="4152581" y="3221785"/>
+            <a:off x="435908" y="5347889"/>
             <a:ext cx="2900367" cy="1174529"/>
           </a:xfrm>
           <a:prstGeom prst="rect">
@@ -10529,6 +10631,87 @@
           </a:prstGeom>
         </p:spPr>
       </p:pic>
+      <p:pic>
+        <p:nvPicPr>
+          <p:cNvPr id="3" name="Картина 2">
+            <a:extLst>
+              <a:ext uri="{FF2B5EF4-FFF2-40B4-BE49-F238E27FC236}">
+                <a16:creationId xmlns:a16="http://schemas.microsoft.com/office/drawing/2014/main" id="{4F28D5CB-361E-4E85-B16E-B298B55818AF}"/>
+              </a:ext>
+            </a:extLst>
+          </p:cNvPr>
+          <p:cNvPicPr>
+            <a:picLocks noChangeAspect="1"/>
+          </p:cNvPicPr>
+          <p:nvPr/>
+        </p:nvPicPr>
+        <p:blipFill>
+          <a:blip r:embed="rId5"/>
+          <a:stretch>
+            <a:fillRect/>
+          </a:stretch>
+        </p:blipFill>
+        <p:spPr>
+          <a:xfrm>
+            <a:off x="8394046" y="2041082"/>
+            <a:ext cx="2867765" cy="4025693"/>
+          </a:xfrm>
+          <a:prstGeom prst="rect">
+            <a:avLst/>
+          </a:prstGeom>
+        </p:spPr>
+      </p:pic>
+      <p:sp>
+        <p:nvSpPr>
+          <p:cNvPr id="11" name="Текстово поле 10">
+            <a:extLst>
+              <a:ext uri="{FF2B5EF4-FFF2-40B4-BE49-F238E27FC236}">
+                <a16:creationId xmlns:a16="http://schemas.microsoft.com/office/drawing/2014/main" id="{D8C919EF-5FF5-4153-9080-378F8035DDD5}"/>
+              </a:ext>
+            </a:extLst>
+          </p:cNvPr>
+          <p:cNvSpPr txBox="1"/>
+          <p:nvPr/>
+        </p:nvSpPr>
+        <p:spPr>
+          <a:xfrm>
+            <a:off x="8539059" y="1610620"/>
+            <a:ext cx="2577738" cy="461665"/>
+          </a:xfrm>
+          <a:prstGeom prst="rect">
+            <a:avLst/>
+          </a:prstGeom>
+          <a:noFill/>
+        </p:spPr>
+        <p:txBody>
+          <a:bodyPr wrap="square" rtlCol="0">
+            <a:spAutoFit/>
+          </a:bodyPr>
+          <a:lstStyle/>
+          <a:p>
+            <a:pPr algn="ctr"/>
+            <a:r>
+              <a:rPr lang="en-US" sz="2400" dirty="0">
+                <a:solidFill>
+                  <a:schemeClr val="accent1">
+                    <a:lumMod val="60000"/>
+                    <a:lumOff val="40000"/>
+                  </a:schemeClr>
+                </a:solidFill>
+              </a:rPr>
+              <a:t>HTMLs</a:t>
+            </a:r>
+            <a:endParaRPr lang="en-GB" sz="2400" dirty="0">
+              <a:solidFill>
+                <a:schemeClr val="accent1">
+                  <a:lumMod val="60000"/>
+                  <a:lumOff val="40000"/>
+                </a:schemeClr>
+              </a:solidFill>
+            </a:endParaRPr>
+          </a:p>
+        </p:txBody>
+      </p:sp>
     </p:spTree>
     <p:extLst>
       <p:ext uri="{BB962C8B-B14F-4D97-AF65-F5344CB8AC3E}">

</xml_diff>

<commit_message>
added check for account id in StatisticsService methods; made changes to register.html
</commit_message>
<xml_diff>
--- a/Finance Tracker Web Application.pptx
+++ b/Finance Tracker Web Application.pptx
@@ -881,6 +881,753 @@
 </dgm:colorsDef>
 </file>
 
+<file path=ppt/diagrams/colors2.xml><?xml version="1.0" encoding="utf-8"?>
+<dgm:colorsDef xmlns:dgm="http://schemas.openxmlformats.org/drawingml/2006/diagram" xmlns:a="http://schemas.openxmlformats.org/drawingml/2006/main" uniqueId="urn:microsoft.com/office/officeart/2005/8/colors/accent1_2">
+  <dgm:title val=""/>
+  <dgm:desc val=""/>
+  <dgm:catLst>
+    <dgm:cat type="accent1" pri="11200"/>
+  </dgm:catLst>
+  <dgm:styleLbl name="node0">
+    <dgm:fillClrLst meth="repeat">
+      <a:schemeClr val="accent1"/>
+    </dgm:fillClrLst>
+    <dgm:linClrLst meth="repeat">
+      <a:schemeClr val="lt1"/>
+    </dgm:linClrLst>
+    <dgm:effectClrLst/>
+    <dgm:txLinClrLst/>
+    <dgm:txFillClrLst/>
+    <dgm:txEffectClrLst/>
+  </dgm:styleLbl>
+  <dgm:styleLbl name="alignNode1">
+    <dgm:fillClrLst meth="repeat">
+      <a:schemeClr val="accent1"/>
+    </dgm:fillClrLst>
+    <dgm:linClrLst meth="repeat">
+      <a:schemeClr val="accent1"/>
+    </dgm:linClrLst>
+    <dgm:effectClrLst/>
+    <dgm:txLinClrLst/>
+    <dgm:txFillClrLst/>
+    <dgm:txEffectClrLst/>
+  </dgm:styleLbl>
+  <dgm:styleLbl name="node1">
+    <dgm:fillClrLst meth="repeat">
+      <a:schemeClr val="accent1"/>
+    </dgm:fillClrLst>
+    <dgm:linClrLst meth="repeat">
+      <a:schemeClr val="lt1"/>
+    </dgm:linClrLst>
+    <dgm:effectClrLst/>
+    <dgm:txLinClrLst/>
+    <dgm:txFillClrLst/>
+    <dgm:txEffectClrLst/>
+  </dgm:styleLbl>
+  <dgm:styleLbl name="lnNode1">
+    <dgm:fillClrLst meth="repeat">
+      <a:schemeClr val="accent1"/>
+    </dgm:fillClrLst>
+    <dgm:linClrLst meth="repeat">
+      <a:schemeClr val="lt1"/>
+    </dgm:linClrLst>
+    <dgm:effectClrLst/>
+    <dgm:txLinClrLst/>
+    <dgm:txFillClrLst/>
+    <dgm:txEffectClrLst/>
+  </dgm:styleLbl>
+  <dgm:styleLbl name="vennNode1">
+    <dgm:fillClrLst meth="repeat">
+      <a:schemeClr val="accent1">
+        <a:alpha val="50000"/>
+      </a:schemeClr>
+    </dgm:fillClrLst>
+    <dgm:linClrLst meth="repeat">
+      <a:schemeClr val="lt1"/>
+    </dgm:linClrLst>
+    <dgm:effectClrLst/>
+    <dgm:txLinClrLst/>
+    <dgm:txFillClrLst/>
+    <dgm:txEffectClrLst/>
+  </dgm:styleLbl>
+  <dgm:styleLbl name="node2">
+    <dgm:fillClrLst meth="repeat">
+      <a:schemeClr val="accent1"/>
+    </dgm:fillClrLst>
+    <dgm:linClrLst meth="repeat">
+      <a:schemeClr val="lt1"/>
+    </dgm:linClrLst>
+    <dgm:effectClrLst/>
+    <dgm:txLinClrLst/>
+    <dgm:txFillClrLst/>
+    <dgm:txEffectClrLst/>
+  </dgm:styleLbl>
+  <dgm:styleLbl name="node3">
+    <dgm:fillClrLst meth="repeat">
+      <a:schemeClr val="accent1"/>
+    </dgm:fillClrLst>
+    <dgm:linClrLst meth="repeat">
+      <a:schemeClr val="lt1"/>
+    </dgm:linClrLst>
+    <dgm:effectClrLst/>
+    <dgm:txLinClrLst/>
+    <dgm:txFillClrLst/>
+    <dgm:txEffectClrLst/>
+  </dgm:styleLbl>
+  <dgm:styleLbl name="node4">
+    <dgm:fillClrLst meth="repeat">
+      <a:schemeClr val="accent1"/>
+    </dgm:fillClrLst>
+    <dgm:linClrLst meth="repeat">
+      <a:schemeClr val="lt1"/>
+    </dgm:linClrLst>
+    <dgm:effectClrLst/>
+    <dgm:txLinClrLst/>
+    <dgm:txFillClrLst/>
+    <dgm:txEffectClrLst/>
+  </dgm:styleLbl>
+  <dgm:styleLbl name="fgImgPlace1">
+    <dgm:fillClrLst meth="repeat">
+      <a:schemeClr val="accent1">
+        <a:tint val="50000"/>
+      </a:schemeClr>
+    </dgm:fillClrLst>
+    <dgm:linClrLst meth="repeat">
+      <a:schemeClr val="lt1"/>
+    </dgm:linClrLst>
+    <dgm:effectClrLst/>
+    <dgm:txLinClrLst/>
+    <dgm:txFillClrLst meth="repeat">
+      <a:schemeClr val="lt1"/>
+    </dgm:txFillClrLst>
+    <dgm:txEffectClrLst/>
+  </dgm:styleLbl>
+  <dgm:styleLbl name="alignImgPlace1">
+    <dgm:fillClrLst meth="repeat">
+      <a:schemeClr val="accent1">
+        <a:tint val="50000"/>
+      </a:schemeClr>
+    </dgm:fillClrLst>
+    <dgm:linClrLst meth="repeat">
+      <a:schemeClr val="lt1"/>
+    </dgm:linClrLst>
+    <dgm:effectClrLst/>
+    <dgm:txLinClrLst/>
+    <dgm:txFillClrLst meth="repeat">
+      <a:schemeClr val="lt1"/>
+    </dgm:txFillClrLst>
+    <dgm:txEffectClrLst/>
+  </dgm:styleLbl>
+  <dgm:styleLbl name="bgImgPlace1">
+    <dgm:fillClrLst meth="repeat">
+      <a:schemeClr val="accent1">
+        <a:tint val="50000"/>
+      </a:schemeClr>
+    </dgm:fillClrLst>
+    <dgm:linClrLst meth="repeat">
+      <a:schemeClr val="lt1"/>
+    </dgm:linClrLst>
+    <dgm:effectClrLst/>
+    <dgm:txLinClrLst/>
+    <dgm:txFillClrLst meth="repeat">
+      <a:schemeClr val="lt1"/>
+    </dgm:txFillClrLst>
+    <dgm:txEffectClrLst/>
+  </dgm:styleLbl>
+  <dgm:styleLbl name="sibTrans2D1">
+    <dgm:fillClrLst meth="repeat">
+      <a:schemeClr val="accent1">
+        <a:tint val="60000"/>
+      </a:schemeClr>
+    </dgm:fillClrLst>
+    <dgm:linClrLst meth="repeat">
+      <a:schemeClr val="accent1">
+        <a:tint val="60000"/>
+      </a:schemeClr>
+    </dgm:linClrLst>
+    <dgm:effectClrLst/>
+    <dgm:txLinClrLst/>
+    <dgm:txFillClrLst/>
+    <dgm:txEffectClrLst/>
+  </dgm:styleLbl>
+  <dgm:styleLbl name="fgSibTrans2D1">
+    <dgm:fillClrLst meth="repeat">
+      <a:schemeClr val="accent1">
+        <a:tint val="60000"/>
+      </a:schemeClr>
+    </dgm:fillClrLst>
+    <dgm:linClrLst meth="repeat">
+      <a:schemeClr val="accent1">
+        <a:tint val="60000"/>
+      </a:schemeClr>
+    </dgm:linClrLst>
+    <dgm:effectClrLst/>
+    <dgm:txLinClrLst/>
+    <dgm:txFillClrLst/>
+    <dgm:txEffectClrLst/>
+  </dgm:styleLbl>
+  <dgm:styleLbl name="bgSibTrans2D1">
+    <dgm:fillClrLst meth="repeat">
+      <a:schemeClr val="accent1">
+        <a:tint val="60000"/>
+      </a:schemeClr>
+    </dgm:fillClrLst>
+    <dgm:linClrLst meth="repeat">
+      <a:schemeClr val="accent1">
+        <a:tint val="60000"/>
+      </a:schemeClr>
+    </dgm:linClrLst>
+    <dgm:effectClrLst/>
+    <dgm:txLinClrLst/>
+    <dgm:txFillClrLst/>
+    <dgm:txEffectClrLst/>
+  </dgm:styleLbl>
+  <dgm:styleLbl name="sibTrans1D1">
+    <dgm:fillClrLst meth="repeat">
+      <a:schemeClr val="accent1"/>
+    </dgm:fillClrLst>
+    <dgm:linClrLst meth="repeat">
+      <a:schemeClr val="accent1"/>
+    </dgm:linClrLst>
+    <dgm:effectClrLst/>
+    <dgm:txLinClrLst/>
+    <dgm:txFillClrLst meth="repeat">
+      <a:schemeClr val="tx1"/>
+    </dgm:txFillClrLst>
+    <dgm:txEffectClrLst/>
+  </dgm:styleLbl>
+  <dgm:styleLbl name="callout">
+    <dgm:fillClrLst meth="repeat">
+      <a:schemeClr val="accent1"/>
+    </dgm:fillClrLst>
+    <dgm:linClrLst meth="repeat">
+      <a:schemeClr val="accent1">
+        <a:tint val="50000"/>
+      </a:schemeClr>
+    </dgm:linClrLst>
+    <dgm:effectClrLst/>
+    <dgm:txLinClrLst/>
+    <dgm:txFillClrLst meth="repeat">
+      <a:schemeClr val="tx1"/>
+    </dgm:txFillClrLst>
+    <dgm:txEffectClrLst/>
+  </dgm:styleLbl>
+  <dgm:styleLbl name="asst0">
+    <dgm:fillClrLst meth="repeat">
+      <a:schemeClr val="accent1"/>
+    </dgm:fillClrLst>
+    <dgm:linClrLst meth="repeat">
+      <a:schemeClr val="lt1"/>
+    </dgm:linClrLst>
+    <dgm:effectClrLst/>
+    <dgm:txLinClrLst/>
+    <dgm:txFillClrLst/>
+    <dgm:txEffectClrLst/>
+  </dgm:styleLbl>
+  <dgm:styleLbl name="asst1">
+    <dgm:fillClrLst meth="repeat">
+      <a:schemeClr val="accent1"/>
+    </dgm:fillClrLst>
+    <dgm:linClrLst meth="repeat">
+      <a:schemeClr val="lt1"/>
+    </dgm:linClrLst>
+    <dgm:effectClrLst/>
+    <dgm:txLinClrLst/>
+    <dgm:txFillClrLst/>
+    <dgm:txEffectClrLst/>
+  </dgm:styleLbl>
+  <dgm:styleLbl name="asst2">
+    <dgm:fillClrLst meth="repeat">
+      <a:schemeClr val="accent1"/>
+    </dgm:fillClrLst>
+    <dgm:linClrLst meth="repeat">
+      <a:schemeClr val="lt1"/>
+    </dgm:linClrLst>
+    <dgm:effectClrLst/>
+    <dgm:txLinClrLst/>
+    <dgm:txFillClrLst/>
+    <dgm:txEffectClrLst/>
+  </dgm:styleLbl>
+  <dgm:styleLbl name="asst3">
+    <dgm:fillClrLst meth="repeat">
+      <a:schemeClr val="accent1"/>
+    </dgm:fillClrLst>
+    <dgm:linClrLst meth="repeat">
+      <a:schemeClr val="lt1"/>
+    </dgm:linClrLst>
+    <dgm:effectClrLst/>
+    <dgm:txLinClrLst/>
+    <dgm:txFillClrLst/>
+    <dgm:txEffectClrLst/>
+  </dgm:styleLbl>
+  <dgm:styleLbl name="asst4">
+    <dgm:fillClrLst meth="repeat">
+      <a:schemeClr val="accent1"/>
+    </dgm:fillClrLst>
+    <dgm:linClrLst meth="repeat">
+      <a:schemeClr val="lt1"/>
+    </dgm:linClrLst>
+    <dgm:effectClrLst/>
+    <dgm:txLinClrLst/>
+    <dgm:txFillClrLst/>
+    <dgm:txEffectClrLst/>
+  </dgm:styleLbl>
+  <dgm:styleLbl name="parChTrans2D1">
+    <dgm:fillClrLst meth="repeat">
+      <a:schemeClr val="accent1">
+        <a:tint val="60000"/>
+      </a:schemeClr>
+    </dgm:fillClrLst>
+    <dgm:linClrLst meth="repeat">
+      <a:schemeClr val="accent1">
+        <a:tint val="60000"/>
+      </a:schemeClr>
+    </dgm:linClrLst>
+    <dgm:effectClrLst/>
+    <dgm:txLinClrLst/>
+    <dgm:txFillClrLst meth="repeat">
+      <a:schemeClr val="lt1"/>
+    </dgm:txFillClrLst>
+    <dgm:txEffectClrLst/>
+  </dgm:styleLbl>
+  <dgm:styleLbl name="parChTrans2D2">
+    <dgm:fillClrLst meth="repeat">
+      <a:schemeClr val="accent1"/>
+    </dgm:fillClrLst>
+    <dgm:linClrLst meth="repeat">
+      <a:schemeClr val="accent1"/>
+    </dgm:linClrLst>
+    <dgm:effectClrLst/>
+    <dgm:txLinClrLst/>
+    <dgm:txFillClrLst meth="repeat">
+      <a:schemeClr val="lt1"/>
+    </dgm:txFillClrLst>
+    <dgm:txEffectClrLst/>
+  </dgm:styleLbl>
+  <dgm:styleLbl name="parChTrans2D3">
+    <dgm:fillClrLst meth="repeat">
+      <a:schemeClr val="accent1"/>
+    </dgm:fillClrLst>
+    <dgm:linClrLst meth="repeat">
+      <a:schemeClr val="accent1"/>
+    </dgm:linClrLst>
+    <dgm:effectClrLst/>
+    <dgm:txLinClrLst/>
+    <dgm:txFillClrLst meth="repeat">
+      <a:schemeClr val="lt1"/>
+    </dgm:txFillClrLst>
+    <dgm:txEffectClrLst/>
+  </dgm:styleLbl>
+  <dgm:styleLbl name="parChTrans2D4">
+    <dgm:fillClrLst meth="repeat">
+      <a:schemeClr val="accent1"/>
+    </dgm:fillClrLst>
+    <dgm:linClrLst meth="repeat">
+      <a:schemeClr val="accent1"/>
+    </dgm:linClrLst>
+    <dgm:effectClrLst/>
+    <dgm:txLinClrLst/>
+    <dgm:txFillClrLst meth="repeat">
+      <a:schemeClr val="lt1"/>
+    </dgm:txFillClrLst>
+    <dgm:txEffectClrLst/>
+  </dgm:styleLbl>
+  <dgm:styleLbl name="parChTrans1D1">
+    <dgm:fillClrLst meth="repeat">
+      <a:schemeClr val="accent1"/>
+    </dgm:fillClrLst>
+    <dgm:linClrLst meth="repeat">
+      <a:schemeClr val="accent1">
+        <a:shade val="60000"/>
+      </a:schemeClr>
+    </dgm:linClrLst>
+    <dgm:effectClrLst/>
+    <dgm:txLinClrLst/>
+    <dgm:txFillClrLst meth="repeat">
+      <a:schemeClr val="tx1"/>
+    </dgm:txFillClrLst>
+    <dgm:txEffectClrLst/>
+  </dgm:styleLbl>
+  <dgm:styleLbl name="parChTrans1D2">
+    <dgm:fillClrLst meth="repeat">
+      <a:schemeClr val="accent1"/>
+    </dgm:fillClrLst>
+    <dgm:linClrLst meth="repeat">
+      <a:schemeClr val="accent1">
+        <a:shade val="60000"/>
+      </a:schemeClr>
+    </dgm:linClrLst>
+    <dgm:effectClrLst/>
+    <dgm:txLinClrLst/>
+    <dgm:txFillClrLst meth="repeat">
+      <a:schemeClr val="tx1"/>
+    </dgm:txFillClrLst>
+    <dgm:txEffectClrLst/>
+  </dgm:styleLbl>
+  <dgm:styleLbl name="parChTrans1D3">
+    <dgm:fillClrLst meth="repeat">
+      <a:schemeClr val="accent1"/>
+    </dgm:fillClrLst>
+    <dgm:linClrLst meth="repeat">
+      <a:schemeClr val="accent1">
+        <a:shade val="80000"/>
+      </a:schemeClr>
+    </dgm:linClrLst>
+    <dgm:effectClrLst/>
+    <dgm:txLinClrLst/>
+    <dgm:txFillClrLst meth="repeat">
+      <a:schemeClr val="tx1"/>
+    </dgm:txFillClrLst>
+    <dgm:txEffectClrLst/>
+  </dgm:styleLbl>
+  <dgm:styleLbl name="parChTrans1D4">
+    <dgm:fillClrLst meth="repeat">
+      <a:schemeClr val="accent1"/>
+    </dgm:fillClrLst>
+    <dgm:linClrLst meth="repeat">
+      <a:schemeClr val="accent1">
+        <a:shade val="80000"/>
+      </a:schemeClr>
+    </dgm:linClrLst>
+    <dgm:effectClrLst/>
+    <dgm:txLinClrLst/>
+    <dgm:txFillClrLst meth="repeat">
+      <a:schemeClr val="tx1"/>
+    </dgm:txFillClrLst>
+    <dgm:txEffectClrLst/>
+  </dgm:styleLbl>
+  <dgm:styleLbl name="fgAcc1">
+    <dgm:fillClrLst meth="repeat">
+      <a:schemeClr val="lt1">
+        <a:alpha val="90000"/>
+      </a:schemeClr>
+    </dgm:fillClrLst>
+    <dgm:linClrLst meth="repeat">
+      <a:schemeClr val="accent1"/>
+    </dgm:linClrLst>
+    <dgm:effectClrLst/>
+    <dgm:txLinClrLst/>
+    <dgm:txFillClrLst meth="repeat">
+      <a:schemeClr val="dk1"/>
+    </dgm:txFillClrLst>
+    <dgm:txEffectClrLst/>
+  </dgm:styleLbl>
+  <dgm:styleLbl name="conFgAcc1">
+    <dgm:fillClrLst meth="repeat">
+      <a:schemeClr val="lt1">
+        <a:alpha val="90000"/>
+      </a:schemeClr>
+    </dgm:fillClrLst>
+    <dgm:linClrLst meth="repeat">
+      <a:schemeClr val="accent1"/>
+    </dgm:linClrLst>
+    <dgm:effectClrLst/>
+    <dgm:txLinClrLst/>
+    <dgm:txFillClrLst meth="repeat">
+      <a:schemeClr val="dk1"/>
+    </dgm:txFillClrLst>
+    <dgm:txEffectClrLst/>
+  </dgm:styleLbl>
+  <dgm:styleLbl name="alignAcc1">
+    <dgm:fillClrLst meth="repeat">
+      <a:schemeClr val="lt1">
+        <a:alpha val="90000"/>
+      </a:schemeClr>
+    </dgm:fillClrLst>
+    <dgm:linClrLst meth="repeat">
+      <a:schemeClr val="accent1"/>
+    </dgm:linClrLst>
+    <dgm:effectClrLst/>
+    <dgm:txLinClrLst/>
+    <dgm:txFillClrLst meth="repeat">
+      <a:schemeClr val="dk1"/>
+    </dgm:txFillClrLst>
+    <dgm:txEffectClrLst/>
+  </dgm:styleLbl>
+  <dgm:styleLbl name="trAlignAcc1">
+    <dgm:fillClrLst meth="repeat">
+      <a:schemeClr val="lt1">
+        <a:alpha val="40000"/>
+      </a:schemeClr>
+    </dgm:fillClrLst>
+    <dgm:linClrLst meth="repeat">
+      <a:schemeClr val="accent1"/>
+    </dgm:linClrLst>
+    <dgm:effectClrLst/>
+    <dgm:txLinClrLst/>
+    <dgm:txFillClrLst meth="repeat">
+      <a:schemeClr val="dk1"/>
+    </dgm:txFillClrLst>
+    <dgm:txEffectClrLst/>
+  </dgm:styleLbl>
+  <dgm:styleLbl name="bgAcc1">
+    <dgm:fillClrLst meth="repeat">
+      <a:schemeClr val="lt1">
+        <a:alpha val="90000"/>
+      </a:schemeClr>
+    </dgm:fillClrLst>
+    <dgm:linClrLst meth="repeat">
+      <a:schemeClr val="accent1"/>
+    </dgm:linClrLst>
+    <dgm:effectClrLst/>
+    <dgm:txLinClrLst/>
+    <dgm:txFillClrLst meth="repeat">
+      <a:schemeClr val="dk1"/>
+    </dgm:txFillClrLst>
+    <dgm:txEffectClrLst/>
+  </dgm:styleLbl>
+  <dgm:styleLbl name="solidFgAcc1">
+    <dgm:fillClrLst meth="repeat">
+      <a:schemeClr val="lt1"/>
+    </dgm:fillClrLst>
+    <dgm:linClrLst meth="repeat">
+      <a:schemeClr val="accent1"/>
+    </dgm:linClrLst>
+    <dgm:effectClrLst/>
+    <dgm:txLinClrLst/>
+    <dgm:txFillClrLst meth="repeat">
+      <a:schemeClr val="dk1"/>
+    </dgm:txFillClrLst>
+    <dgm:txEffectClrLst/>
+  </dgm:styleLbl>
+  <dgm:styleLbl name="solidAlignAcc1">
+    <dgm:fillClrLst meth="repeat">
+      <a:schemeClr val="lt1"/>
+    </dgm:fillClrLst>
+    <dgm:linClrLst meth="repeat">
+      <a:schemeClr val="accent1"/>
+    </dgm:linClrLst>
+    <dgm:effectClrLst/>
+    <dgm:txLinClrLst/>
+    <dgm:txFillClrLst meth="repeat">
+      <a:schemeClr val="dk1"/>
+    </dgm:txFillClrLst>
+    <dgm:txEffectClrLst/>
+  </dgm:styleLbl>
+  <dgm:styleLbl name="solidBgAcc1">
+    <dgm:fillClrLst meth="repeat">
+      <a:schemeClr val="lt1"/>
+    </dgm:fillClrLst>
+    <dgm:linClrLst meth="repeat">
+      <a:schemeClr val="accent1"/>
+    </dgm:linClrLst>
+    <dgm:effectClrLst/>
+    <dgm:txLinClrLst/>
+    <dgm:txFillClrLst meth="repeat">
+      <a:schemeClr val="dk1"/>
+    </dgm:txFillClrLst>
+    <dgm:txEffectClrLst/>
+  </dgm:styleLbl>
+  <dgm:styleLbl name="fgAccFollowNode1">
+    <dgm:fillClrLst meth="repeat">
+      <a:schemeClr val="accent1">
+        <a:alpha val="90000"/>
+        <a:tint val="40000"/>
+      </a:schemeClr>
+    </dgm:fillClrLst>
+    <dgm:linClrLst meth="repeat">
+      <a:schemeClr val="accent1">
+        <a:alpha val="90000"/>
+        <a:tint val="40000"/>
+      </a:schemeClr>
+    </dgm:linClrLst>
+    <dgm:effectClrLst/>
+    <dgm:txLinClrLst/>
+    <dgm:txFillClrLst meth="repeat">
+      <a:schemeClr val="dk1"/>
+    </dgm:txFillClrLst>
+    <dgm:txEffectClrLst/>
+  </dgm:styleLbl>
+  <dgm:styleLbl name="alignAccFollowNode1">
+    <dgm:fillClrLst meth="repeat">
+      <a:schemeClr val="accent1">
+        <a:alpha val="90000"/>
+        <a:tint val="40000"/>
+      </a:schemeClr>
+    </dgm:fillClrLst>
+    <dgm:linClrLst meth="repeat">
+      <a:schemeClr val="accent1">
+        <a:alpha val="90000"/>
+        <a:tint val="40000"/>
+      </a:schemeClr>
+    </dgm:linClrLst>
+    <dgm:effectClrLst/>
+    <dgm:txLinClrLst/>
+    <dgm:txFillClrLst meth="repeat">
+      <a:schemeClr val="dk1"/>
+    </dgm:txFillClrLst>
+    <dgm:txEffectClrLst/>
+  </dgm:styleLbl>
+  <dgm:styleLbl name="bgAccFollowNode1">
+    <dgm:fillClrLst meth="repeat">
+      <a:schemeClr val="accent1">
+        <a:alpha val="90000"/>
+        <a:tint val="40000"/>
+      </a:schemeClr>
+    </dgm:fillClrLst>
+    <dgm:linClrLst meth="repeat">
+      <a:schemeClr val="accent1">
+        <a:alpha val="90000"/>
+        <a:tint val="40000"/>
+      </a:schemeClr>
+    </dgm:linClrLst>
+    <dgm:effectClrLst/>
+    <dgm:txLinClrLst/>
+    <dgm:txFillClrLst meth="repeat">
+      <a:schemeClr val="dk1"/>
+    </dgm:txFillClrLst>
+    <dgm:txEffectClrLst/>
+  </dgm:styleLbl>
+  <dgm:styleLbl name="fgAcc0">
+    <dgm:fillClrLst meth="repeat">
+      <a:schemeClr val="lt1">
+        <a:alpha val="90000"/>
+      </a:schemeClr>
+    </dgm:fillClrLst>
+    <dgm:linClrLst meth="repeat">
+      <a:schemeClr val="accent1"/>
+    </dgm:linClrLst>
+    <dgm:effectClrLst/>
+    <dgm:txLinClrLst/>
+    <dgm:txFillClrLst meth="repeat">
+      <a:schemeClr val="dk1"/>
+    </dgm:txFillClrLst>
+    <dgm:txEffectClrLst/>
+  </dgm:styleLbl>
+  <dgm:styleLbl name="fgAcc2">
+    <dgm:fillClrLst meth="repeat">
+      <a:schemeClr val="lt1">
+        <a:alpha val="90000"/>
+      </a:schemeClr>
+    </dgm:fillClrLst>
+    <dgm:linClrLst meth="repeat">
+      <a:schemeClr val="accent1"/>
+    </dgm:linClrLst>
+    <dgm:effectClrLst/>
+    <dgm:txLinClrLst/>
+    <dgm:txFillClrLst meth="repeat">
+      <a:schemeClr val="dk1"/>
+    </dgm:txFillClrLst>
+    <dgm:txEffectClrLst/>
+  </dgm:styleLbl>
+  <dgm:styleLbl name="fgAcc3">
+    <dgm:fillClrLst meth="repeat">
+      <a:schemeClr val="lt1">
+        <a:alpha val="90000"/>
+      </a:schemeClr>
+    </dgm:fillClrLst>
+    <dgm:linClrLst meth="repeat">
+      <a:schemeClr val="accent1"/>
+    </dgm:linClrLst>
+    <dgm:effectClrLst/>
+    <dgm:txLinClrLst/>
+    <dgm:txFillClrLst meth="repeat">
+      <a:schemeClr val="dk1"/>
+    </dgm:txFillClrLst>
+    <dgm:txEffectClrLst/>
+  </dgm:styleLbl>
+  <dgm:styleLbl name="fgAcc4">
+    <dgm:fillClrLst meth="repeat">
+      <a:schemeClr val="lt1">
+        <a:alpha val="90000"/>
+      </a:schemeClr>
+    </dgm:fillClrLst>
+    <dgm:linClrLst meth="repeat">
+      <a:schemeClr val="accent1"/>
+    </dgm:linClrLst>
+    <dgm:effectClrLst/>
+    <dgm:txLinClrLst/>
+    <dgm:txFillClrLst meth="repeat">
+      <a:schemeClr val="dk1"/>
+    </dgm:txFillClrLst>
+    <dgm:txEffectClrLst/>
+  </dgm:styleLbl>
+  <dgm:styleLbl name="bgShp">
+    <dgm:fillClrLst meth="repeat">
+      <a:schemeClr val="accent1">
+        <a:tint val="40000"/>
+      </a:schemeClr>
+    </dgm:fillClrLst>
+    <dgm:linClrLst meth="repeat">
+      <a:schemeClr val="accent1"/>
+    </dgm:linClrLst>
+    <dgm:effectClrLst/>
+    <dgm:txLinClrLst/>
+    <dgm:txFillClrLst meth="repeat">
+      <a:schemeClr val="dk1"/>
+    </dgm:txFillClrLst>
+    <dgm:txEffectClrLst/>
+  </dgm:styleLbl>
+  <dgm:styleLbl name="dkBgShp">
+    <dgm:fillClrLst meth="repeat">
+      <a:schemeClr val="accent1">
+        <a:shade val="80000"/>
+      </a:schemeClr>
+    </dgm:fillClrLst>
+    <dgm:linClrLst meth="repeat">
+      <a:schemeClr val="accent1"/>
+    </dgm:linClrLst>
+    <dgm:effectClrLst/>
+    <dgm:txLinClrLst/>
+    <dgm:txFillClrLst meth="repeat">
+      <a:schemeClr val="lt1"/>
+    </dgm:txFillClrLst>
+    <dgm:txEffectClrLst/>
+  </dgm:styleLbl>
+  <dgm:styleLbl name="trBgShp">
+    <dgm:fillClrLst meth="repeat">
+      <a:schemeClr val="accent1">
+        <a:tint val="50000"/>
+        <a:alpha val="40000"/>
+      </a:schemeClr>
+    </dgm:fillClrLst>
+    <dgm:linClrLst meth="repeat">
+      <a:schemeClr val="accent1"/>
+    </dgm:linClrLst>
+    <dgm:effectClrLst/>
+    <dgm:txLinClrLst/>
+    <dgm:txFillClrLst meth="repeat">
+      <a:schemeClr val="lt1"/>
+    </dgm:txFillClrLst>
+    <dgm:txEffectClrLst/>
+  </dgm:styleLbl>
+  <dgm:styleLbl name="fgShp">
+    <dgm:fillClrLst meth="repeat">
+      <a:schemeClr val="accent1">
+        <a:tint val="60000"/>
+      </a:schemeClr>
+    </dgm:fillClrLst>
+    <dgm:linClrLst meth="repeat">
+      <a:schemeClr val="lt1"/>
+    </dgm:linClrLst>
+    <dgm:effectClrLst/>
+    <dgm:txLinClrLst/>
+    <dgm:txFillClrLst meth="repeat">
+      <a:schemeClr val="dk1"/>
+    </dgm:txFillClrLst>
+    <dgm:txEffectClrLst/>
+  </dgm:styleLbl>
+  <dgm:styleLbl name="revTx">
+    <dgm:fillClrLst meth="repeat">
+      <a:schemeClr val="lt1">
+        <a:alpha val="0"/>
+      </a:schemeClr>
+    </dgm:fillClrLst>
+    <dgm:linClrLst meth="repeat">
+      <a:schemeClr val="dk1">
+        <a:alpha val="0"/>
+      </a:schemeClr>
+    </dgm:linClrLst>
+    <dgm:effectClrLst/>
+    <dgm:txLinClrLst/>
+    <dgm:txFillClrLst meth="repeat">
+      <a:schemeClr val="tx1"/>
+    </dgm:txFillClrLst>
+    <dgm:txEffectClrLst/>
+  </dgm:styleLbl>
+</dgm:colorsDef>
+</file>
+
 <file path=ppt/diagrams/data1.xml><?xml version="1.0" encoding="utf-8"?>
 <dgm:dataModel xmlns:dgm="http://schemas.openxmlformats.org/drawingml/2006/diagram" xmlns:a="http://schemas.openxmlformats.org/drawingml/2006/main">
   <dgm:ptLst>
@@ -896,18 +1643,18 @@
         <a:lstStyle/>
         <a:p>
           <a:r>
-            <a:rPr lang="en-US" sz="2800" dirty="0" err="1"/>
+            <a:rPr lang="en-US" sz="3200" dirty="0" err="1"/>
             <a:t>Dimitar</a:t>
           </a:r>
           <a:r>
-            <a:rPr lang="en-US" sz="2800" dirty="0"/>
+            <a:rPr lang="en-US" sz="3200" dirty="0"/>
             <a:t> </a:t>
           </a:r>
           <a:r>
-            <a:rPr lang="en-US" sz="2800" dirty="0" err="1"/>
+            <a:rPr lang="en-US" sz="3200" dirty="0" err="1"/>
             <a:t>Karazapryanov</a:t>
           </a:r>
-          <a:endParaRPr lang="en-GB" sz="2800" dirty="0"/>
+          <a:endParaRPr lang="en-GB" sz="3200" dirty="0"/>
         </a:p>
       </dgm:t>
     </dgm:pt>
@@ -977,7 +1724,7 @@
       <dgm:spPr/>
     </dgm:pt>
     <dgm:pt modelId="{227ADCDF-6344-4643-937B-F968607DF84A}" type="pres">
-      <dgm:prSet presAssocID="{EAE85D1C-13EC-4454-996C-FA98C44A4500}" presName="pictureRepeatNode" presStyleLbl="alignImgPlace1" presStyleIdx="0" presStyleCnt="1" custScaleX="153232" custScaleY="150785" custLinFactNeighborX="-45945" custLinFactNeighborY="-27879"/>
+      <dgm:prSet presAssocID="{EAE85D1C-13EC-4454-996C-FA98C44A4500}" presName="pictureRepeatNode" presStyleLbl="alignImgPlace1" presStyleIdx="0" presStyleCnt="1" custScaleX="153232" custScaleY="150785" custLinFactNeighborX="-600" custLinFactNeighborY="-13492"/>
       <dgm:spPr/>
     </dgm:pt>
     <dgm:pt modelId="{51A7C881-55EE-4A4F-9183-BE8E4C048076}" type="pres">
@@ -1009,6 +1756,134 @@
 </dgm:dataModel>
 </file>
 
+<file path=ppt/diagrams/data2.xml><?xml version="1.0" encoding="utf-8"?>
+<dgm:dataModel xmlns:dgm="http://schemas.openxmlformats.org/drawingml/2006/diagram" xmlns:a="http://schemas.openxmlformats.org/drawingml/2006/main">
+  <dgm:ptLst>
+    <dgm:pt modelId="{8C8570ED-5A10-4DFA-B0E3-C416060C1E39}" type="doc">
+      <dgm:prSet loTypeId="urn:microsoft.com/office/officeart/2008/layout/CircularPictureCallout" loCatId="picture" qsTypeId="urn:microsoft.com/office/officeart/2005/8/quickstyle/simple1" qsCatId="simple" csTypeId="urn:microsoft.com/office/officeart/2005/8/colors/accent1_2" csCatId="accent1" phldr="1"/>
+      <dgm:spPr/>
+    </dgm:pt>
+    <dgm:pt modelId="{F489FB91-293E-41FF-A017-DE0F026E5089}">
+      <dgm:prSet phldrT="[Текст]" custT="1"/>
+      <dgm:spPr/>
+      <dgm:t>
+        <a:bodyPr/>
+        <a:lstStyle/>
+        <a:p>
+          <a:r>
+            <a:rPr lang="en-US" sz="3200" dirty="0" err="1"/>
+            <a:t>Panayot</a:t>
+          </a:r>
+          <a:r>
+            <a:rPr lang="en-US" sz="3200" dirty="0"/>
+            <a:t> </a:t>
+          </a:r>
+          <a:r>
+            <a:rPr lang="en-US" sz="3200" dirty="0" err="1"/>
+            <a:t>Panayotov</a:t>
+          </a:r>
+          <a:endParaRPr lang="en-GB" sz="3200" dirty="0"/>
+        </a:p>
+      </dgm:t>
+    </dgm:pt>
+    <dgm:pt modelId="{09AAD854-45F4-4901-A005-259D153A6887}" type="parTrans" cxnId="{83489F75-B6C2-4263-9A88-0C24C109A3E3}">
+      <dgm:prSet/>
+      <dgm:spPr/>
+      <dgm:t>
+        <a:bodyPr/>
+        <a:lstStyle/>
+        <a:p>
+          <a:endParaRPr lang="en-GB"/>
+        </a:p>
+      </dgm:t>
+    </dgm:pt>
+    <dgm:pt modelId="{18FCC3CF-10FD-4856-B5D1-BB542384E666}" type="sibTrans" cxnId="{83489F75-B6C2-4263-9A88-0C24C109A3E3}">
+      <dgm:prSet/>
+      <dgm:spPr>
+        <a:blipFill>
+          <a:blip xmlns:r="http://schemas.openxmlformats.org/officeDocument/2006/relationships" r:embed="rId1">
+            <a:extLst>
+              <a:ext uri="{28A0092B-C50C-407E-A947-70E740481C1C}">
+                <a14:useLocalDpi xmlns:a14="http://schemas.microsoft.com/office/drawing/2010/main" val="0"/>
+              </a:ext>
+            </a:extLst>
+          </a:blip>
+          <a:srcRect/>
+          <a:stretch>
+            <a:fillRect l="-11000" r="-11000"/>
+          </a:stretch>
+        </a:blipFill>
+      </dgm:spPr>
+      <dgm:t>
+        <a:bodyPr/>
+        <a:lstStyle/>
+        <a:p>
+          <a:endParaRPr lang="en-GB"/>
+        </a:p>
+      </dgm:t>
+      <dgm:extLst>
+        <a:ext uri="{E40237B7-FDA0-4F09-8148-C483321AD2D9}">
+          <dgm14:cNvPr xmlns:dgm14="http://schemas.microsoft.com/office/drawing/2010/diagram" id="0" name="" descr="Goat Manure Fertilizer: Goat Manure In The Garden">
+            <a:extLst>
+              <a:ext uri="{FF2B5EF4-FFF2-40B4-BE49-F238E27FC236}">
+                <a16:creationId xmlns:a16="http://schemas.microsoft.com/office/drawing/2014/main" id="{E804613B-3E0B-4ADF-8E35-F816C97C90E8}"/>
+              </a:ext>
+            </a:extLst>
+          </dgm14:cNvPr>
+        </a:ext>
+      </dgm:extLst>
+    </dgm:pt>
+    <dgm:pt modelId="{B182DB9E-35BB-4BA0-880E-1B3FDF4688BA}" type="pres">
+      <dgm:prSet presAssocID="{8C8570ED-5A10-4DFA-B0E3-C416060C1E39}" presName="Name0" presStyleCnt="0">
+        <dgm:presLayoutVars>
+          <dgm:chMax val="7"/>
+          <dgm:chPref val="7"/>
+          <dgm:dir/>
+        </dgm:presLayoutVars>
+      </dgm:prSet>
+      <dgm:spPr/>
+    </dgm:pt>
+    <dgm:pt modelId="{6EB75FB9-0F66-43F4-970E-C7DAF289B143}" type="pres">
+      <dgm:prSet presAssocID="{8C8570ED-5A10-4DFA-B0E3-C416060C1E39}" presName="Name1" presStyleCnt="0"/>
+      <dgm:spPr/>
+    </dgm:pt>
+    <dgm:pt modelId="{72F3CBB1-EA9D-4C0D-B757-25C43A5C8470}" type="pres">
+      <dgm:prSet presAssocID="{18FCC3CF-10FD-4856-B5D1-BB542384E666}" presName="picture_1" presStyleCnt="0"/>
+      <dgm:spPr/>
+    </dgm:pt>
+    <dgm:pt modelId="{796D380E-3B3D-4D34-90B6-05C5AB193999}" type="pres">
+      <dgm:prSet presAssocID="{18FCC3CF-10FD-4856-B5D1-BB542384E666}" presName="pictureRepeatNode" presStyleLbl="alignImgPlace1" presStyleIdx="0" presStyleCnt="1" custScaleX="153859" custScaleY="147322" custLinFactNeighborX="-56" custLinFactNeighborY="-15405"/>
+      <dgm:spPr/>
+    </dgm:pt>
+    <dgm:pt modelId="{C0ACFB64-268E-4BF0-904F-A08643FC82C4}" type="pres">
+      <dgm:prSet presAssocID="{F489FB91-293E-41FF-A017-DE0F026E5089}" presName="text_1" presStyleLbl="node1" presStyleIdx="0" presStyleCnt="0" custScaleX="312500" custLinFactY="100000" custLinFactNeighborX="5896" custLinFactNeighborY="137968">
+        <dgm:presLayoutVars>
+          <dgm:bulletEnabled val="1"/>
+        </dgm:presLayoutVars>
+      </dgm:prSet>
+      <dgm:spPr/>
+    </dgm:pt>
+  </dgm:ptLst>
+  <dgm:cxnLst>
+    <dgm:cxn modelId="{6B38F411-AF4F-45AC-B100-575F5E9C4403}" type="presOf" srcId="{8C8570ED-5A10-4DFA-B0E3-C416060C1E39}" destId="{B182DB9E-35BB-4BA0-880E-1B3FDF4688BA}" srcOrd="0" destOrd="0" presId="urn:microsoft.com/office/officeart/2008/layout/CircularPictureCallout"/>
+    <dgm:cxn modelId="{83489F75-B6C2-4263-9A88-0C24C109A3E3}" srcId="{8C8570ED-5A10-4DFA-B0E3-C416060C1E39}" destId="{F489FB91-293E-41FF-A017-DE0F026E5089}" srcOrd="0" destOrd="0" parTransId="{09AAD854-45F4-4901-A005-259D153A6887}" sibTransId="{18FCC3CF-10FD-4856-B5D1-BB542384E666}"/>
+    <dgm:cxn modelId="{116AB494-482B-46DB-9F28-B3ABC9240664}" type="presOf" srcId="{F489FB91-293E-41FF-A017-DE0F026E5089}" destId="{C0ACFB64-268E-4BF0-904F-A08643FC82C4}" srcOrd="0" destOrd="0" presId="urn:microsoft.com/office/officeart/2008/layout/CircularPictureCallout"/>
+    <dgm:cxn modelId="{83C69FDF-185C-427B-AC96-F24F9AA0DDAF}" type="presOf" srcId="{18FCC3CF-10FD-4856-B5D1-BB542384E666}" destId="{796D380E-3B3D-4D34-90B6-05C5AB193999}" srcOrd="0" destOrd="0" presId="urn:microsoft.com/office/officeart/2008/layout/CircularPictureCallout"/>
+    <dgm:cxn modelId="{828D9AD6-F262-49FD-A67C-D2BF455D7A7C}" type="presParOf" srcId="{B182DB9E-35BB-4BA0-880E-1B3FDF4688BA}" destId="{6EB75FB9-0F66-43F4-970E-C7DAF289B143}" srcOrd="0" destOrd="0" presId="urn:microsoft.com/office/officeart/2008/layout/CircularPictureCallout"/>
+    <dgm:cxn modelId="{EB1531FC-064D-4A79-8EB4-A50A1D17972F}" type="presParOf" srcId="{6EB75FB9-0F66-43F4-970E-C7DAF289B143}" destId="{72F3CBB1-EA9D-4C0D-B757-25C43A5C8470}" srcOrd="0" destOrd="0" presId="urn:microsoft.com/office/officeart/2008/layout/CircularPictureCallout"/>
+    <dgm:cxn modelId="{39BD4893-21FC-49A3-9E49-EB947EB6E4C8}" type="presParOf" srcId="{72F3CBB1-EA9D-4C0D-B757-25C43A5C8470}" destId="{796D380E-3B3D-4D34-90B6-05C5AB193999}" srcOrd="0" destOrd="0" presId="urn:microsoft.com/office/officeart/2008/layout/CircularPictureCallout"/>
+    <dgm:cxn modelId="{48F4A97C-10BF-44A6-8A5E-D27548BB7F5A}" type="presParOf" srcId="{6EB75FB9-0F66-43F4-970E-C7DAF289B143}" destId="{C0ACFB64-268E-4BF0-904F-A08643FC82C4}" srcOrd="1" destOrd="0" presId="urn:microsoft.com/office/officeart/2008/layout/CircularPictureCallout"/>
+  </dgm:cxnLst>
+  <dgm:bg/>
+  <dgm:whole/>
+  <dgm:extLst>
+    <a:ext uri="http://schemas.microsoft.com/office/drawing/2008/diagram">
+      <dsp:dataModelExt xmlns:dsp="http://schemas.microsoft.com/office/drawing/2008/diagram" relId="rId11" minVer="http://schemas.openxmlformats.org/drawingml/2006/diagram"/>
+    </a:ext>
+  </dgm:extLst>
+</dgm:dataModel>
+</file>
+
 <file path=ppt/diagrams/drawing1.xml><?xml version="1.0" encoding="utf-8"?>
 <dsp:drawing xmlns:dgm="http://schemas.openxmlformats.org/drawingml/2006/diagram" xmlns:dsp="http://schemas.microsoft.com/office/drawing/2008/diagram" xmlns:a="http://schemas.openxmlformats.org/drawingml/2006/main">
   <dsp:spTree>
@@ -1024,8 +1899,8 @@
       </dsp:nvSpPr>
       <dsp:spPr>
         <a:xfrm>
-          <a:off x="0" y="0"/>
-          <a:ext cx="3136674" cy="3086584"/>
+          <a:off x="481284" y="23959"/>
+          <a:ext cx="3236840" cy="3185150"/>
         </a:xfrm>
         <a:prstGeom prst="ellipse">
           <a:avLst/>
@@ -1076,8 +1951,8 @@
       </dsp:nvSpPr>
       <dsp:spPr>
         <a:xfrm>
-          <a:off x="0" y="3107382"/>
-          <a:ext cx="4094020" cy="675513"/>
+          <a:off x="0" y="3105989"/>
+          <a:ext cx="4224758" cy="697085"/>
         </a:xfrm>
         <a:prstGeom prst="rect">
           <a:avLst/>
@@ -1110,7 +1985,7 @@
         </a:bodyPr>
         <a:lstStyle/>
         <a:p>
-          <a:pPr marL="0" lvl="0" indent="0" algn="ctr" defTabSz="1244600">
+          <a:pPr marL="0" lvl="0" indent="0" algn="ctr" defTabSz="1422400">
             <a:lnSpc>
               <a:spcPct val="90000"/>
             </a:lnSpc>
@@ -1123,23 +1998,160 @@
             <a:buNone/>
           </a:pPr>
           <a:r>
-            <a:rPr lang="en-US" sz="2800" kern="1200" dirty="0" err="1"/>
+            <a:rPr lang="en-US" sz="3200" kern="1200" dirty="0" err="1"/>
             <a:t>Dimitar</a:t>
           </a:r>
           <a:r>
-            <a:rPr lang="en-US" sz="2800" kern="1200" dirty="0"/>
+            <a:rPr lang="en-US" sz="3200" kern="1200" dirty="0"/>
             <a:t> </a:t>
           </a:r>
           <a:r>
-            <a:rPr lang="en-US" sz="2800" kern="1200" dirty="0" err="1"/>
+            <a:rPr lang="en-US" sz="3200" kern="1200" dirty="0" err="1"/>
             <a:t>Karazapryanov</a:t>
           </a:r>
-          <a:endParaRPr lang="en-GB" sz="2800" kern="1200" dirty="0"/>
+          <a:endParaRPr lang="en-GB" sz="3200" kern="1200" dirty="0"/>
         </a:p>
       </dsp:txBody>
       <dsp:txXfrm>
-        <a:off x="0" y="3107382"/>
-        <a:ext cx="4094020" cy="675513"/>
+        <a:off x="0" y="3105989"/>
+        <a:ext cx="4224758" cy="697085"/>
+      </dsp:txXfrm>
+    </dsp:sp>
+  </dsp:spTree>
+</dsp:drawing>
+</file>
+
+<file path=ppt/diagrams/drawing2.xml><?xml version="1.0" encoding="utf-8"?>
+<dsp:drawing xmlns:dgm="http://schemas.openxmlformats.org/drawingml/2006/diagram" xmlns:dsp="http://schemas.microsoft.com/office/drawing/2008/diagram" xmlns:a="http://schemas.openxmlformats.org/drawingml/2006/main">
+  <dsp:spTree>
+    <dsp:nvGrpSpPr>
+      <dsp:cNvPr id="0" name=""/>
+      <dsp:cNvGrpSpPr/>
+    </dsp:nvGrpSpPr>
+    <dsp:grpSpPr/>
+    <dsp:sp modelId="{796D380E-3B3D-4D34-90B6-05C5AB193999}">
+      <dsp:nvSpPr>
+        <dsp:cNvPr id="0" name=""/>
+        <dsp:cNvSpPr/>
+      </dsp:nvSpPr>
+      <dsp:spPr>
+        <a:xfrm>
+          <a:off x="504221" y="0"/>
+          <a:ext cx="3370876" cy="3227658"/>
+        </a:xfrm>
+        <a:prstGeom prst="ellipse">
+          <a:avLst/>
+        </a:prstGeom>
+        <a:blipFill>
+          <a:blip xmlns:r="http://schemas.openxmlformats.org/officeDocument/2006/relationships" r:embed="rId1">
+            <a:extLst>
+              <a:ext uri="{28A0092B-C50C-407E-A947-70E740481C1C}">
+                <a14:useLocalDpi xmlns:a14="http://schemas.microsoft.com/office/drawing/2010/main" val="0"/>
+              </a:ext>
+            </a:extLst>
+          </a:blip>
+          <a:srcRect/>
+          <a:stretch>
+            <a:fillRect l="-11000" r="-11000"/>
+          </a:stretch>
+        </a:blipFill>
+        <a:ln w="15875" cap="flat" cmpd="sng" algn="ctr">
+          <a:solidFill>
+            <a:schemeClr val="lt1">
+              <a:hueOff val="0"/>
+              <a:satOff val="0"/>
+              <a:lumOff val="0"/>
+              <a:alphaOff val="0"/>
+            </a:schemeClr>
+          </a:solidFill>
+          <a:prstDash val="solid"/>
+        </a:ln>
+        <a:effectLst/>
+      </dsp:spPr>
+      <dsp:style>
+        <a:lnRef idx="2">
+          <a:scrgbClr r="0" g="0" b="0"/>
+        </a:lnRef>
+        <a:fillRef idx="1">
+          <a:scrgbClr r="0" g="0" b="0"/>
+        </a:fillRef>
+        <a:effectRef idx="0">
+          <a:scrgbClr r="0" g="0" b="0"/>
+        </a:effectRef>
+        <a:fontRef idx="minor"/>
+      </dsp:style>
+    </dsp:sp>
+    <dsp:sp modelId="{C0ACFB64-268E-4BF0-904F-A08643FC82C4}">
+      <dsp:nvSpPr>
+        <dsp:cNvPr id="0" name=""/>
+        <dsp:cNvSpPr/>
+      </dsp:nvSpPr>
+      <dsp:spPr>
+        <a:xfrm>
+          <a:off x="0" y="3080081"/>
+          <a:ext cx="4381774" cy="722992"/>
+        </a:xfrm>
+        <a:prstGeom prst="rect">
+          <a:avLst/>
+        </a:prstGeom>
+        <a:noFill/>
+        <a:ln w="15875" cap="flat" cmpd="sng" algn="ctr">
+          <a:noFill/>
+          <a:prstDash val="solid"/>
+        </a:ln>
+        <a:effectLst/>
+        <a:sp3d/>
+      </dsp:spPr>
+      <dsp:style>
+        <a:lnRef idx="2">
+          <a:scrgbClr r="0" g="0" b="0"/>
+        </a:lnRef>
+        <a:fillRef idx="1">
+          <a:scrgbClr r="0" g="0" b="0"/>
+        </a:fillRef>
+        <a:effectRef idx="0">
+          <a:scrgbClr r="0" g="0" b="0"/>
+        </a:effectRef>
+        <a:fontRef idx="minor">
+          <a:schemeClr val="lt1"/>
+        </a:fontRef>
+      </dsp:style>
+      <dsp:txBody>
+        <a:bodyPr spcFirstLastPara="0" vert="horz" wrap="square" lIns="0" tIns="0" rIns="0" bIns="0" numCol="1" spcCol="1270" anchor="b" anchorCtr="0">
+          <a:noAutofit/>
+        </a:bodyPr>
+        <a:lstStyle/>
+        <a:p>
+          <a:pPr marL="0" lvl="0" indent="0" algn="ctr" defTabSz="1422400">
+            <a:lnSpc>
+              <a:spcPct val="90000"/>
+            </a:lnSpc>
+            <a:spcBef>
+              <a:spcPct val="0"/>
+            </a:spcBef>
+            <a:spcAft>
+              <a:spcPct val="35000"/>
+            </a:spcAft>
+            <a:buNone/>
+          </a:pPr>
+          <a:r>
+            <a:rPr lang="en-US" sz="3200" kern="1200" dirty="0" err="1"/>
+            <a:t>Panayot</a:t>
+          </a:r>
+          <a:r>
+            <a:rPr lang="en-US" sz="3200" kern="1200" dirty="0"/>
+            <a:t> </a:t>
+          </a:r>
+          <a:r>
+            <a:rPr lang="en-US" sz="3200" kern="1200" dirty="0" err="1"/>
+            <a:t>Panayotov</a:t>
+          </a:r>
+          <a:endParaRPr lang="en-GB" sz="3200" kern="1200" dirty="0"/>
+        </a:p>
+      </dsp:txBody>
+      <dsp:txXfrm>
+        <a:off x="0" y="3080081"/>
+        <a:ext cx="4381774" cy="722992"/>
       </dsp:txXfrm>
     </dsp:sp>
   </dsp:spTree>
@@ -1147,6 +2159,1414 @@
 </file>
 
 <file path=ppt/diagrams/layout1.xml><?xml version="1.0" encoding="utf-8"?>
+<dgm:layoutDef xmlns:dgm="http://schemas.openxmlformats.org/drawingml/2006/diagram" xmlns:a="http://schemas.openxmlformats.org/drawingml/2006/main" uniqueId="urn:microsoft.com/office/officeart/2008/layout/CircularPictureCallout">
+  <dgm:title val=""/>
+  <dgm:desc val=""/>
+  <dgm:catLst>
+    <dgm:cat type="picture" pri="2000"/>
+    <dgm:cat type="pictureconvert" pri="2000"/>
+  </dgm:catLst>
+  <dgm:sampData>
+    <dgm:dataModel>
+      <dgm:ptLst>
+        <dgm:pt modelId="0" type="doc"/>
+        <dgm:pt modelId="1"/>
+        <dgm:pt modelId="2">
+          <dgm:prSet phldr="1"/>
+        </dgm:pt>
+        <dgm:pt modelId="3">
+          <dgm:prSet phldr="1"/>
+        </dgm:pt>
+        <dgm:pt modelId="4">
+          <dgm:prSet phldr="1"/>
+        </dgm:pt>
+      </dgm:ptLst>
+      <dgm:cxnLst>
+        <dgm:cxn modelId="5" srcId="0" destId="1" srcOrd="0" destOrd="0"/>
+        <dgm:cxn modelId="6" srcId="0" destId="2" srcOrd="1" destOrd="0"/>
+        <dgm:cxn modelId="7" srcId="0" destId="3" srcOrd="2" destOrd="0"/>
+        <dgm:cxn modelId="8" srcId="0" destId="4" srcOrd="3" destOrd="0"/>
+      </dgm:cxnLst>
+      <dgm:bg/>
+      <dgm:whole/>
+    </dgm:dataModel>
+  </dgm:sampData>
+  <dgm:styleData>
+    <dgm:dataModel>
+      <dgm:ptLst>
+        <dgm:pt modelId="0" type="doc"/>
+        <dgm:pt modelId="1">
+          <dgm:prSet phldr="1"/>
+        </dgm:pt>
+        <dgm:pt modelId="2">
+          <dgm:prSet phldr="1"/>
+        </dgm:pt>
+        <dgm:pt modelId="3">
+          <dgm:prSet phldr="1"/>
+        </dgm:pt>
+        <dgm:pt modelId="4">
+          <dgm:prSet phldr="1"/>
+        </dgm:pt>
+      </dgm:ptLst>
+      <dgm:cxnLst>
+        <dgm:cxn modelId="5" srcId="0" destId="1" srcOrd="0" destOrd="0"/>
+        <dgm:cxn modelId="6" srcId="0" destId="2" srcOrd="1" destOrd="0"/>
+        <dgm:cxn modelId="7" srcId="0" destId="3" srcOrd="2" destOrd="0"/>
+        <dgm:cxn modelId="8" srcId="0" destId="4" srcOrd="3" destOrd="0"/>
+      </dgm:cxnLst>
+      <dgm:bg/>
+      <dgm:whole/>
+    </dgm:dataModel>
+  </dgm:styleData>
+  <dgm:clrData>
+    <dgm:dataModel>
+      <dgm:ptLst>
+        <dgm:pt modelId="0" type="doc"/>
+        <dgm:pt modelId="1">
+          <dgm:prSet phldr="1"/>
+        </dgm:pt>
+        <dgm:pt modelId="2">
+          <dgm:prSet phldr="1"/>
+        </dgm:pt>
+        <dgm:pt modelId="3">
+          <dgm:prSet phldr="1"/>
+        </dgm:pt>
+        <dgm:pt modelId="4">
+          <dgm:prSet phldr="1"/>
+        </dgm:pt>
+      </dgm:ptLst>
+      <dgm:cxnLst>
+        <dgm:cxn modelId="5" srcId="0" destId="1" srcOrd="0" destOrd="0"/>
+        <dgm:cxn modelId="6" srcId="0" destId="2" srcOrd="1" destOrd="0"/>
+        <dgm:cxn modelId="7" srcId="0" destId="3" srcOrd="2" destOrd="0"/>
+        <dgm:cxn modelId="8" srcId="0" destId="4" srcOrd="3" destOrd="0"/>
+      </dgm:cxnLst>
+      <dgm:bg/>
+      <dgm:whole/>
+    </dgm:dataModel>
+  </dgm:clrData>
+  <dgm:layoutNode name="Name0">
+    <dgm:varLst>
+      <dgm:chMax val="7"/>
+      <dgm:chPref val="7"/>
+      <dgm:dir/>
+    </dgm:varLst>
+    <dgm:alg type="composite"/>
+    <dgm:shape xmlns:r="http://schemas.openxmlformats.org/officeDocument/2006/relationships" r:blip="">
+      <dgm:adjLst/>
+    </dgm:shape>
+    <dgm:constrLst>
+      <dgm:constr type="w" for="ch" refType="h" refFor="ch" op="gte" fact="2"/>
+    </dgm:constrLst>
+    <dgm:layoutNode name="Name1">
+      <dgm:alg type="composite"/>
+      <dgm:shape xmlns:r="http://schemas.openxmlformats.org/officeDocument/2006/relationships" r:blip="">
+        <dgm:adjLst/>
+      </dgm:shape>
+      <dgm:choose name="Name2">
+        <dgm:if name="Name3" axis="ch" ptType="node" func="cnt" op="lte" val="1">
+          <dgm:constrLst>
+            <dgm:constr type="h" for="ch" forName="picture_1" refType="h"/>
+            <dgm:constr type="w" for="ch" forName="picture_1" refType="h" refFor="ch" refForName="picture_1" op="equ"/>
+            <dgm:constr type="l" for="ch" forName="picture_1"/>
+            <dgm:constr type="t" for="ch" forName="picture_1"/>
+            <dgm:constr type="w" for="ch" forName="text_1" refType="w" refFor="ch" refForName="picture_1" fact="0.64"/>
+            <dgm:constr type="h" for="ch" forName="text_1" refType="h" refFor="ch" refForName="picture_1" fact="0.33"/>
+            <dgm:constr type="l" for="ch" forName="text_1" refType="w" refFor="ch" refForName="picture_1" fact="0.18"/>
+            <dgm:constr type="t" for="ch" forName="text_1" refType="h" refFor="ch" refForName="picture_1" fact="0.531"/>
+          </dgm:constrLst>
+        </dgm:if>
+        <dgm:if name="Name4" axis="ch" ptType="node" func="cnt" op="lte" val="2">
+          <dgm:choose name="Name5">
+            <dgm:if name="Name6" func="var" arg="dir" op="equ" val="norm">
+              <dgm:constrLst>
+                <dgm:constr type="h" for="ch" forName="picture_1" refType="h"/>
+                <dgm:constr type="w" for="ch" forName="picture_1" refType="h" refFor="ch" refForName="picture_1" op="equ"/>
+                <dgm:constr type="l" for="ch" forName="picture_1"/>
+                <dgm:constr type="t" for="ch" forName="picture_1"/>
+                <dgm:constr type="w" for="ch" forName="text_1" refType="w" refFor="ch" refForName="picture_1" fact="0.64"/>
+                <dgm:constr type="h" for="ch" forName="text_1" refType="h" refFor="ch" refForName="picture_1" fact="0.33"/>
+                <dgm:constr type="l" for="ch" forName="text_1" refType="l" refFor="ch" refForName="picture_1"/>
+                <dgm:constr type="lOff" for="ch" forName="text_1" refType="w" refFor="ch" refForName="picture_1" fact="0.18"/>
+                <dgm:constr type="t" for="ch" forName="text_1" refType="h" refFor="ch" refForName="picture_1" fact="0.531"/>
+                <dgm:constr type="w" for="ch" forName="picture_2" refType="w" refFor="ch" refForName="picture_1" fact="0.5"/>
+                <dgm:constr type="h" for="ch" forName="picture_2" refType="h" refFor="ch" refForName="picture_1" fact="0.5"/>
+                <dgm:constr type="l" for="ch" forName="picture_2" refType="w" refFor="ch" refForName="picture_1" fact="1.21"/>
+                <dgm:constr type="ctrY" for="ch" forName="picture_2" refType="h" refFor="ch" refForName="picture_1" fact="0.5"/>
+                <dgm:constr type="l" for="ch" forName="line_2" refType="ctrX" refFor="ch" refForName="picture_1"/>
+                <dgm:constr type="h" for="ch" forName="line_2"/>
+                <dgm:constr type="r" for="ch" forName="line_2" refType="ctrX" refFor="ch" refForName="picture_2"/>
+                <dgm:constr type="ctrY" for="ch" forName="line_2" refType="ctrY" refFor="ch" refForName="picture_2"/>
+                <dgm:constr type="r" for="ch" forName="textparent_2" refType="w"/>
+                <dgm:constr type="h" for="ch" forName="textparent_2" refType="h" refFor="ch" refForName="picture_2"/>
+                <dgm:constr type="l" for="ch" forName="textparent_2" refType="r" refFor="ch" refForName="picture_2"/>
+                <dgm:constr type="ctrY" for="ch" forName="textparent_2" refType="ctrY" refFor="ch" refForName="picture_2"/>
+                <dgm:constr type="primFontSz" for="des" forName="text_2" val="65"/>
+              </dgm:constrLst>
+            </dgm:if>
+            <dgm:else name="Name7">
+              <dgm:constrLst>
+                <dgm:constr type="h" for="ch" forName="picture_1" refType="h"/>
+                <dgm:constr type="w" for="ch" forName="picture_1" refType="h" refFor="ch" refForName="picture_1" op="equ"/>
+                <dgm:constr type="r" for="ch" forName="picture_1" refType="w"/>
+                <dgm:constr type="t" for="ch" forName="picture_1"/>
+                <dgm:constr type="w" for="ch" forName="text_1" refType="w" refFor="ch" refForName="picture_1" fact="0.64"/>
+                <dgm:constr type="h" for="ch" forName="text_1" refType="h" refFor="ch" refForName="picture_1" fact="0.33"/>
+                <dgm:constr type="l" for="ch" forName="text_1" refType="l" refFor="ch" refForName="picture_1"/>
+                <dgm:constr type="lOff" for="ch" forName="text_1" refType="w" refFor="ch" refForName="picture_1" fact="0.18"/>
+                <dgm:constr type="t" for="ch" forName="text_1" refType="h" refFor="ch" refForName="picture_1" fact="0.531"/>
+                <dgm:constr type="w" for="ch" forName="picture_2" refType="w" refFor="ch" refForName="picture_1" fact="0.5"/>
+                <dgm:constr type="h" for="ch" forName="picture_2" refType="h" refFor="ch" refForName="picture_1" fact="0.5"/>
+                <dgm:constr type="r" for="ch" forName="picture_2" refType="w"/>
+                <dgm:constr type="rOff" for="ch" forName="picture_2" refType="w" refFor="ch" refForName="picture_1" fact="-1.21"/>
+                <dgm:constr type="ctrY" for="ch" forName="picture_2" refType="h" refFor="ch" refForName="picture_1" fact="0.5"/>
+                <dgm:constr type="r" for="ch" forName="line_2" refType="ctrX" refFor="ch" refForName="picture_1"/>
+                <dgm:constr type="h" for="ch" forName="line_2"/>
+                <dgm:constr type="l" for="ch" forName="line_2" refType="ctrX" refFor="ch" refForName="picture_2"/>
+                <dgm:constr type="ctrY" for="ch" forName="line_2" refType="ctrY" refFor="ch" refForName="picture_2"/>
+                <dgm:constr type="l" for="ch" forName="textparent_2"/>
+                <dgm:constr type="h" for="ch" forName="textparent_2" refType="h" refFor="ch" refForName="picture_2"/>
+                <dgm:constr type="r" for="ch" forName="textparent_2" refType="l" refFor="ch" refForName="picture_2"/>
+                <dgm:constr type="ctrY" for="ch" forName="textparent_2" refType="ctrY" refFor="ch" refForName="picture_2"/>
+                <dgm:constr type="primFontSz" for="des" forName="text_2" val="65"/>
+              </dgm:constrLst>
+            </dgm:else>
+          </dgm:choose>
+        </dgm:if>
+        <dgm:if name="Name8" axis="ch" ptType="node" func="cnt" op="lte" val="3">
+          <dgm:choose name="Name9">
+            <dgm:if name="Name10" func="var" arg="dir" op="equ" val="norm">
+              <dgm:constrLst>
+                <dgm:constr type="h" for="ch" forName="picture_1" refType="h"/>
+                <dgm:constr type="w" for="ch" forName="picture_1" refType="h" refFor="ch" refForName="picture_1" op="equ"/>
+                <dgm:constr type="l" for="ch" forName="picture_1"/>
+                <dgm:constr type="t" for="ch" forName="picture_1"/>
+                <dgm:constr type="w" for="ch" forName="text_1" refType="w" refFor="ch" refForName="picture_1" fact="0.64"/>
+                <dgm:constr type="h" for="ch" forName="text_1" refType="h" refFor="ch" refForName="picture_1" fact="0.33"/>
+                <dgm:constr type="l" for="ch" forName="text_1" refType="l" refFor="ch" refForName="picture_1"/>
+                <dgm:constr type="lOff" for="ch" forName="text_1" refType="w" refFor="ch" refForName="picture_1" fact="0.18"/>
+                <dgm:constr type="t" for="ch" forName="text_1" refType="h" refFor="ch" refForName="picture_1" fact="0.531"/>
+                <dgm:constr type="w" for="ch" forName="picture_2" refType="w" refFor="ch" refForName="picture_1" fact="0.375"/>
+                <dgm:constr type="h" for="ch" forName="picture_2" refType="h" refFor="ch" refForName="picture_1" fact="0.375"/>
+                <dgm:constr type="l" for="ch" forName="picture_2" refType="w" refFor="ch" refForName="picture_1" fact="1.21"/>
+                <dgm:constr type="ctrY" for="ch" forName="picture_2" refType="h" refFor="ch" refForName="picture_1" fact="0.1875"/>
+                <dgm:constr type="l" for="ch" forName="line_2" refType="ctrX" refFor="ch" refForName="picture_1"/>
+                <dgm:constr type="h" for="ch" forName="line_2"/>
+                <dgm:constr type="r" for="ch" forName="line_2" refType="ctrX" refFor="ch" refForName="picture_2"/>
+                <dgm:constr type="ctrY" for="ch" forName="line_2" refType="ctrY" refFor="ch" refForName="picture_2"/>
+                <dgm:constr type="r" for="ch" forName="textparent_2" refType="w"/>
+                <dgm:constr type="h" for="ch" forName="textparent_2" refType="h" refFor="ch" refForName="picture_2"/>
+                <dgm:constr type="l" for="ch" forName="textparent_2" refType="r" refFor="ch" refForName="picture_2"/>
+                <dgm:constr type="ctrY" for="ch" forName="textparent_2" refType="ctrY" refFor="ch" refForName="picture_2"/>
+                <dgm:constr type="primFontSz" for="des" forName="text_2" val="65"/>
+                <dgm:constr type="w" for="ch" forName="picture_3" refType="w" refFor="ch" refForName="picture_1" fact="0.375"/>
+                <dgm:constr type="h" for="ch" forName="picture_3" refType="h" refFor="ch" refForName="picture_1" fact="0.375"/>
+                <dgm:constr type="l" for="ch" forName="picture_3" refType="w" refFor="ch" refForName="picture_1" fact="1.21"/>
+                <dgm:constr type="ctrY" for="ch" forName="picture_3" refType="h" refFor="ch" refForName="picture_1" fact="0.8125"/>
+                <dgm:constr type="l" for="ch" forName="line_3" refType="ctrX" refFor="ch" refForName="picture_1"/>
+                <dgm:constr type="h" for="ch" forName="line_3"/>
+                <dgm:constr type="r" for="ch" forName="line_3" refType="ctrX" refFor="ch" refForName="picture_3"/>
+                <dgm:constr type="ctrY" for="ch" forName="line_3" refType="ctrY" refFor="ch" refForName="picture_3"/>
+                <dgm:constr type="r" for="ch" forName="textparent_3" refType="w"/>
+                <dgm:constr type="h" for="ch" forName="textparent_3" refType="h" refFor="ch" refForName="picture_3"/>
+                <dgm:constr type="l" for="ch" forName="textparent_3" refType="r" refFor="ch" refForName="picture_3"/>
+                <dgm:constr type="ctrY" for="ch" forName="textparent_3" refType="ctrY" refFor="ch" refForName="picture_3"/>
+                <dgm:constr type="primFontSz" for="des" forName="text_3" refType="primFontSz" refFor="des" refForName="text_2" op="equ"/>
+              </dgm:constrLst>
+            </dgm:if>
+            <dgm:else name="Name11">
+              <dgm:constrLst>
+                <dgm:constr type="h" for="ch" forName="picture_1" refType="h"/>
+                <dgm:constr type="w" for="ch" forName="picture_1" refType="h" refFor="ch" refForName="picture_1" op="equ"/>
+                <dgm:constr type="r" for="ch" forName="picture_1" refType="w"/>
+                <dgm:constr type="t" for="ch" forName="picture_1"/>
+                <dgm:constr type="w" for="ch" forName="text_1" refType="w" refFor="ch" refForName="picture_1" fact="0.64"/>
+                <dgm:constr type="h" for="ch" forName="text_1" refType="h" refFor="ch" refForName="picture_1" fact="0.33"/>
+                <dgm:constr type="l" for="ch" forName="text_1" refType="l" refFor="ch" refForName="picture_1"/>
+                <dgm:constr type="lOff" for="ch" forName="text_1" refType="w" refFor="ch" refForName="picture_1" fact="0.18"/>
+                <dgm:constr type="t" for="ch" forName="text_1" refType="h" refFor="ch" refForName="picture_1" fact="0.531"/>
+                <dgm:constr type="w" for="ch" forName="picture_2" refType="w" refFor="ch" refForName="picture_1" fact="0.375"/>
+                <dgm:constr type="h" for="ch" forName="picture_2" refType="h" refFor="ch" refForName="picture_1" fact="0.375"/>
+                <dgm:constr type="r" for="ch" forName="picture_2" refType="w"/>
+                <dgm:constr type="rOff" for="ch" forName="picture_2" refType="w" refFor="ch" refForName="picture_1" fact="-1.21"/>
+                <dgm:constr type="ctrY" for="ch" forName="picture_2" refType="h" refFor="ch" refForName="picture_1" fact="0.1875"/>
+                <dgm:constr type="r" for="ch" forName="line_2" refType="ctrX" refFor="ch" refForName="picture_1"/>
+                <dgm:constr type="h" for="ch" forName="line_2"/>
+                <dgm:constr type="l" for="ch" forName="line_2" refType="ctrX" refFor="ch" refForName="picture_2"/>
+                <dgm:constr type="ctrY" for="ch" forName="line_2" refType="ctrY" refFor="ch" refForName="picture_2"/>
+                <dgm:constr type="l" for="ch" forName="textparent_2"/>
+                <dgm:constr type="h" for="ch" forName="textparent_2" refType="h" refFor="ch" refForName="picture_2"/>
+                <dgm:constr type="r" for="ch" forName="textparent_2" refType="l" refFor="ch" refForName="picture_2"/>
+                <dgm:constr type="ctrY" for="ch" forName="textparent_2" refType="ctrY" refFor="ch" refForName="picture_2"/>
+                <dgm:constr type="primFontSz" for="des" forName="text_2" val="65"/>
+                <dgm:constr type="w" for="ch" forName="picture_3" refType="w" refFor="ch" refForName="picture_1" fact="0.375"/>
+                <dgm:constr type="h" for="ch" forName="picture_3" refType="h" refFor="ch" refForName="picture_1" fact="0.375"/>
+                <dgm:constr type="r" for="ch" forName="picture_3" refType="w"/>
+                <dgm:constr type="rOff" for="ch" forName="picture_3" refType="w" refFor="ch" refForName="picture_1" fact="-1.21"/>
+                <dgm:constr type="ctrY" for="ch" forName="picture_3" refType="h" refFor="ch" refForName="picture_1" fact="0.8125"/>
+                <dgm:constr type="r" for="ch" forName="line_3" refType="ctrX" refFor="ch" refForName="picture_1"/>
+                <dgm:constr type="h" for="ch" forName="line_3"/>
+                <dgm:constr type="l" for="ch" forName="line_3" refType="ctrX" refFor="ch" refForName="picture_3"/>
+                <dgm:constr type="ctrY" for="ch" forName="line_3" refType="ctrY" refFor="ch" refForName="picture_3"/>
+                <dgm:constr type="l" for="ch" forName="textparent_3"/>
+                <dgm:constr type="h" for="ch" forName="textparent_3" refType="h" refFor="ch" refForName="picture_3"/>
+                <dgm:constr type="r" for="ch" forName="textparent_3" refType="l" refFor="ch" refForName="picture_3"/>
+                <dgm:constr type="ctrY" for="ch" forName="textparent_3" refType="ctrY" refFor="ch" refForName="picture_3"/>
+                <dgm:constr type="primFontSz" for="des" forName="text_3" refType="primFontSz" refFor="des" refForName="text_2" op="equ"/>
+              </dgm:constrLst>
+            </dgm:else>
+          </dgm:choose>
+        </dgm:if>
+        <dgm:if name="Name12" axis="ch" ptType="node" func="cnt" op="lte" val="4">
+          <dgm:choose name="Name13">
+            <dgm:if name="Name14" func="var" arg="dir" op="equ" val="norm">
+              <dgm:constrLst>
+                <dgm:constr type="h" for="ch" forName="picture_1" refType="h"/>
+                <dgm:constr type="w" for="ch" forName="picture_1" refType="h" refFor="ch" refForName="picture_1" op="equ"/>
+                <dgm:constr type="l" for="ch" forName="picture_1"/>
+                <dgm:constr type="t" for="ch" forName="picture_1"/>
+                <dgm:constr type="w" for="ch" forName="text_1" refType="w" refFor="ch" refForName="picture_1" fact="0.64"/>
+                <dgm:constr type="h" for="ch" forName="text_1" refType="h" refFor="ch" refForName="picture_1" fact="0.33"/>
+                <dgm:constr type="l" for="ch" forName="text_1" refType="l" refFor="ch" refForName="picture_1"/>
+                <dgm:constr type="lOff" for="ch" forName="text_1" refType="w" refFor="ch" refForName="picture_1" fact="0.18"/>
+                <dgm:constr type="t" for="ch" forName="text_1" refType="h" refFor="ch" refForName="picture_1" fact="0.531"/>
+                <dgm:constr type="w" for="ch" forName="picture_2" refType="w" refFor="ch" refForName="picture_1" fact="0.3"/>
+                <dgm:constr type="h" for="ch" forName="picture_2" refType="h" refFor="ch" refForName="picture_1" fact="0.3"/>
+                <dgm:constr type="l" for="ch" forName="picture_2" refType="w" refFor="ch" refForName="picture_1" fact="1.354"/>
+                <dgm:constr type="ctrY" for="ch" forName="picture_2" refType="h" refFor="ch" refForName="picture_1" fact="0.15"/>
+                <dgm:constr type="l" for="ch" forName="line_2" refType="ctrX" refFor="ch" refForName="picture_1"/>
+                <dgm:constr type="h" for="ch" forName="line_2"/>
+                <dgm:constr type="r" for="ch" forName="line_2" refType="ctrX" refFor="ch" refForName="picture_2"/>
+                <dgm:constr type="ctrY" for="ch" forName="line_2" refType="ctrY" refFor="ch" refForName="picture_2"/>
+                <dgm:constr type="r" for="ch" forName="textparent_2" refType="w"/>
+                <dgm:constr type="h" for="ch" forName="textparent_2" refType="h" refFor="ch" refForName="picture_2"/>
+                <dgm:constr type="l" for="ch" forName="textparent_2" refType="r" refFor="ch" refForName="picture_2"/>
+                <dgm:constr type="ctrY" for="ch" forName="textparent_2" refType="ctrY" refFor="ch" refForName="picture_2"/>
+                <dgm:constr type="primFontSz" for="des" forName="text_2" val="65"/>
+                <dgm:constr type="w" for="ch" forName="picture_3" refType="w" refFor="ch" refForName="picture_1" fact="0.3"/>
+                <dgm:constr type="h" for="ch" forName="picture_3" refType="h" refFor="ch" refForName="picture_1" fact="0.3"/>
+                <dgm:constr type="l" for="ch" forName="picture_3" refType="w" refFor="ch" refForName="picture_1" fact="1.21"/>
+                <dgm:constr type="ctrY" for="ch" forName="picture_3" refType="h" refFor="ch" refForName="picture_1" fact="0.5"/>
+                <dgm:constr type="l" for="ch" forName="line_3" refType="ctrX" refFor="ch" refForName="picture_1"/>
+                <dgm:constr type="h" for="ch" forName="line_3"/>
+                <dgm:constr type="r" for="ch" forName="line_3" refType="ctrX" refFor="ch" refForName="picture_3"/>
+                <dgm:constr type="ctrY" for="ch" forName="line_3" refType="ctrY" refFor="ch" refForName="picture_3"/>
+                <dgm:constr type="r" for="ch" forName="textparent_3" refType="w"/>
+                <dgm:constr type="h" for="ch" forName="textparent_3" refType="h" refFor="ch" refForName="picture_3"/>
+                <dgm:constr type="l" for="ch" forName="textparent_3" refType="r" refFor="ch" refForName="picture_3"/>
+                <dgm:constr type="ctrY" for="ch" forName="textparent_3" refType="ctrY" refFor="ch" refForName="picture_3"/>
+                <dgm:constr type="primFontSz" for="des" forName="text_3" refType="primFontSz" refFor="des" refForName="text_2" op="equ"/>
+                <dgm:constr type="w" for="ch" forName="picture_4" refType="w" refFor="ch" refForName="picture_1" fact="0.3"/>
+                <dgm:constr type="h" for="ch" forName="picture_4" refType="h" refFor="ch" refForName="picture_1" fact="0.3"/>
+                <dgm:constr type="l" for="ch" forName="picture_4" refType="w" refFor="ch" refForName="picture_1" fact="1.354"/>
+                <dgm:constr type="ctrY" for="ch" forName="picture_4" refType="h" refFor="ch" refForName="picture_1" fact="0.85"/>
+                <dgm:constr type="l" for="ch" forName="line_4" refType="ctrX" refFor="ch" refForName="picture_1"/>
+                <dgm:constr type="h" for="ch" forName="line_4"/>
+                <dgm:constr type="r" for="ch" forName="line_4" refType="ctrX" refFor="ch" refForName="picture_4"/>
+                <dgm:constr type="ctrY" for="ch" forName="line_4" refType="ctrY" refFor="ch" refForName="picture_4"/>
+                <dgm:constr type="r" for="ch" forName="textparent_4" refType="w"/>
+                <dgm:constr type="h" for="ch" forName="textparent_4" refType="h" refFor="ch" refForName="picture_4"/>
+                <dgm:constr type="l" for="ch" forName="textparent_4" refType="r" refFor="ch" refForName="picture_4"/>
+                <dgm:constr type="ctrY" for="ch" forName="textparent_4" refType="ctrY" refFor="ch" refForName="picture_4"/>
+                <dgm:constr type="primFontSz" for="des" forName="text_4" refType="primFontSz" refFor="des" refForName="text_2" op="equ"/>
+              </dgm:constrLst>
+            </dgm:if>
+            <dgm:else name="Name15">
+              <dgm:constrLst>
+                <dgm:constr type="h" for="ch" forName="picture_1" refType="h"/>
+                <dgm:constr type="w" for="ch" forName="picture_1" refType="h" refFor="ch" refForName="picture_1" op="equ"/>
+                <dgm:constr type="r" for="ch" forName="picture_1" refType="w"/>
+                <dgm:constr type="t" for="ch" forName="picture_1"/>
+                <dgm:constr type="w" for="ch" forName="text_1" refType="w" refFor="ch" refForName="picture_1" fact="0.64"/>
+                <dgm:constr type="h" for="ch" forName="text_1" refType="h" refFor="ch" refForName="picture_1" fact="0.33"/>
+                <dgm:constr type="l" for="ch" forName="text_1" refType="l" refFor="ch" refForName="picture_1"/>
+                <dgm:constr type="lOff" for="ch" forName="text_1" refType="w" refFor="ch" refForName="picture_1" fact="0.18"/>
+                <dgm:constr type="t" for="ch" forName="text_1" refType="h" refFor="ch" refForName="picture_1" fact="0.531"/>
+                <dgm:constr type="w" for="ch" forName="picture_2" refType="w" refFor="ch" refForName="picture_1" fact="0.3"/>
+                <dgm:constr type="h" for="ch" forName="picture_2" refType="h" refFor="ch" refForName="picture_1" fact="0.3"/>
+                <dgm:constr type="r" for="ch" forName="picture_2" refType="w"/>
+                <dgm:constr type="rOff" for="ch" forName="picture_2" refType="w" refFor="ch" refForName="picture_1" fact="-1.354"/>
+                <dgm:constr type="ctrY" for="ch" forName="picture_2" refType="h" refFor="ch" refForName="picture_1" fact="0.15"/>
+                <dgm:constr type="r" for="ch" forName="line_2" refType="ctrX" refFor="ch" refForName="picture_1"/>
+                <dgm:constr type="h" for="ch" forName="line_2"/>
+                <dgm:constr type="l" for="ch" forName="line_2" refType="ctrX" refFor="ch" refForName="picture_2"/>
+                <dgm:constr type="ctrY" for="ch" forName="line_2" refType="ctrY" refFor="ch" refForName="picture_2"/>
+                <dgm:constr type="l" for="ch" forName="textparent_2"/>
+                <dgm:constr type="h" for="ch" forName="textparent_2" refType="h" refFor="ch" refForName="picture_2"/>
+                <dgm:constr type="r" for="ch" forName="textparent_2" refType="l" refFor="ch" refForName="picture_2"/>
+                <dgm:constr type="ctrY" for="ch" forName="textparent_2" refType="ctrY" refFor="ch" refForName="picture_2"/>
+                <dgm:constr type="primFontSz" for="des" forName="text_2" val="65"/>
+                <dgm:constr type="w" for="ch" forName="picture_3" refType="w" refFor="ch" refForName="picture_1" fact="0.3"/>
+                <dgm:constr type="h" for="ch" forName="picture_3" refType="h" refFor="ch" refForName="picture_1" fact="0.3"/>
+                <dgm:constr type="r" for="ch" forName="picture_3" refType="w"/>
+                <dgm:constr type="rOff" for="ch" forName="picture_3" refType="w" refFor="ch" refForName="picture_1" fact="-1.21"/>
+                <dgm:constr type="ctrY" for="ch" forName="picture_3" refType="h" refFor="ch" refForName="picture_1" fact="0.5"/>
+                <dgm:constr type="r" for="ch" forName="line_3" refType="ctrX" refFor="ch" refForName="picture_1"/>
+                <dgm:constr type="h" for="ch" forName="line_3"/>
+                <dgm:constr type="l" for="ch" forName="line_3" refType="ctrX" refFor="ch" refForName="picture_3"/>
+                <dgm:constr type="ctrY" for="ch" forName="line_3" refType="ctrY" refFor="ch" refForName="picture_3"/>
+                <dgm:constr type="l" for="ch" forName="textparent_3"/>
+                <dgm:constr type="h" for="ch" forName="textparent_3" refType="h" refFor="ch" refForName="picture_3"/>
+                <dgm:constr type="r" for="ch" forName="textparent_3" refType="l" refFor="ch" refForName="picture_3"/>
+                <dgm:constr type="ctrY" for="ch" forName="textparent_3" refType="ctrY" refFor="ch" refForName="picture_3"/>
+                <dgm:constr type="primFontSz" for="des" forName="text_3" refType="primFontSz" refFor="des" refForName="text_2" op="equ"/>
+                <dgm:constr type="w" for="ch" forName="picture_4" refType="w" refFor="ch" refForName="picture_1" fact="0.3"/>
+                <dgm:constr type="h" for="ch" forName="picture_4" refType="h" refFor="ch" refForName="picture_1" fact="0.3"/>
+                <dgm:constr type="r" for="ch" forName="picture_4" refType="w"/>
+                <dgm:constr type="rOff" for="ch" forName="picture_4" refType="w" refFor="ch" refForName="picture_1" fact="-1.354"/>
+                <dgm:constr type="ctrY" for="ch" forName="picture_4" refType="h" refFor="ch" refForName="picture_1" fact="0.85"/>
+                <dgm:constr type="r" for="ch" forName="line_4" refType="ctrX" refFor="ch" refForName="picture_1"/>
+                <dgm:constr type="h" for="ch" forName="line_4"/>
+                <dgm:constr type="l" for="ch" forName="line_4" refType="ctrX" refFor="ch" refForName="picture_4"/>
+                <dgm:constr type="ctrY" for="ch" forName="line_4" refType="ctrY" refFor="ch" refForName="picture_4"/>
+                <dgm:constr type="l" for="ch" forName="textparent_4"/>
+                <dgm:constr type="h" for="ch" forName="textparent_4" refType="h" refFor="ch" refForName="picture_4"/>
+                <dgm:constr type="r" for="ch" forName="textparent_4" refType="l" refFor="ch" refForName="picture_4"/>
+                <dgm:constr type="ctrY" for="ch" forName="textparent_4" refType="ctrY" refFor="ch" refForName="picture_4"/>
+                <dgm:constr type="primFontSz" for="des" forName="text_4" refType="primFontSz" refFor="des" refForName="text_2" op="equ"/>
+              </dgm:constrLst>
+            </dgm:else>
+          </dgm:choose>
+        </dgm:if>
+        <dgm:if name="Name16" axis="ch" ptType="node" func="cnt" op="lte" val="5">
+          <dgm:choose name="Name17">
+            <dgm:if name="Name18" func="var" arg="dir" op="equ" val="norm">
+              <dgm:constrLst>
+                <dgm:constr type="h" for="ch" forName="picture_1" refType="h"/>
+                <dgm:constr type="w" for="ch" forName="picture_1" refType="h" refFor="ch" refForName="picture_1" op="equ"/>
+                <dgm:constr type="l" for="ch" forName="picture_1"/>
+                <dgm:constr type="t" for="ch" forName="picture_1"/>
+                <dgm:constr type="w" for="ch" forName="text_1" refType="w" refFor="ch" refForName="picture_1" fact="0.64"/>
+                <dgm:constr type="h" for="ch" forName="text_1" refType="h" refFor="ch" refForName="picture_1" fact="0.33"/>
+                <dgm:constr type="l" for="ch" forName="text_1" refType="l" refFor="ch" refForName="picture_1"/>
+                <dgm:constr type="lOff" for="ch" forName="text_1" refType="w" refFor="ch" refForName="picture_1" fact="0.18"/>
+                <dgm:constr type="t" for="ch" forName="text_1" refType="h" refFor="ch" refForName="picture_1" fact="0.531"/>
+                <dgm:constr type="w" for="ch" forName="picture_2" refType="w" refFor="ch" refForName="picture_1" fact="0.22"/>
+                <dgm:constr type="h" for="ch" forName="picture_2" refType="h" refFor="ch" refForName="picture_1" fact="0.22"/>
+                <dgm:constr type="l" for="ch" forName="picture_2" refType="w" refFor="ch" refForName="picture_1" fact="1.375"/>
+                <dgm:constr type="ctrY" for="ch" forName="picture_2" refType="h" refFor="ch" refForName="picture_1" fact="0.11"/>
+                <dgm:constr type="l" for="ch" forName="line_2" refType="ctrX" refFor="ch" refForName="picture_1"/>
+                <dgm:constr type="h" for="ch" forName="line_2"/>
+                <dgm:constr type="r" for="ch" forName="line_2" refType="ctrX" refFor="ch" refForName="picture_2"/>
+                <dgm:constr type="ctrY" for="ch" forName="line_2" refType="ctrY" refFor="ch" refForName="picture_2"/>
+                <dgm:constr type="r" for="ch" forName="textparent_2" refType="w"/>
+                <dgm:constr type="h" for="ch" forName="textparent_2" refType="h" refFor="ch" refForName="picture_2"/>
+                <dgm:constr type="l" for="ch" forName="textparent_2" refType="r" refFor="ch" refForName="picture_2"/>
+                <dgm:constr type="ctrY" for="ch" forName="textparent_2" refType="ctrY" refFor="ch" refForName="picture_2"/>
+                <dgm:constr type="primFontSz" for="des" forName="text_2" val="65"/>
+                <dgm:constr type="w" for="ch" forName="picture_3" refType="w" refFor="ch" refForName="picture_1" fact="0.22"/>
+                <dgm:constr type="h" for="ch" forName="picture_3" refType="h" refFor="ch" refForName="picture_1" fact="0.22"/>
+                <dgm:constr type="l" for="ch" forName="picture_3" refType="w" refFor="ch" refForName="picture_1" fact="1.21"/>
+                <dgm:constr type="ctrY" for="ch" forName="picture_3" refType="h" refFor="ch" refForName="picture_1" fact="0.353"/>
+                <dgm:constr type="l" for="ch" forName="line_3" refType="ctrX" refFor="ch" refForName="picture_1"/>
+                <dgm:constr type="h" for="ch" forName="line_3"/>
+                <dgm:constr type="r" for="ch" forName="line_3" refType="ctrX" refFor="ch" refForName="picture_3"/>
+                <dgm:constr type="ctrY" for="ch" forName="line_3" refType="ctrY" refFor="ch" refForName="picture_3"/>
+                <dgm:constr type="r" for="ch" forName="textparent_3" refType="w"/>
+                <dgm:constr type="h" for="ch" forName="textparent_3" refType="h" refFor="ch" refForName="picture_3"/>
+                <dgm:constr type="l" for="ch" forName="textparent_3" refType="r" refFor="ch" refForName="picture_3"/>
+                <dgm:constr type="ctrY" for="ch" forName="textparent_3" refType="ctrY" refFor="ch" refForName="picture_3"/>
+                <dgm:constr type="primFontSz" for="des" forName="text_3" refType="primFontSz" refFor="des" refForName="text_2" op="equ"/>
+                <dgm:constr type="w" for="ch" forName="picture_4" refType="w" refFor="ch" refForName="picture_1" fact="0.22"/>
+                <dgm:constr type="h" for="ch" forName="picture_4" refType="h" refFor="ch" refForName="picture_1" fact="0.22"/>
+                <dgm:constr type="l" for="ch" forName="picture_4" refType="w" refFor="ch" refForName="picture_1" fact="1.21"/>
+                <dgm:constr type="ctrY" for="ch" forName="picture_4" refType="h" refFor="ch" refForName="picture_1" fact="0.647"/>
+                <dgm:constr type="l" for="ch" forName="line_4" refType="ctrX" refFor="ch" refForName="picture_1"/>
+                <dgm:constr type="h" for="ch" forName="line_4"/>
+                <dgm:constr type="r" for="ch" forName="line_4" refType="ctrX" refFor="ch" refForName="picture_4"/>
+                <dgm:constr type="ctrY" for="ch" forName="line_4" refType="ctrY" refFor="ch" refForName="picture_4"/>
+                <dgm:constr type="r" for="ch" forName="textparent_4" refType="w"/>
+                <dgm:constr type="h" for="ch" forName="textparent_4" refType="h" refFor="ch" refForName="picture_4"/>
+                <dgm:constr type="l" for="ch" forName="textparent_4" refType="r" refFor="ch" refForName="picture_4"/>
+                <dgm:constr type="ctrY" for="ch" forName="textparent_4" refType="ctrY" refFor="ch" refForName="picture_4"/>
+                <dgm:constr type="primFontSz" for="des" forName="text_4" refType="primFontSz" refFor="des" refForName="text_2" op="equ"/>
+                <dgm:constr type="w" for="ch" forName="picture_5" refType="w" refFor="ch" refForName="picture_1" fact="0.22"/>
+                <dgm:constr type="h" for="ch" forName="picture_5" refType="h" refFor="ch" refForName="picture_1" fact="0.22"/>
+                <dgm:constr type="l" for="ch" forName="picture_5" refType="w" refFor="ch" refForName="picture_1" fact="1.375"/>
+                <dgm:constr type="ctrY" for="ch" forName="picture_5" refType="h" refFor="ch" refForName="picture_1" fact="0.89"/>
+                <dgm:constr type="l" for="ch" forName="line_5" refType="ctrX" refFor="ch" refForName="picture_1"/>
+                <dgm:constr type="h" for="ch" forName="line_5"/>
+                <dgm:constr type="r" for="ch" forName="line_5" refType="ctrX" refFor="ch" refForName="picture_5"/>
+                <dgm:constr type="ctrY" for="ch" forName="line_5" refType="ctrY" refFor="ch" refForName="picture_5"/>
+                <dgm:constr type="r" for="ch" forName="textparent_5" refType="w"/>
+                <dgm:constr type="h" for="ch" forName="textparent_5" refType="h" refFor="ch" refForName="picture_5"/>
+                <dgm:constr type="l" for="ch" forName="textparent_5" refType="r" refFor="ch" refForName="picture_5"/>
+                <dgm:constr type="ctrY" for="ch" forName="textparent_5" refType="ctrY" refFor="ch" refForName="picture_5"/>
+                <dgm:constr type="primFontSz" for="des" forName="text_5" refType="primFontSz" refFor="des" refForName="text_2" op="equ"/>
+              </dgm:constrLst>
+            </dgm:if>
+            <dgm:else name="Name19">
+              <dgm:constrLst>
+                <dgm:constr type="h" for="ch" forName="picture_1" refType="h"/>
+                <dgm:constr type="w" for="ch" forName="picture_1" refType="h" refFor="ch" refForName="picture_1" op="equ"/>
+                <dgm:constr type="r" for="ch" forName="picture_1" refType="w"/>
+                <dgm:constr type="t" for="ch" forName="picture_1"/>
+                <dgm:constr type="w" for="ch" forName="text_1" refType="w" refFor="ch" refForName="picture_1" fact="0.64"/>
+                <dgm:constr type="h" for="ch" forName="text_1" refType="h" refFor="ch" refForName="picture_1" fact="0.33"/>
+                <dgm:constr type="l" for="ch" forName="text_1" refType="l" refFor="ch" refForName="picture_1"/>
+                <dgm:constr type="lOff" for="ch" forName="text_1" refType="w" refFor="ch" refForName="picture_1" fact="0.18"/>
+                <dgm:constr type="t" for="ch" forName="text_1" refType="h" refFor="ch" refForName="picture_1" fact="0.531"/>
+                <dgm:constr type="w" for="ch" forName="picture_2" refType="w" refFor="ch" refForName="picture_1" fact="0.22"/>
+                <dgm:constr type="h" for="ch" forName="picture_2" refType="h" refFor="ch" refForName="picture_1" fact="0.22"/>
+                <dgm:constr type="r" for="ch" forName="picture_2" refType="w"/>
+                <dgm:constr type="rOff" for="ch" forName="picture_2" refType="w" refFor="ch" refForName="picture_1" fact="-1.375"/>
+                <dgm:constr type="ctrY" for="ch" forName="picture_2" refType="h" refFor="ch" refForName="picture_1" fact="0.11"/>
+                <dgm:constr type="r" for="ch" forName="line_2" refType="ctrX" refFor="ch" refForName="picture_1"/>
+                <dgm:constr type="h" for="ch" forName="line_2"/>
+                <dgm:constr type="l" for="ch" forName="line_2" refType="ctrX" refFor="ch" refForName="picture_2"/>
+                <dgm:constr type="ctrY" for="ch" forName="line_2" refType="ctrY" refFor="ch" refForName="picture_2"/>
+                <dgm:constr type="l" for="ch" forName="textparent_2"/>
+                <dgm:constr type="h" for="ch" forName="textparent_2" refType="h" refFor="ch" refForName="picture_2"/>
+                <dgm:constr type="r" for="ch" forName="textparent_2" refType="l" refFor="ch" refForName="picture_2"/>
+                <dgm:constr type="ctrY" for="ch" forName="textparent_2" refType="ctrY" refFor="ch" refForName="picture_2"/>
+                <dgm:constr type="primFontSz" for="des" forName="text_2" val="65"/>
+                <dgm:constr type="w" for="ch" forName="picture_3" refType="w" refFor="ch" refForName="picture_1" fact="0.22"/>
+                <dgm:constr type="h" for="ch" forName="picture_3" refType="h" refFor="ch" refForName="picture_1" fact="0.22"/>
+                <dgm:constr type="r" for="ch" forName="picture_3" refType="w"/>
+                <dgm:constr type="rOff" for="ch" forName="picture_3" refType="w" refFor="ch" refForName="picture_1" fact="-1.21"/>
+                <dgm:constr type="ctrY" for="ch" forName="picture_3" refType="h" refFor="ch" refForName="picture_1" fact="0.353"/>
+                <dgm:constr type="r" for="ch" forName="line_3" refType="ctrX" refFor="ch" refForName="picture_1"/>
+                <dgm:constr type="h" for="ch" forName="line_3"/>
+                <dgm:constr type="l" for="ch" forName="line_3" refType="ctrX" refFor="ch" refForName="picture_3"/>
+                <dgm:constr type="ctrY" for="ch" forName="line_3" refType="ctrY" refFor="ch" refForName="picture_3"/>
+                <dgm:constr type="l" for="ch" forName="textparent_3"/>
+                <dgm:constr type="h" for="ch" forName="textparent_3" refType="h" refFor="ch" refForName="picture_3"/>
+                <dgm:constr type="r" for="ch" forName="textparent_3" refType="l" refFor="ch" refForName="picture_3"/>
+                <dgm:constr type="ctrY" for="ch" forName="textparent_3" refType="ctrY" refFor="ch" refForName="picture_3"/>
+                <dgm:constr type="primFontSz" for="des" forName="text_3" refType="primFontSz" refFor="des" refForName="text_2" op="equ"/>
+                <dgm:constr type="w" for="ch" forName="picture_4" refType="w" refFor="ch" refForName="picture_1" fact="0.22"/>
+                <dgm:constr type="h" for="ch" forName="picture_4" refType="h" refFor="ch" refForName="picture_1" fact="0.22"/>
+                <dgm:constr type="r" for="ch" forName="picture_4" refType="w"/>
+                <dgm:constr type="rOff" for="ch" forName="picture_4" refType="w" refFor="ch" refForName="picture_1" fact="-1.21"/>
+                <dgm:constr type="ctrY" for="ch" forName="picture_4" refType="h" refFor="ch" refForName="picture_1" fact="0.647"/>
+                <dgm:constr type="r" for="ch" forName="line_4" refType="ctrX" refFor="ch" refForName="picture_1"/>
+                <dgm:constr type="h" for="ch" forName="line_4"/>
+                <dgm:constr type="l" for="ch" forName="line_4" refType="ctrX" refFor="ch" refForName="picture_4"/>
+                <dgm:constr type="ctrY" for="ch" forName="line_4" refType="ctrY" refFor="ch" refForName="picture_4"/>
+                <dgm:constr type="l" for="ch" forName="textparent_4"/>
+                <dgm:constr type="h" for="ch" forName="textparent_4" refType="h" refFor="ch" refForName="picture_4"/>
+                <dgm:constr type="r" for="ch" forName="textparent_4" refType="l" refFor="ch" refForName="picture_4"/>
+                <dgm:constr type="ctrY" for="ch" forName="textparent_4" refType="ctrY" refFor="ch" refForName="picture_4"/>
+                <dgm:constr type="primFontSz" for="des" forName="text_4" refType="primFontSz" refFor="des" refForName="text_2" op="equ"/>
+                <dgm:constr type="w" for="ch" forName="picture_5" refType="w" refFor="ch" refForName="picture_1" fact="0.22"/>
+                <dgm:constr type="h" for="ch" forName="picture_5" refType="h" refFor="ch" refForName="picture_1" fact="0.22"/>
+                <dgm:constr type="r" for="ch" forName="picture_5" refType="w"/>
+                <dgm:constr type="rOff" for="ch" forName="picture_5" refType="w" refFor="ch" refForName="picture_1" fact="-1.375"/>
+                <dgm:constr type="ctrY" for="ch" forName="picture_5" refType="h" refFor="ch" refForName="picture_1" fact="0.89"/>
+                <dgm:constr type="r" for="ch" forName="line_5" refType="ctrX" refFor="ch" refForName="picture_1"/>
+                <dgm:constr type="h" for="ch" forName="line_5"/>
+                <dgm:constr type="l" for="ch" forName="line_5" refType="ctrX" refFor="ch" refForName="picture_5"/>
+                <dgm:constr type="ctrY" for="ch" forName="line_5" refType="ctrY" refFor="ch" refForName="picture_5"/>
+                <dgm:constr type="l" for="ch" forName="textparent_5"/>
+                <dgm:constr type="h" for="ch" forName="textparent_5" refType="h" refFor="ch" refForName="picture_5"/>
+                <dgm:constr type="r" for="ch" forName="textparent_5" refType="l" refFor="ch" refForName="picture_5"/>
+                <dgm:constr type="ctrY" for="ch" forName="textparent_5" refType="ctrY" refFor="ch" refForName="picture_5"/>
+                <dgm:constr type="primFontSz" for="des" forName="text_5" refType="primFontSz" refFor="des" refForName="text_2" op="equ"/>
+              </dgm:constrLst>
+            </dgm:else>
+          </dgm:choose>
+        </dgm:if>
+        <dgm:if name="Name20" axis="ch" ptType="node" func="cnt" op="lte" val="6">
+          <dgm:choose name="Name21">
+            <dgm:if name="Name22" func="var" arg="dir" op="equ" val="norm">
+              <dgm:constrLst>
+                <dgm:constr type="h" for="ch" forName="picture_1" refType="h"/>
+                <dgm:constr type="w" for="ch" forName="picture_1" refType="h" refFor="ch" refForName="picture_1" op="equ"/>
+                <dgm:constr type="l" for="ch" forName="picture_1"/>
+                <dgm:constr type="t" for="ch" forName="picture_1"/>
+                <dgm:constr type="w" for="ch" forName="text_1" refType="w" refFor="ch" refForName="picture_1" fact="0.64"/>
+                <dgm:constr type="h" for="ch" forName="text_1" refType="h" refFor="ch" refForName="picture_1" fact="0.33"/>
+                <dgm:constr type="l" for="ch" forName="text_1" refType="l" refFor="ch" refForName="picture_1"/>
+                <dgm:constr type="lOff" for="ch" forName="text_1" refType="w" refFor="ch" refForName="picture_1" fact="0.18"/>
+                <dgm:constr type="t" for="ch" forName="text_1" refType="h" refFor="ch" refForName="picture_1" fact="0.531"/>
+                <dgm:constr type="w" for="ch" forName="picture_2" refType="w" refFor="ch" refForName="picture_1" fact="0.18"/>
+                <dgm:constr type="h" for="ch" forName="picture_2" refType="h" refFor="ch" refForName="picture_1" fact="0.18"/>
+                <dgm:constr type="l" for="ch" forName="picture_2" refType="w" refFor="ch" refForName="picture_1" fact="1.4238"/>
+                <dgm:constr type="ctrY" for="ch" forName="picture_2" refType="h" refFor="ch" refForName="picture_1" fact="0.09"/>
+                <dgm:constr type="l" for="ch" forName="line_2" refType="ctrX" refFor="ch" refForName="picture_1"/>
+                <dgm:constr type="h" for="ch" forName="line_2"/>
+                <dgm:constr type="r" for="ch" forName="line_2" refType="ctrX" refFor="ch" refForName="picture_2"/>
+                <dgm:constr type="ctrY" for="ch" forName="line_2" refType="ctrY" refFor="ch" refForName="picture_2"/>
+                <dgm:constr type="r" for="ch" forName="textparent_2" refType="w"/>
+                <dgm:constr type="h" for="ch" forName="textparent_2" refType="h" refFor="ch" refForName="picture_2"/>
+                <dgm:constr type="l" for="ch" forName="textparent_2" refType="r" refFor="ch" refForName="picture_2"/>
+                <dgm:constr type="ctrY" for="ch" forName="textparent_2" refType="ctrY" refFor="ch" refForName="picture_2"/>
+                <dgm:constr type="primFontSz" for="des" forName="text_2" val="65"/>
+                <dgm:constr type="w" for="ch" forName="picture_3" refType="w" refFor="ch" refForName="picture_1" fact="0.18"/>
+                <dgm:constr type="h" for="ch" forName="picture_3" refType="h" refFor="ch" refForName="picture_1" fact="0.18"/>
+                <dgm:constr type="l" for="ch" forName="picture_3" refType="w" refFor="ch" refForName="picture_1" fact="1.2667"/>
+                <dgm:constr type="ctrY" for="ch" forName="picture_3" refType="h" refFor="ch" refForName="picture_1" fact="0.261"/>
+                <dgm:constr type="l" for="ch" forName="line_3" refType="ctrX" refFor="ch" refForName="picture_1"/>
+                <dgm:constr type="h" for="ch" forName="line_3"/>
+                <dgm:constr type="r" for="ch" forName="line_3" refType="ctrX" refFor="ch" refForName="picture_3"/>
+                <dgm:constr type="ctrY" for="ch" forName="line_3" refType="ctrY" refFor="ch" refForName="picture_3"/>
+                <dgm:constr type="r" for="ch" forName="textparent_3" refType="w"/>
+                <dgm:constr type="h" for="ch" forName="textparent_3" refType="h" refFor="ch" refForName="picture_3"/>
+                <dgm:constr type="l" for="ch" forName="textparent_3" refType="r" refFor="ch" refForName="picture_3"/>
+                <dgm:constr type="ctrY" for="ch" forName="textparent_3" refType="ctrY" refFor="ch" refForName="picture_3"/>
+                <dgm:constr type="primFontSz" for="des" forName="text_3" refType="primFontSz" refFor="des" refForName="text_2" op="equ"/>
+                <dgm:constr type="w" for="ch" forName="picture_4" refType="w" refFor="ch" refForName="picture_1" fact="0.18"/>
+                <dgm:constr type="h" for="ch" forName="picture_4" refType="h" refFor="ch" refForName="picture_1" fact="0.18"/>
+                <dgm:constr type="l" for="ch" forName="picture_4" refType="w" refFor="ch" refForName="picture_1" fact="1.21"/>
+                <dgm:constr type="ctrY" for="ch" forName="picture_4" refType="h" refFor="ch" refForName="picture_1" fact="0.5"/>
+                <dgm:constr type="l" for="ch" forName="line_4" refType="ctrX" refFor="ch" refForName="picture_1"/>
+                <dgm:constr type="h" for="ch" forName="line_4"/>
+                <dgm:constr type="r" for="ch" forName="line_4" refType="ctrX" refFor="ch" refForName="picture_4"/>
+                <dgm:constr type="ctrY" for="ch" forName="line_4" refType="ctrY" refFor="ch" refForName="picture_4"/>
+                <dgm:constr type="r" for="ch" forName="textparent_4" refType="w"/>
+                <dgm:constr type="h" for="ch" forName="textparent_4" refType="h" refFor="ch" refForName="picture_4"/>
+                <dgm:constr type="l" for="ch" forName="textparent_4" refType="r" refFor="ch" refForName="picture_4"/>
+                <dgm:constr type="ctrY" for="ch" forName="textparent_4" refType="ctrY" refFor="ch" refForName="picture_4"/>
+                <dgm:constr type="primFontSz" for="des" forName="text_4" refType="primFontSz" refFor="des" refForName="text_2" op="equ"/>
+                <dgm:constr type="w" for="ch" forName="picture_5" refType="w" refFor="ch" refForName="picture_1" fact="0.18"/>
+                <dgm:constr type="h" for="ch" forName="picture_5" refType="h" refFor="ch" refForName="picture_1" fact="0.18"/>
+                <dgm:constr type="l" for="ch" forName="picture_5" refType="w" refFor="ch" refForName="picture_1" fact="1.2667"/>
+                <dgm:constr type="ctrY" for="ch" forName="picture_5" refType="h" refFor="ch" refForName="picture_1" fact="0.739"/>
+                <dgm:constr type="l" for="ch" forName="line_5" refType="ctrX" refFor="ch" refForName="picture_1"/>
+                <dgm:constr type="h" for="ch" forName="line_5"/>
+                <dgm:constr type="r" for="ch" forName="line_5" refType="ctrX" refFor="ch" refForName="picture_5"/>
+                <dgm:constr type="ctrY" for="ch" forName="line_5" refType="ctrY" refFor="ch" refForName="picture_5"/>
+                <dgm:constr type="r" for="ch" forName="textparent_5" refType="w"/>
+                <dgm:constr type="h" for="ch" forName="textparent_5" refType="h" refFor="ch" refForName="picture_5"/>
+                <dgm:constr type="l" for="ch" forName="textparent_5" refType="r" refFor="ch" refForName="picture_5"/>
+                <dgm:constr type="ctrY" for="ch" forName="textparent_5" refType="ctrY" refFor="ch" refForName="picture_5"/>
+                <dgm:constr type="primFontSz" for="des" forName="text_5" refType="primFontSz" refFor="des" refForName="text_2" op="equ"/>
+                <dgm:constr type="w" for="ch" forName="picture_6" refType="w" refFor="ch" refForName="picture_1" fact="0.18"/>
+                <dgm:constr type="h" for="ch" forName="picture_6" refType="h" refFor="ch" refForName="picture_1" fact="0.18"/>
+                <dgm:constr type="l" for="ch" forName="picture_6" refType="w" refFor="ch" refForName="picture_1" fact="1.4238"/>
+                <dgm:constr type="ctrY" for="ch" forName="picture_6" refType="h" refFor="ch" refForName="picture_1" fact="0.91"/>
+                <dgm:constr type="l" for="ch" forName="line_6" refType="ctrX" refFor="ch" refForName="picture_1"/>
+                <dgm:constr type="h" for="ch" forName="line_6"/>
+                <dgm:constr type="r" for="ch" forName="line_6" refType="ctrX" refFor="ch" refForName="picture_6"/>
+                <dgm:constr type="ctrY" for="ch" forName="line_6" refType="ctrY" refFor="ch" refForName="picture_6"/>
+                <dgm:constr type="r" for="ch" forName="textparent_6" refType="w"/>
+                <dgm:constr type="h" for="ch" forName="textparent_6" refType="h" refFor="ch" refForName="picture_6"/>
+                <dgm:constr type="l" for="ch" forName="textparent_6" refType="r" refFor="ch" refForName="picture_6"/>
+                <dgm:constr type="ctrY" for="ch" forName="textparent_6" refType="ctrY" refFor="ch" refForName="picture_6"/>
+                <dgm:constr type="primFontSz" for="des" forName="text_6" refType="primFontSz" refFor="des" refForName="text_2" op="equ"/>
+              </dgm:constrLst>
+            </dgm:if>
+            <dgm:else name="Name23">
+              <dgm:constrLst>
+                <dgm:constr type="h" for="ch" forName="picture_1" refType="h"/>
+                <dgm:constr type="w" for="ch" forName="picture_1" refType="h" refFor="ch" refForName="picture_1" op="equ"/>
+                <dgm:constr type="r" for="ch" forName="picture_1" refType="w"/>
+                <dgm:constr type="t" for="ch" forName="picture_1"/>
+                <dgm:constr type="w" for="ch" forName="text_1" refType="w" refFor="ch" refForName="picture_1" fact="0.64"/>
+                <dgm:constr type="h" for="ch" forName="text_1" refType="h" refFor="ch" refForName="picture_1" fact="0.33"/>
+                <dgm:constr type="l" for="ch" forName="text_1" refType="l" refFor="ch" refForName="picture_1"/>
+                <dgm:constr type="lOff" for="ch" forName="text_1" refType="w" refFor="ch" refForName="picture_1" fact="0.18"/>
+                <dgm:constr type="t" for="ch" forName="text_1" refType="h" refFor="ch" refForName="picture_1" fact="0.531"/>
+                <dgm:constr type="w" for="ch" forName="picture_2" refType="w" refFor="ch" refForName="picture_1" fact="0.18"/>
+                <dgm:constr type="h" for="ch" forName="picture_2" refType="h" refFor="ch" refForName="picture_1" fact="0.18"/>
+                <dgm:constr type="r" for="ch" forName="picture_2" refType="w"/>
+                <dgm:constr type="rOff" for="ch" forName="picture_2" refType="w" refFor="ch" refForName="picture_1" fact="-1.4238"/>
+                <dgm:constr type="ctrY" for="ch" forName="picture_2" refType="h" refFor="ch" refForName="picture_1" fact="0.09"/>
+                <dgm:constr type="r" for="ch" forName="line_2" refType="ctrX" refFor="ch" refForName="picture_1"/>
+                <dgm:constr type="h" for="ch" forName="line_2"/>
+                <dgm:constr type="l" for="ch" forName="line_2" refType="ctrX" refFor="ch" refForName="picture_2"/>
+                <dgm:constr type="ctrY" for="ch" forName="line_2" refType="ctrY" refFor="ch" refForName="picture_2"/>
+                <dgm:constr type="l" for="ch" forName="textparent_2"/>
+                <dgm:constr type="h" for="ch" forName="textparent_2" refType="h" refFor="ch" refForName="picture_2"/>
+                <dgm:constr type="r" for="ch" forName="textparent_2" refType="l" refFor="ch" refForName="picture_2"/>
+                <dgm:constr type="ctrY" for="ch" forName="textparent_2" refType="ctrY" refFor="ch" refForName="picture_2"/>
+                <dgm:constr type="primFontSz" for="des" forName="text_2" val="65"/>
+                <dgm:constr type="w" for="ch" forName="picture_3" refType="w" refFor="ch" refForName="picture_1" fact="0.18"/>
+                <dgm:constr type="h" for="ch" forName="picture_3" refType="h" refFor="ch" refForName="picture_1" fact="0.18"/>
+                <dgm:constr type="r" for="ch" forName="picture_3" refType="w"/>
+                <dgm:constr type="rOff" for="ch" forName="picture_3" refType="w" refFor="ch" refForName="picture_1" fact="-1.2667"/>
+                <dgm:constr type="ctrY" for="ch" forName="picture_3" refType="h" refFor="ch" refForName="picture_1" fact="0.261"/>
+                <dgm:constr type="r" for="ch" forName="line_3" refType="ctrX" refFor="ch" refForName="picture_1"/>
+                <dgm:constr type="h" for="ch" forName="line_3"/>
+                <dgm:constr type="l" for="ch" forName="line_3" refType="ctrX" refFor="ch" refForName="picture_3"/>
+                <dgm:constr type="ctrY" for="ch" forName="line_3" refType="ctrY" refFor="ch" refForName="picture_3"/>
+                <dgm:constr type="l" for="ch" forName="textparent_3"/>
+                <dgm:constr type="h" for="ch" forName="textparent_3" refType="h" refFor="ch" refForName="picture_3"/>
+                <dgm:constr type="r" for="ch" forName="textparent_3" refType="l" refFor="ch" refForName="picture_3"/>
+                <dgm:constr type="ctrY" for="ch" forName="textparent_3" refType="ctrY" refFor="ch" refForName="picture_3"/>
+                <dgm:constr type="primFontSz" for="des" forName="text_3" refType="primFontSz" refFor="des" refForName="text_2" op="equ"/>
+                <dgm:constr type="w" for="ch" forName="picture_4" refType="w" refFor="ch" refForName="picture_1" fact="0.18"/>
+                <dgm:constr type="h" for="ch" forName="picture_4" refType="h" refFor="ch" refForName="picture_1" fact="0.18"/>
+                <dgm:constr type="r" for="ch" forName="picture_4" refType="w"/>
+                <dgm:constr type="rOff" for="ch" forName="picture_4" refType="w" refFor="ch" refForName="picture_1" fact="-1.21"/>
+                <dgm:constr type="ctrY" for="ch" forName="picture_4" refType="h" refFor="ch" refForName="picture_1" fact="0.5"/>
+                <dgm:constr type="r" for="ch" forName="line_4" refType="ctrX" refFor="ch" refForName="picture_1"/>
+                <dgm:constr type="h" for="ch" forName="line_4"/>
+                <dgm:constr type="l" for="ch" forName="line_4" refType="ctrX" refFor="ch" refForName="picture_4"/>
+                <dgm:constr type="ctrY" for="ch" forName="line_4" refType="ctrY" refFor="ch" refForName="picture_4"/>
+                <dgm:constr type="l" for="ch" forName="textparent_4"/>
+                <dgm:constr type="h" for="ch" forName="textparent_4" refType="h" refFor="ch" refForName="picture_4"/>
+                <dgm:constr type="r" for="ch" forName="textparent_4" refType="l" refFor="ch" refForName="picture_4"/>
+                <dgm:constr type="ctrY" for="ch" forName="textparent_4" refType="ctrY" refFor="ch" refForName="picture_4"/>
+                <dgm:constr type="primFontSz" for="des" forName="text_4" refType="primFontSz" refFor="des" refForName="text_2" op="equ"/>
+                <dgm:constr type="w" for="ch" forName="picture_5" refType="w" refFor="ch" refForName="picture_1" fact="0.18"/>
+                <dgm:constr type="h" for="ch" forName="picture_5" refType="h" refFor="ch" refForName="picture_1" fact="0.18"/>
+                <dgm:constr type="r" for="ch" forName="picture_5" refType="w"/>
+                <dgm:constr type="rOff" for="ch" forName="picture_5" refType="w" refFor="ch" refForName="picture_1" fact="-1.2667"/>
+                <dgm:constr type="ctrY" for="ch" forName="picture_5" refType="h" refFor="ch" refForName="picture_1" fact="0.739"/>
+                <dgm:constr type="r" for="ch" forName="line_5" refType="ctrX" refFor="ch" refForName="picture_1"/>
+                <dgm:constr type="h" for="ch" forName="line_5"/>
+                <dgm:constr type="l" for="ch" forName="line_5" refType="ctrX" refFor="ch" refForName="picture_5"/>
+                <dgm:constr type="ctrY" for="ch" forName="line_5" refType="ctrY" refFor="ch" refForName="picture_5"/>
+                <dgm:constr type="l" for="ch" forName="textparent_5"/>
+                <dgm:constr type="h" for="ch" forName="textparent_5" refType="h" refFor="ch" refForName="picture_5"/>
+                <dgm:constr type="r" for="ch" forName="textparent_5" refType="l" refFor="ch" refForName="picture_5"/>
+                <dgm:constr type="ctrY" for="ch" forName="textparent_5" refType="ctrY" refFor="ch" refForName="picture_5"/>
+                <dgm:constr type="primFontSz" for="des" forName="text_5" refType="primFontSz" refFor="des" refForName="text_2" op="equ"/>
+                <dgm:constr type="w" for="ch" forName="picture_6" refType="w" refFor="ch" refForName="picture_1" fact="0.18"/>
+                <dgm:constr type="h" for="ch" forName="picture_6" refType="h" refFor="ch" refForName="picture_1" fact="0.18"/>
+                <dgm:constr type="r" for="ch" forName="picture_6" refType="w"/>
+                <dgm:constr type="rOff" for="ch" forName="picture_6" refType="w" refFor="ch" refForName="picture_1" fact="-1.4238"/>
+                <dgm:constr type="ctrY" for="ch" forName="picture_6" refType="h" refFor="ch" refForName="picture_1" fact="0.91"/>
+                <dgm:constr type="r" for="ch" forName="line_6" refType="ctrX" refFor="ch" refForName="picture_1"/>
+                <dgm:constr type="h" for="ch" forName="line_6"/>
+                <dgm:constr type="l" for="ch" forName="line_6" refType="ctrX" refFor="ch" refForName="picture_6"/>
+                <dgm:constr type="ctrY" for="ch" forName="line_6" refType="ctrY" refFor="ch" refForName="picture_6"/>
+                <dgm:constr type="l" for="ch" forName="textparent_6"/>
+                <dgm:constr type="h" for="ch" forName="textparent_6" refType="h" refFor="ch" refForName="picture_6"/>
+                <dgm:constr type="r" for="ch" forName="textparent_6" refType="l" refFor="ch" refForName="picture_6"/>
+                <dgm:constr type="ctrY" for="ch" forName="textparent_6" refType="ctrY" refFor="ch" refForName="picture_6"/>
+                <dgm:constr type="primFontSz" for="des" forName="text_6" refType="primFontSz" refFor="des" refForName="text_2" op="equ"/>
+              </dgm:constrLst>
+            </dgm:else>
+          </dgm:choose>
+        </dgm:if>
+        <dgm:else name="Name24">
+          <dgm:choose name="Name25">
+            <dgm:if name="Name26" func="var" arg="dir" op="equ" val="norm">
+              <dgm:constrLst>
+                <dgm:constr type="h" for="ch" forName="picture_1" refType="h"/>
+                <dgm:constr type="w" for="ch" forName="picture_1" refType="h" refFor="ch" refForName="picture_1" op="equ"/>
+                <dgm:constr type="l" for="ch" forName="picture_1"/>
+                <dgm:constr type="t" for="ch" forName="picture_1"/>
+                <dgm:constr type="w" for="ch" forName="text_1" refType="w" refFor="ch" refForName="picture_1" fact="0.64"/>
+                <dgm:constr type="h" for="ch" forName="text_1" refType="h" refFor="ch" refForName="picture_1" fact="0.33"/>
+                <dgm:constr type="l" for="ch" forName="text_1" refType="l" refFor="ch" refForName="picture_1"/>
+                <dgm:constr type="lOff" for="ch" forName="text_1" refType="w" refFor="ch" refForName="picture_1" fact="0.18"/>
+                <dgm:constr type="t" for="ch" forName="text_1" refType="h" refFor="ch" refForName="picture_1" fact="0.531"/>
+                <dgm:constr type="w" for="ch" forName="picture_2" refType="w" refFor="ch" refForName="picture_1" fact="0.15"/>
+                <dgm:constr type="h" for="ch" forName="picture_2" refType="h" refFor="ch" refForName="picture_1" fact="0.15"/>
+                <dgm:constr type="l" for="ch" forName="picture_2" refType="w" refFor="ch" refForName="picture_1" fact="1.4363"/>
+                <dgm:constr type="ctrY" for="ch" forName="picture_2" refType="h" refFor="ch" refForName="picture_1" fact="0.075"/>
+                <dgm:constr type="l" for="ch" forName="line_2" refType="ctrX" refFor="ch" refForName="picture_1"/>
+                <dgm:constr type="h" for="ch" forName="line_2"/>
+                <dgm:constr type="r" for="ch" forName="line_2" refType="ctrX" refFor="ch" refForName="picture_2"/>
+                <dgm:constr type="ctrY" for="ch" forName="line_2" refType="ctrY" refFor="ch" refForName="picture_2"/>
+                <dgm:constr type="r" for="ch" forName="textparent_2" refType="w"/>
+                <dgm:constr type="h" for="ch" forName="textparent_2" refType="h" refFor="ch" refForName="picture_2"/>
+                <dgm:constr type="l" for="ch" forName="textparent_2" refType="r" refFor="ch" refForName="picture_2"/>
+                <dgm:constr type="ctrY" for="ch" forName="textparent_2" refType="ctrY" refFor="ch" refForName="picture_2"/>
+                <dgm:constr type="primFontSz" for="des" forName="text_2" val="65"/>
+                <dgm:constr type="w" for="ch" forName="picture_3" refType="w" refFor="ch" refForName="picture_1" fact="0.15"/>
+                <dgm:constr type="h" for="ch" forName="picture_3" refType="h" refFor="ch" refForName="picture_1" fact="0.15"/>
+                <dgm:constr type="l" for="ch" forName="picture_3" refType="w" refFor="ch" refForName="picture_1" fact="1.2898"/>
+                <dgm:constr type="ctrY" for="ch" forName="picture_3" refType="h" refFor="ch" refForName="picture_1" fact="0.227"/>
+                <dgm:constr type="l" for="ch" forName="line_3" refType="ctrX" refFor="ch" refForName="picture_1"/>
+                <dgm:constr type="h" for="ch" forName="line_3"/>
+                <dgm:constr type="r" for="ch" forName="line_3" refType="ctrX" refFor="ch" refForName="picture_3"/>
+                <dgm:constr type="ctrY" for="ch" forName="line_3" refType="ctrY" refFor="ch" refForName="picture_3"/>
+                <dgm:constr type="r" for="ch" forName="textparent_3" refType="w"/>
+                <dgm:constr type="h" for="ch" forName="textparent_3" refType="h" refFor="ch" refForName="picture_3"/>
+                <dgm:constr type="l" for="ch" forName="textparent_3" refType="r" refFor="ch" refForName="picture_3"/>
+                <dgm:constr type="ctrY" for="ch" forName="textparent_3" refType="ctrY" refFor="ch" refForName="picture_3"/>
+                <dgm:constr type="primFontSz" for="des" forName="text_3" refType="primFontSz" refFor="des" refForName="text_2" op="equ"/>
+                <dgm:constr type="w" for="ch" forName="picture_4" refType="w" refFor="ch" refForName="picture_1" fact="0.15"/>
+                <dgm:constr type="h" for="ch" forName="picture_4" refType="h" refFor="ch" refForName="picture_1" fact="0.15"/>
+                <dgm:constr type="l" for="ch" forName="picture_4" refType="w" refFor="ch" refForName="picture_1" fact="1.21"/>
+                <dgm:constr type="ctrY" for="ch" forName="picture_4" refType="h" refFor="ch" refForName="picture_1" fact="0.405"/>
+                <dgm:constr type="l" for="ch" forName="line_4" refType="ctrX" refFor="ch" refForName="picture_1"/>
+                <dgm:constr type="h" for="ch" forName="line_4"/>
+                <dgm:constr type="r" for="ch" forName="line_4" refType="ctrX" refFor="ch" refForName="picture_4"/>
+                <dgm:constr type="ctrY" for="ch" forName="line_4" refType="ctrY" refFor="ch" refForName="picture_4"/>
+                <dgm:constr type="r" for="ch" forName="textparent_4" refType="w"/>
+                <dgm:constr type="h" for="ch" forName="textparent_4" refType="h" refFor="ch" refForName="picture_4"/>
+                <dgm:constr type="l" for="ch" forName="textparent_4" refType="r" refFor="ch" refForName="picture_4"/>
+                <dgm:constr type="ctrY" for="ch" forName="textparent_4" refType="ctrY" refFor="ch" refForName="picture_4"/>
+                <dgm:constr type="primFontSz" for="des" forName="text_4" refType="primFontSz" refFor="des" refForName="text_2" op="equ"/>
+                <dgm:constr type="w" for="ch" forName="picture_5" refType="w" refFor="ch" refForName="picture_1" fact="0.15"/>
+                <dgm:constr type="h" for="ch" forName="picture_5" refType="h" refFor="ch" refForName="picture_1" fact="0.15"/>
+                <dgm:constr type="l" for="ch" forName="picture_5" refType="w" refFor="ch" refForName="picture_1" fact="1.21"/>
+                <dgm:constr type="ctrY" for="ch" forName="picture_5" refType="h" refFor="ch" refForName="picture_1" fact="0.595"/>
+                <dgm:constr type="l" for="ch" forName="line_5" refType="ctrX" refFor="ch" refForName="picture_1"/>
+                <dgm:constr type="h" for="ch" forName="line_5"/>
+                <dgm:constr type="r" for="ch" forName="line_5" refType="ctrX" refFor="ch" refForName="picture_5"/>
+                <dgm:constr type="ctrY" for="ch" forName="line_5" refType="ctrY" refFor="ch" refForName="picture_5"/>
+                <dgm:constr type="r" for="ch" forName="textparent_5" refType="w"/>
+                <dgm:constr type="h" for="ch" forName="textparent_5" refType="h" refFor="ch" refForName="picture_5"/>
+                <dgm:constr type="l" for="ch" forName="textparent_5" refType="r" refFor="ch" refForName="picture_5"/>
+                <dgm:constr type="ctrY" for="ch" forName="textparent_5" refType="ctrY" refFor="ch" refForName="picture_5"/>
+                <dgm:constr type="primFontSz" for="des" forName="text_5" refType="primFontSz" refFor="des" refForName="text_2" op="equ"/>
+                <dgm:constr type="w" for="ch" forName="picture_6" refType="w" refFor="ch" refForName="picture_1" fact="0.15"/>
+                <dgm:constr type="h" for="ch" forName="picture_6" refType="h" refFor="ch" refForName="picture_1" fact="0.15"/>
+                <dgm:constr type="l" for="ch" forName="picture_6" refType="w" refFor="ch" refForName="picture_1" fact="1.2898"/>
+                <dgm:constr type="ctrY" for="ch" forName="picture_6" refType="h" refFor="ch" refForName="picture_1" fact="0.773"/>
+                <dgm:constr type="l" for="ch" forName="line_6" refType="ctrX" refFor="ch" refForName="picture_1"/>
+                <dgm:constr type="h" for="ch" forName="line_6"/>
+                <dgm:constr type="r" for="ch" forName="line_6" refType="ctrX" refFor="ch" refForName="picture_6"/>
+                <dgm:constr type="ctrY" for="ch" forName="line_6" refType="ctrY" refFor="ch" refForName="picture_6"/>
+                <dgm:constr type="r" for="ch" forName="textparent_6" refType="w"/>
+                <dgm:constr type="h" for="ch" forName="textparent_6" refType="h" refFor="ch" refForName="picture_6"/>
+                <dgm:constr type="l" for="ch" forName="textparent_6" refType="r" refFor="ch" refForName="picture_6"/>
+                <dgm:constr type="ctrY" for="ch" forName="textparent_6" refType="ctrY" refFor="ch" refForName="picture_6"/>
+                <dgm:constr type="primFontSz" for="des" forName="text_6" refType="primFontSz" refFor="des" refForName="text_2" op="equ"/>
+                <dgm:constr type="w" for="ch" forName="picture_7" refType="w" refFor="ch" refForName="picture_1" fact="0.15"/>
+                <dgm:constr type="h" for="ch" forName="picture_7" refType="h" refFor="ch" refForName="picture_1" fact="0.15"/>
+                <dgm:constr type="l" for="ch" forName="picture_7" refType="w" refFor="ch" refForName="picture_1" fact="1.4363"/>
+                <dgm:constr type="ctrY" for="ch" forName="picture_7" refType="h" refFor="ch" refForName="picture_1" fact="0.925"/>
+                <dgm:constr type="l" for="ch" forName="line_7" refType="ctrX" refFor="ch" refForName="picture_1"/>
+                <dgm:constr type="h" for="ch" forName="line_7"/>
+                <dgm:constr type="r" for="ch" forName="line_7" refType="ctrX" refFor="ch" refForName="picture_7"/>
+                <dgm:constr type="ctrY" for="ch" forName="line_7" refType="ctrY" refFor="ch" refForName="picture_7"/>
+                <dgm:constr type="r" for="ch" forName="textparent_7" refType="w"/>
+                <dgm:constr type="h" for="ch" forName="textparent_7" refType="h" refFor="ch" refForName="picture_7"/>
+                <dgm:constr type="l" for="ch" forName="textparent_7" refType="r" refFor="ch" refForName="picture_7"/>
+                <dgm:constr type="ctrY" for="ch" forName="textparent_7" refType="ctrY" refFor="ch" refForName="picture_7"/>
+                <dgm:constr type="primFontSz" for="des" forName="text_7" refType="primFontSz" refFor="des" refForName="text_2" op="equ"/>
+              </dgm:constrLst>
+            </dgm:if>
+            <dgm:else name="Name27">
+              <dgm:constrLst>
+                <dgm:constr type="h" for="ch" forName="picture_1" refType="h"/>
+                <dgm:constr type="w" for="ch" forName="picture_1" refType="h" refFor="ch" refForName="picture_1" op="equ"/>
+                <dgm:constr type="r" for="ch" forName="picture_1" refType="w"/>
+                <dgm:constr type="t" for="ch" forName="picture_1"/>
+                <dgm:constr type="w" for="ch" forName="text_1" refType="w" refFor="ch" refForName="picture_1" fact="0.64"/>
+                <dgm:constr type="h" for="ch" forName="text_1" refType="h" refFor="ch" refForName="picture_1" fact="0.33"/>
+                <dgm:constr type="l" for="ch" forName="text_1" refType="l" refFor="ch" refForName="picture_1"/>
+                <dgm:constr type="lOff" for="ch" forName="text_1" refType="w" refFor="ch" refForName="picture_1" fact="0.18"/>
+                <dgm:constr type="t" for="ch" forName="text_1" refType="h" refFor="ch" refForName="picture_1" fact="0.531"/>
+                <dgm:constr type="w" for="ch" forName="picture_2" refType="w" refFor="ch" refForName="picture_1" fact="0.15"/>
+                <dgm:constr type="h" for="ch" forName="picture_2" refType="h" refFor="ch" refForName="picture_1" fact="0.15"/>
+                <dgm:constr type="r" for="ch" forName="picture_2" refType="w"/>
+                <dgm:constr type="rOff" for="ch" forName="picture_2" refType="w" refFor="ch" refForName="picture_1" fact="-1.4363"/>
+                <dgm:constr type="ctrY" for="ch" forName="picture_2" refType="h" refFor="ch" refForName="picture_1" fact="0.075"/>
+                <dgm:constr type="r" for="ch" forName="line_2" refType="ctrX" refFor="ch" refForName="picture_1"/>
+                <dgm:constr type="h" for="ch" forName="line_2"/>
+                <dgm:constr type="l" for="ch" forName="line_2" refType="ctrX" refFor="ch" refForName="picture_2"/>
+                <dgm:constr type="ctrY" for="ch" forName="line_2" refType="ctrY" refFor="ch" refForName="picture_2"/>
+                <dgm:constr type="l" for="ch" forName="textparent_2"/>
+                <dgm:constr type="h" for="ch" forName="textparent_2" refType="h" refFor="ch" refForName="picture_2"/>
+                <dgm:constr type="r" for="ch" forName="textparent_2" refType="l" refFor="ch" refForName="picture_2"/>
+                <dgm:constr type="ctrY" for="ch" forName="textparent_2" refType="ctrY" refFor="ch" refForName="picture_2"/>
+                <dgm:constr type="primFontSz" for="des" forName="text_2" val="65"/>
+                <dgm:constr type="w" for="ch" forName="picture_3" refType="w" refFor="ch" refForName="picture_1" fact="0.15"/>
+                <dgm:constr type="h" for="ch" forName="picture_3" refType="h" refFor="ch" refForName="picture_1" fact="0.15"/>
+                <dgm:constr type="r" for="ch" forName="picture_3" refType="w"/>
+                <dgm:constr type="rOff" for="ch" forName="picture_3" refType="w" refFor="ch" refForName="picture_1" fact="-1.2898"/>
+                <dgm:constr type="ctrY" for="ch" forName="picture_3" refType="h" refFor="ch" refForName="picture_1" fact="0.227"/>
+                <dgm:constr type="r" for="ch" forName="line_3" refType="ctrX" refFor="ch" refForName="picture_1"/>
+                <dgm:constr type="h" for="ch" forName="line_3"/>
+                <dgm:constr type="l" for="ch" forName="line_3" refType="ctrX" refFor="ch" refForName="picture_3"/>
+                <dgm:constr type="ctrY" for="ch" forName="line_3" refType="ctrY" refFor="ch" refForName="picture_3"/>
+                <dgm:constr type="l" for="ch" forName="textparent_3"/>
+                <dgm:constr type="h" for="ch" forName="textparent_3" refType="h" refFor="ch" refForName="picture_3"/>
+                <dgm:constr type="r" for="ch" forName="textparent_3" refType="l" refFor="ch" refForName="picture_3"/>
+                <dgm:constr type="ctrY" for="ch" forName="textparent_3" refType="ctrY" refFor="ch" refForName="picture_3"/>
+                <dgm:constr type="primFontSz" for="des" forName="text_3" refType="primFontSz" refFor="des" refForName="text_2" op="equ"/>
+                <dgm:constr type="w" for="ch" forName="picture_4" refType="w" refFor="ch" refForName="picture_1" fact="0.15"/>
+                <dgm:constr type="h" for="ch" forName="picture_4" refType="h" refFor="ch" refForName="picture_1" fact="0.15"/>
+                <dgm:constr type="r" for="ch" forName="picture_4" refType="w"/>
+                <dgm:constr type="rOff" for="ch" forName="picture_4" refType="w" refFor="ch" refForName="picture_1" fact="-1.21"/>
+                <dgm:constr type="ctrY" for="ch" forName="picture_4" refType="h" refFor="ch" refForName="picture_1" fact="0.405"/>
+                <dgm:constr type="r" for="ch" forName="line_4" refType="ctrX" refFor="ch" refForName="picture_1"/>
+                <dgm:constr type="h" for="ch" forName="line_4"/>
+                <dgm:constr type="l" for="ch" forName="line_4" refType="ctrX" refFor="ch" refForName="picture_4"/>
+                <dgm:constr type="ctrY" for="ch" forName="line_4" refType="ctrY" refFor="ch" refForName="picture_4"/>
+                <dgm:constr type="l" for="ch" forName="textparent_4"/>
+                <dgm:constr type="h" for="ch" forName="textparent_4" refType="h" refFor="ch" refForName="picture_4"/>
+                <dgm:constr type="r" for="ch" forName="textparent_4" refType="l" refFor="ch" refForName="picture_4"/>
+                <dgm:constr type="ctrY" for="ch" forName="textparent_4" refType="ctrY" refFor="ch" refForName="picture_4"/>
+                <dgm:constr type="primFontSz" for="des" forName="text_4" refType="primFontSz" refFor="des" refForName="text_2" op="equ"/>
+                <dgm:constr type="w" for="ch" forName="picture_5" refType="w" refFor="ch" refForName="picture_1" fact="0.15"/>
+                <dgm:constr type="h" for="ch" forName="picture_5" refType="h" refFor="ch" refForName="picture_1" fact="0.15"/>
+                <dgm:constr type="r" for="ch" forName="picture_5" refType="w"/>
+                <dgm:constr type="rOff" for="ch" forName="picture_5" refType="w" refFor="ch" refForName="picture_1" fact="-1.21"/>
+                <dgm:constr type="ctrY" for="ch" forName="picture_5" refType="h" refFor="ch" refForName="picture_1" fact="0.595"/>
+                <dgm:constr type="r" for="ch" forName="line_5" refType="ctrX" refFor="ch" refForName="picture_1"/>
+                <dgm:constr type="h" for="ch" forName="line_5"/>
+                <dgm:constr type="l" for="ch" forName="line_5" refType="ctrX" refFor="ch" refForName="picture_5"/>
+                <dgm:constr type="ctrY" for="ch" forName="line_5" refType="ctrY" refFor="ch" refForName="picture_5"/>
+                <dgm:constr type="l" for="ch" forName="textparent_5"/>
+                <dgm:constr type="h" for="ch" forName="textparent_5" refType="h" refFor="ch" refForName="picture_5"/>
+                <dgm:constr type="r" for="ch" forName="textparent_5" refType="l" refFor="ch" refForName="picture_5"/>
+                <dgm:constr type="ctrY" for="ch" forName="textparent_5" refType="ctrY" refFor="ch" refForName="picture_5"/>
+                <dgm:constr type="primFontSz" for="des" forName="text_5" refType="primFontSz" refFor="des" refForName="text_2" op="equ"/>
+                <dgm:constr type="w" for="ch" forName="picture_6" refType="w" refFor="ch" refForName="picture_1" fact="0.15"/>
+                <dgm:constr type="h" for="ch" forName="picture_6" refType="h" refFor="ch" refForName="picture_1" fact="0.15"/>
+                <dgm:constr type="r" for="ch" forName="picture_6" refType="w"/>
+                <dgm:constr type="rOff" for="ch" forName="picture_6" refType="w" refFor="ch" refForName="picture_1" fact="-1.2898"/>
+                <dgm:constr type="ctrY" for="ch" forName="picture_6" refType="h" refFor="ch" refForName="picture_1" fact="0.773"/>
+                <dgm:constr type="r" for="ch" forName="line_6" refType="ctrX" refFor="ch" refForName="picture_1"/>
+                <dgm:constr type="h" for="ch" forName="line_6"/>
+                <dgm:constr type="l" for="ch" forName="line_6" refType="ctrX" refFor="ch" refForName="picture_6"/>
+                <dgm:constr type="ctrY" for="ch" forName="line_6" refType="ctrY" refFor="ch" refForName="picture_6"/>
+                <dgm:constr type="l" for="ch" forName="textparent_6"/>
+                <dgm:constr type="h" for="ch" forName="textparent_6" refType="h" refFor="ch" refForName="picture_6"/>
+                <dgm:constr type="r" for="ch" forName="textparent_6" refType="l" refFor="ch" refForName="picture_6"/>
+                <dgm:constr type="ctrY" for="ch" forName="textparent_6" refType="ctrY" refFor="ch" refForName="picture_6"/>
+                <dgm:constr type="primFontSz" for="des" forName="text_6" refType="primFontSz" refFor="des" refForName="text_2" op="equ"/>
+                <dgm:constr type="w" for="ch" forName="picture_7" refType="w" refFor="ch" refForName="picture_1" fact="0.15"/>
+                <dgm:constr type="h" for="ch" forName="picture_7" refType="h" refFor="ch" refForName="picture_1" fact="0.15"/>
+                <dgm:constr type="r" for="ch" forName="picture_7" refType="w"/>
+                <dgm:constr type="rOff" for="ch" forName="picture_7" refType="w" refFor="ch" refForName="picture_1" fact="-1.4363"/>
+                <dgm:constr type="ctrY" for="ch" forName="picture_7" refType="h" refFor="ch" refForName="picture_1" fact="0.925"/>
+                <dgm:constr type="r" for="ch" forName="line_7" refType="ctrX" refFor="ch" refForName="picture_1"/>
+                <dgm:constr type="h" for="ch" forName="line_7"/>
+                <dgm:constr type="l" for="ch" forName="line_7" refType="ctrX" refFor="ch" refForName="picture_7"/>
+                <dgm:constr type="ctrY" for="ch" forName="line_7" refType="ctrY" refFor="ch" refForName="picture_7"/>
+                <dgm:constr type="l" for="ch" forName="textparent_7"/>
+                <dgm:constr type="h" for="ch" forName="textparent_7" refType="h" refFor="ch" refForName="picture_7"/>
+                <dgm:constr type="r" for="ch" forName="textparent_7" refType="l" refFor="ch" refForName="picture_7"/>
+                <dgm:constr type="ctrY" for="ch" forName="textparent_7" refType="ctrY" refFor="ch" refForName="picture_7"/>
+                <dgm:constr type="primFontSz" for="des" forName="text_7" refType="primFontSz" refFor="des" refForName="text_2" op="equ"/>
+              </dgm:constrLst>
+            </dgm:else>
+          </dgm:choose>
+        </dgm:else>
+      </dgm:choose>
+      <dgm:forEach name="wrapper" axis="self" ptType="parTrans">
+        <dgm:forEach name="wrapper2" axis="self" ptType="sibTrans" st="2">
+          <dgm:forEach name="pictureRepeat" axis="self">
+            <dgm:layoutNode name="pictureRepeatNode" styleLbl="alignImgPlace1">
+              <dgm:alg type="sp"/>
+              <dgm:shape xmlns:r="http://schemas.openxmlformats.org/officeDocument/2006/relationships" type="ellipse" r:blip="" blipPhldr="1">
+                <dgm:adjLst/>
+              </dgm:shape>
+              <dgm:presOf axis="self"/>
+            </dgm:layoutNode>
+          </dgm:forEach>
+        </dgm:forEach>
+      </dgm:forEach>
+      <dgm:forEach name="Name28" axis="ch" ptType="sibTrans" hideLastTrans="0" cnt="1">
+        <dgm:layoutNode name="picture_1">
+          <dgm:alg type="sp"/>
+          <dgm:shape xmlns:r="http://schemas.openxmlformats.org/officeDocument/2006/relationships" r:blip="">
+            <dgm:adjLst/>
+          </dgm:shape>
+          <dgm:presOf/>
+          <dgm:constrLst/>
+          <dgm:forEach name="Name29" ref="pictureRepeat"/>
+        </dgm:layoutNode>
+      </dgm:forEach>
+      <dgm:forEach name="Name30" axis="ch" ptType="node" cnt="1">
+        <dgm:layoutNode name="text_1" styleLbl="node1">
+          <dgm:varLst>
+            <dgm:bulletEnabled val="1"/>
+          </dgm:varLst>
+          <dgm:alg type="tx">
+            <dgm:param type="txAnchorVert" val="b"/>
+            <dgm:param type="txAnchorVertCh" val="b"/>
+            <dgm:param type="parTxRTLAlign" val="r"/>
+            <dgm:param type="shpTxRTLAlignCh" val="r"/>
+          </dgm:alg>
+          <dgm:shape xmlns:r="http://schemas.openxmlformats.org/officeDocument/2006/relationships" type="rect" r:blip="" hideGeom="1">
+            <dgm:adjLst/>
+          </dgm:shape>
+          <dgm:presOf axis="desOrSelf" ptType="node"/>
+          <dgm:constrLst>
+            <dgm:constr type="primFontSz" val="65"/>
+            <dgm:constr type="lMarg"/>
+            <dgm:constr type="rMarg"/>
+            <dgm:constr type="tMarg"/>
+            <dgm:constr type="bMarg"/>
+          </dgm:constrLst>
+          <dgm:ruleLst>
+            <dgm:rule type="primFontSz" val="5" fact="NaN" max="NaN"/>
+          </dgm:ruleLst>
+        </dgm:layoutNode>
+      </dgm:forEach>
+      <dgm:forEach name="Name31" axis="ch" ptType="sibTrans" hideLastTrans="0" st="2" cnt="1">
+        <dgm:layoutNode name="picture_2">
+          <dgm:alg type="sp"/>
+          <dgm:shape xmlns:r="http://schemas.openxmlformats.org/officeDocument/2006/relationships" r:blip="">
+            <dgm:adjLst/>
+          </dgm:shape>
+          <dgm:presOf/>
+          <dgm:constrLst/>
+          <dgm:forEach name="Name32" ref="pictureRepeat"/>
+        </dgm:layoutNode>
+      </dgm:forEach>
+      <dgm:forEach name="Name33" axis="ch" ptType="node" st="2" cnt="1">
+        <dgm:layoutNode name="line_2" styleLbl="parChTrans1D1">
+          <dgm:alg type="sp"/>
+          <dgm:shape xmlns:r="http://schemas.openxmlformats.org/officeDocument/2006/relationships" type="line" r:blip="" zOrderOff="-100">
+            <dgm:adjLst/>
+          </dgm:shape>
+          <dgm:presOf/>
+        </dgm:layoutNode>
+        <dgm:layoutNode name="textparent_2">
+          <dgm:choose name="Name34">
+            <dgm:if name="Name35" func="var" arg="dir" op="equ" val="norm">
+              <dgm:alg type="lin">
+                <dgm:param type="horzAlign" val="l"/>
+              </dgm:alg>
+            </dgm:if>
+            <dgm:else name="Name36">
+              <dgm:alg type="lin">
+                <dgm:param type="horzAlign" val="r"/>
+              </dgm:alg>
+            </dgm:else>
+          </dgm:choose>
+          <dgm:shape xmlns:r="http://schemas.openxmlformats.org/officeDocument/2006/relationships" type="rect" r:blip="" hideGeom="1">
+            <dgm:adjLst/>
+          </dgm:shape>
+          <dgm:constrLst>
+            <dgm:constr type="userW" for="ch" forName="text_2" refType="w"/>
+            <dgm:constr type="h" for="ch" forName="text_2" refType="h"/>
+          </dgm:constrLst>
+          <dgm:presOf/>
+          <dgm:layoutNode name="text_2" styleLbl="revTx">
+            <dgm:varLst>
+              <dgm:bulletEnabled val="1"/>
+            </dgm:varLst>
+            <dgm:choose name="Name37">
+              <dgm:if name="Name38" func="var" arg="dir" op="equ" val="norm">
+                <dgm:alg type="tx">
+                  <dgm:param type="parTxLTRAlign" val="l"/>
+                  <dgm:param type="shpTxLTRAlignCh" val="l"/>
+                  <dgm:param type="parTxRTLAlign" val="r"/>
+                  <dgm:param type="shpTxRTLAlignCh" val="r"/>
+                </dgm:alg>
+              </dgm:if>
+              <dgm:else name="Name39">
+                <dgm:alg type="tx">
+                  <dgm:param type="parTxLTRAlign" val="r"/>
+                  <dgm:param type="shpTxLTRAlignCh" val="r"/>
+                  <dgm:param type="parTxRTLAlign" val="r"/>
+                  <dgm:param type="shpTxRTLAlignCh" val="r"/>
+                </dgm:alg>
+              </dgm:else>
+            </dgm:choose>
+            <dgm:shape xmlns:r="http://schemas.openxmlformats.org/officeDocument/2006/relationships" type="rect" r:blip="">
+              <dgm:adjLst/>
+            </dgm:shape>
+            <dgm:presOf axis="desOrSelf" ptType="node"/>
+            <dgm:constrLst>
+              <dgm:constr type="userW"/>
+              <dgm:constr type="w" refType="userW" fact="0.1"/>
+              <dgm:constr type="lMarg" refType="primFontSz" fact="0.3"/>
+              <dgm:constr type="rMarg" refType="primFontSz" fact="0.3"/>
+              <dgm:constr type="tMarg"/>
+              <dgm:constr type="bMarg"/>
+            </dgm:constrLst>
+            <dgm:ruleLst>
+              <dgm:rule type="w" val="NaN" fact="1" max="NaN"/>
+              <dgm:rule type="primFontSz" val="5" fact="NaN" max="NaN"/>
+            </dgm:ruleLst>
+          </dgm:layoutNode>
+        </dgm:layoutNode>
+      </dgm:forEach>
+      <dgm:forEach name="Name40" axis="ch" ptType="sibTrans" hideLastTrans="0" st="3" cnt="1">
+        <dgm:layoutNode name="picture_3">
+          <dgm:alg type="sp"/>
+          <dgm:shape xmlns:r="http://schemas.openxmlformats.org/officeDocument/2006/relationships" r:blip="">
+            <dgm:adjLst/>
+          </dgm:shape>
+          <dgm:presOf/>
+          <dgm:constrLst/>
+          <dgm:forEach name="Name41" ref="pictureRepeat"/>
+        </dgm:layoutNode>
+      </dgm:forEach>
+      <dgm:forEach name="Name42" axis="ch" ptType="node" st="3" cnt="1">
+        <dgm:layoutNode name="line_3" styleLbl="parChTrans1D1">
+          <dgm:alg type="sp"/>
+          <dgm:shape xmlns:r="http://schemas.openxmlformats.org/officeDocument/2006/relationships" type="line" r:blip="" zOrderOff="-100">
+            <dgm:adjLst/>
+          </dgm:shape>
+          <dgm:presOf/>
+        </dgm:layoutNode>
+        <dgm:layoutNode name="textparent_3">
+          <dgm:choose name="Name43">
+            <dgm:if name="Name44" func="var" arg="dir" op="equ" val="norm">
+              <dgm:alg type="lin">
+                <dgm:param type="horzAlign" val="l"/>
+              </dgm:alg>
+            </dgm:if>
+            <dgm:else name="Name45">
+              <dgm:alg type="lin">
+                <dgm:param type="horzAlign" val="r"/>
+              </dgm:alg>
+            </dgm:else>
+          </dgm:choose>
+          <dgm:shape xmlns:r="http://schemas.openxmlformats.org/officeDocument/2006/relationships" type="rect" r:blip="" hideGeom="1">
+            <dgm:adjLst/>
+          </dgm:shape>
+          <dgm:constrLst>
+            <dgm:constr type="userW" for="ch" forName="text_3" refType="w"/>
+            <dgm:constr type="h" for="ch" forName="text_3" refType="h"/>
+          </dgm:constrLst>
+          <dgm:presOf/>
+          <dgm:layoutNode name="text_3" styleLbl="revTx">
+            <dgm:varLst>
+              <dgm:bulletEnabled val="1"/>
+            </dgm:varLst>
+            <dgm:choose name="Name46">
+              <dgm:if name="Name47" func="var" arg="dir" op="equ" val="norm">
+                <dgm:alg type="tx">
+                  <dgm:param type="parTxLTRAlign" val="l"/>
+                  <dgm:param type="shpTxLTRAlignCh" val="l"/>
+                  <dgm:param type="parTxRTLAlign" val="r"/>
+                  <dgm:param type="shpTxRTLAlignCh" val="r"/>
+                </dgm:alg>
+              </dgm:if>
+              <dgm:else name="Name48">
+                <dgm:alg type="tx">
+                  <dgm:param type="parTxLTRAlign" val="r"/>
+                  <dgm:param type="shpTxLTRAlignCh" val="r"/>
+                  <dgm:param type="parTxRTLAlign" val="r"/>
+                  <dgm:param type="shpTxRTLAlignCh" val="r"/>
+                </dgm:alg>
+              </dgm:else>
+            </dgm:choose>
+            <dgm:shape xmlns:r="http://schemas.openxmlformats.org/officeDocument/2006/relationships" type="rect" r:blip="">
+              <dgm:adjLst/>
+            </dgm:shape>
+            <dgm:presOf axis="desOrSelf" ptType="node"/>
+            <dgm:constrLst>
+              <dgm:constr type="userW"/>
+              <dgm:constr type="w" refType="userW" fact="0.1"/>
+              <dgm:constr type="lMarg" refType="primFontSz" fact="0.3"/>
+              <dgm:constr type="rMarg" refType="primFontSz" fact="0.3"/>
+              <dgm:constr type="tMarg"/>
+              <dgm:constr type="bMarg"/>
+            </dgm:constrLst>
+            <dgm:ruleLst>
+              <dgm:rule type="w" val="NaN" fact="1" max="NaN"/>
+              <dgm:rule type="primFontSz" val="5" fact="NaN" max="NaN"/>
+            </dgm:ruleLst>
+          </dgm:layoutNode>
+        </dgm:layoutNode>
+      </dgm:forEach>
+      <dgm:forEach name="Name49" axis="ch" ptType="sibTrans" hideLastTrans="0" st="4" cnt="1">
+        <dgm:layoutNode name="picture_4">
+          <dgm:alg type="sp"/>
+          <dgm:shape xmlns:r="http://schemas.openxmlformats.org/officeDocument/2006/relationships" r:blip="">
+            <dgm:adjLst/>
+          </dgm:shape>
+          <dgm:presOf/>
+          <dgm:constrLst/>
+          <dgm:forEach name="Name50" ref="pictureRepeat"/>
+        </dgm:layoutNode>
+      </dgm:forEach>
+      <dgm:forEach name="Name51" axis="ch" ptType="node" st="4" cnt="1">
+        <dgm:layoutNode name="line_4" styleLbl="parChTrans1D1">
+          <dgm:alg type="sp"/>
+          <dgm:shape xmlns:r="http://schemas.openxmlformats.org/officeDocument/2006/relationships" type="line" r:blip="" zOrderOff="-100">
+            <dgm:adjLst/>
+          </dgm:shape>
+          <dgm:presOf/>
+        </dgm:layoutNode>
+        <dgm:layoutNode name="textparent_4">
+          <dgm:choose name="Name52">
+            <dgm:if name="Name53" func="var" arg="dir" op="equ" val="norm">
+              <dgm:alg type="lin">
+                <dgm:param type="horzAlign" val="l"/>
+              </dgm:alg>
+            </dgm:if>
+            <dgm:else name="Name54">
+              <dgm:alg type="lin">
+                <dgm:param type="horzAlign" val="r"/>
+              </dgm:alg>
+            </dgm:else>
+          </dgm:choose>
+          <dgm:shape xmlns:r="http://schemas.openxmlformats.org/officeDocument/2006/relationships" type="rect" r:blip="" hideGeom="1">
+            <dgm:adjLst/>
+          </dgm:shape>
+          <dgm:constrLst>
+            <dgm:constr type="userW" for="ch" forName="text_4" refType="w"/>
+            <dgm:constr type="h" for="ch" forName="text_4" refType="h"/>
+          </dgm:constrLst>
+          <dgm:presOf/>
+          <dgm:layoutNode name="text_4" styleLbl="revTx">
+            <dgm:varLst>
+              <dgm:bulletEnabled val="1"/>
+            </dgm:varLst>
+            <dgm:choose name="Name55">
+              <dgm:if name="Name56" func="var" arg="dir" op="equ" val="norm">
+                <dgm:alg type="tx">
+                  <dgm:param type="parTxLTRAlign" val="l"/>
+                  <dgm:param type="shpTxLTRAlignCh" val="l"/>
+                  <dgm:param type="parTxRTLAlign" val="r"/>
+                  <dgm:param type="shpTxRTLAlignCh" val="r"/>
+                </dgm:alg>
+              </dgm:if>
+              <dgm:else name="Name57">
+                <dgm:alg type="tx">
+                  <dgm:param type="parTxLTRAlign" val="r"/>
+                  <dgm:param type="shpTxLTRAlignCh" val="r"/>
+                  <dgm:param type="parTxRTLAlign" val="r"/>
+                  <dgm:param type="shpTxRTLAlignCh" val="r"/>
+                </dgm:alg>
+              </dgm:else>
+            </dgm:choose>
+            <dgm:shape xmlns:r="http://schemas.openxmlformats.org/officeDocument/2006/relationships" type="rect" r:blip="">
+              <dgm:adjLst/>
+            </dgm:shape>
+            <dgm:presOf axis="desOrSelf" ptType="node"/>
+            <dgm:constrLst>
+              <dgm:constr type="userW"/>
+              <dgm:constr type="w" refType="userW" fact="0.1"/>
+              <dgm:constr type="lMarg" refType="primFontSz" fact="0.3"/>
+              <dgm:constr type="rMarg" refType="primFontSz" fact="0.3"/>
+              <dgm:constr type="tMarg"/>
+              <dgm:constr type="bMarg"/>
+            </dgm:constrLst>
+            <dgm:ruleLst>
+              <dgm:rule type="w" val="NaN" fact="1" max="NaN"/>
+              <dgm:rule type="primFontSz" val="5" fact="NaN" max="NaN"/>
+            </dgm:ruleLst>
+          </dgm:layoutNode>
+        </dgm:layoutNode>
+      </dgm:forEach>
+      <dgm:forEach name="Name58" axis="ch" ptType="sibTrans" hideLastTrans="0" st="5" cnt="1">
+        <dgm:layoutNode name="picture_5">
+          <dgm:alg type="sp"/>
+          <dgm:shape xmlns:r="http://schemas.openxmlformats.org/officeDocument/2006/relationships" r:blip="">
+            <dgm:adjLst/>
+          </dgm:shape>
+          <dgm:presOf/>
+          <dgm:constrLst/>
+          <dgm:forEach name="Name59" ref="pictureRepeat"/>
+        </dgm:layoutNode>
+      </dgm:forEach>
+      <dgm:forEach name="Name60" axis="ch" ptType="node" st="5" cnt="1">
+        <dgm:layoutNode name="line_5" styleLbl="parChTrans1D1">
+          <dgm:alg type="sp"/>
+          <dgm:shape xmlns:r="http://schemas.openxmlformats.org/officeDocument/2006/relationships" type="line" r:blip="" zOrderOff="-100">
+            <dgm:adjLst/>
+          </dgm:shape>
+          <dgm:presOf/>
+        </dgm:layoutNode>
+        <dgm:layoutNode name="textparent_5">
+          <dgm:choose name="Name61">
+            <dgm:if name="Name62" func="var" arg="dir" op="equ" val="norm">
+              <dgm:alg type="lin">
+                <dgm:param type="horzAlign" val="l"/>
+              </dgm:alg>
+            </dgm:if>
+            <dgm:else name="Name63">
+              <dgm:alg type="lin">
+                <dgm:param type="horzAlign" val="r"/>
+              </dgm:alg>
+            </dgm:else>
+          </dgm:choose>
+          <dgm:shape xmlns:r="http://schemas.openxmlformats.org/officeDocument/2006/relationships" type="rect" r:blip="" hideGeom="1">
+            <dgm:adjLst/>
+          </dgm:shape>
+          <dgm:constrLst>
+            <dgm:constr type="userW" for="ch" forName="text_5" refType="w"/>
+            <dgm:constr type="h" for="ch" forName="text_5" refType="h"/>
+          </dgm:constrLst>
+          <dgm:presOf/>
+          <dgm:layoutNode name="text_5" styleLbl="revTx">
+            <dgm:varLst>
+              <dgm:bulletEnabled val="1"/>
+            </dgm:varLst>
+            <dgm:choose name="Name64">
+              <dgm:if name="Name65" func="var" arg="dir" op="equ" val="norm">
+                <dgm:alg type="tx">
+                  <dgm:param type="parTxLTRAlign" val="l"/>
+                  <dgm:param type="shpTxLTRAlignCh" val="l"/>
+                  <dgm:param type="parTxRTLAlign" val="r"/>
+                  <dgm:param type="shpTxRTLAlignCh" val="r"/>
+                </dgm:alg>
+              </dgm:if>
+              <dgm:else name="Name66">
+                <dgm:alg type="tx">
+                  <dgm:param type="parTxLTRAlign" val="r"/>
+                  <dgm:param type="shpTxLTRAlignCh" val="r"/>
+                  <dgm:param type="parTxRTLAlign" val="r"/>
+                  <dgm:param type="shpTxRTLAlignCh" val="r"/>
+                </dgm:alg>
+              </dgm:else>
+            </dgm:choose>
+            <dgm:shape xmlns:r="http://schemas.openxmlformats.org/officeDocument/2006/relationships" type="rect" r:blip="">
+              <dgm:adjLst/>
+            </dgm:shape>
+            <dgm:presOf axis="desOrSelf" ptType="node"/>
+            <dgm:constrLst>
+              <dgm:constr type="userW"/>
+              <dgm:constr type="w" refType="userW" fact="0.1"/>
+              <dgm:constr type="lMarg" refType="primFontSz" fact="0.3"/>
+              <dgm:constr type="rMarg" refType="primFontSz" fact="0.3"/>
+              <dgm:constr type="tMarg"/>
+              <dgm:constr type="bMarg"/>
+            </dgm:constrLst>
+            <dgm:ruleLst>
+              <dgm:rule type="w" val="NaN" fact="1" max="NaN"/>
+              <dgm:rule type="primFontSz" val="5" fact="NaN" max="NaN"/>
+            </dgm:ruleLst>
+          </dgm:layoutNode>
+        </dgm:layoutNode>
+      </dgm:forEach>
+      <dgm:forEach name="Name67" axis="ch" ptType="sibTrans" hideLastTrans="0" st="6" cnt="1">
+        <dgm:layoutNode name="picture_6">
+          <dgm:alg type="sp"/>
+          <dgm:shape xmlns:r="http://schemas.openxmlformats.org/officeDocument/2006/relationships" r:blip="">
+            <dgm:adjLst/>
+          </dgm:shape>
+          <dgm:presOf/>
+          <dgm:constrLst/>
+          <dgm:forEach name="Name68" ref="pictureRepeat"/>
+        </dgm:layoutNode>
+      </dgm:forEach>
+      <dgm:forEach name="Name69" axis="ch" ptType="node" st="6" cnt="1">
+        <dgm:layoutNode name="line_6" styleLbl="parChTrans1D1">
+          <dgm:alg type="sp"/>
+          <dgm:shape xmlns:r="http://schemas.openxmlformats.org/officeDocument/2006/relationships" type="line" r:blip="" zOrderOff="-100">
+            <dgm:adjLst/>
+          </dgm:shape>
+          <dgm:presOf/>
+        </dgm:layoutNode>
+        <dgm:layoutNode name="textparent_6">
+          <dgm:choose name="Name70">
+            <dgm:if name="Name71" func="var" arg="dir" op="equ" val="norm">
+              <dgm:alg type="lin">
+                <dgm:param type="horzAlign" val="l"/>
+              </dgm:alg>
+            </dgm:if>
+            <dgm:else name="Name72">
+              <dgm:alg type="lin">
+                <dgm:param type="horzAlign" val="r"/>
+              </dgm:alg>
+            </dgm:else>
+          </dgm:choose>
+          <dgm:shape xmlns:r="http://schemas.openxmlformats.org/officeDocument/2006/relationships" type="rect" r:blip="" hideGeom="1">
+            <dgm:adjLst/>
+          </dgm:shape>
+          <dgm:constrLst>
+            <dgm:constr type="userW" for="ch" forName="text_6" refType="w"/>
+            <dgm:constr type="h" for="ch" forName="text_6" refType="h"/>
+          </dgm:constrLst>
+          <dgm:presOf/>
+          <dgm:layoutNode name="text_6" styleLbl="revTx">
+            <dgm:varLst>
+              <dgm:bulletEnabled val="1"/>
+            </dgm:varLst>
+            <dgm:choose name="Name73">
+              <dgm:if name="Name74" func="var" arg="dir" op="equ" val="norm">
+                <dgm:alg type="tx">
+                  <dgm:param type="parTxLTRAlign" val="l"/>
+                  <dgm:param type="shpTxLTRAlignCh" val="l"/>
+                  <dgm:param type="parTxRTLAlign" val="r"/>
+                  <dgm:param type="shpTxRTLAlignCh" val="r"/>
+                </dgm:alg>
+              </dgm:if>
+              <dgm:else name="Name75">
+                <dgm:alg type="tx">
+                  <dgm:param type="parTxLTRAlign" val="r"/>
+                  <dgm:param type="shpTxLTRAlignCh" val="r"/>
+                  <dgm:param type="parTxRTLAlign" val="r"/>
+                  <dgm:param type="shpTxRTLAlignCh" val="r"/>
+                </dgm:alg>
+              </dgm:else>
+            </dgm:choose>
+            <dgm:shape xmlns:r="http://schemas.openxmlformats.org/officeDocument/2006/relationships" type="rect" r:blip="">
+              <dgm:adjLst/>
+            </dgm:shape>
+            <dgm:presOf axis="desOrSelf" ptType="node"/>
+            <dgm:constrLst>
+              <dgm:constr type="userW"/>
+              <dgm:constr type="w" refType="userW" fact="0.1"/>
+              <dgm:constr type="lMarg" refType="primFontSz" fact="0.3"/>
+              <dgm:constr type="rMarg" refType="primFontSz" fact="0.3"/>
+              <dgm:constr type="tMarg"/>
+              <dgm:constr type="bMarg"/>
+            </dgm:constrLst>
+            <dgm:ruleLst>
+              <dgm:rule type="w" val="NaN" fact="1" max="NaN"/>
+              <dgm:rule type="primFontSz" val="5" fact="NaN" max="NaN"/>
+            </dgm:ruleLst>
+          </dgm:layoutNode>
+        </dgm:layoutNode>
+      </dgm:forEach>
+      <dgm:forEach name="Name76" axis="ch" ptType="sibTrans" hideLastTrans="0" st="7" cnt="1">
+        <dgm:layoutNode name="picture_7">
+          <dgm:alg type="sp"/>
+          <dgm:shape xmlns:r="http://schemas.openxmlformats.org/officeDocument/2006/relationships" r:blip="">
+            <dgm:adjLst/>
+          </dgm:shape>
+          <dgm:presOf/>
+          <dgm:constrLst/>
+          <dgm:forEach name="Name77" ref="pictureRepeat"/>
+        </dgm:layoutNode>
+      </dgm:forEach>
+      <dgm:forEach name="Name78" axis="ch" ptType="node" st="7" cnt="1">
+        <dgm:layoutNode name="line_7" styleLbl="parChTrans1D1">
+          <dgm:alg type="sp"/>
+          <dgm:shape xmlns:r="http://schemas.openxmlformats.org/officeDocument/2006/relationships" type="line" r:blip="" zOrderOff="-100">
+            <dgm:adjLst/>
+          </dgm:shape>
+          <dgm:presOf/>
+        </dgm:layoutNode>
+        <dgm:layoutNode name="textparent_7">
+          <dgm:choose name="Name79">
+            <dgm:if name="Name80" func="var" arg="dir" op="equ" val="norm">
+              <dgm:alg type="lin">
+                <dgm:param type="horzAlign" val="l"/>
+              </dgm:alg>
+            </dgm:if>
+            <dgm:else name="Name81">
+              <dgm:alg type="lin">
+                <dgm:param type="horzAlign" val="r"/>
+              </dgm:alg>
+            </dgm:else>
+          </dgm:choose>
+          <dgm:shape xmlns:r="http://schemas.openxmlformats.org/officeDocument/2006/relationships" type="rect" r:blip="" hideGeom="1">
+            <dgm:adjLst/>
+          </dgm:shape>
+          <dgm:constrLst>
+            <dgm:constr type="userW" for="ch" forName="text_7" refType="w"/>
+            <dgm:constr type="h" for="ch" forName="text_7" refType="h"/>
+          </dgm:constrLst>
+          <dgm:presOf/>
+          <dgm:layoutNode name="text_7" styleLbl="revTx">
+            <dgm:varLst>
+              <dgm:bulletEnabled val="1"/>
+            </dgm:varLst>
+            <dgm:choose name="Name82">
+              <dgm:if name="Name83" func="var" arg="dir" op="equ" val="norm">
+                <dgm:alg type="tx">
+                  <dgm:param type="parTxLTRAlign" val="l"/>
+                  <dgm:param type="shpTxLTRAlignCh" val="l"/>
+                  <dgm:param type="parTxRTLAlign" val="r"/>
+                  <dgm:param type="shpTxRTLAlignCh" val="r"/>
+                </dgm:alg>
+              </dgm:if>
+              <dgm:else name="Name84">
+                <dgm:alg type="tx">
+                  <dgm:param type="parTxLTRAlign" val="r"/>
+                  <dgm:param type="shpTxLTRAlignCh" val="r"/>
+                  <dgm:param type="parTxRTLAlign" val="r"/>
+                  <dgm:param type="shpTxRTLAlignCh" val="r"/>
+                </dgm:alg>
+              </dgm:else>
+            </dgm:choose>
+            <dgm:shape xmlns:r="http://schemas.openxmlformats.org/officeDocument/2006/relationships" type="rect" r:blip="">
+              <dgm:adjLst/>
+            </dgm:shape>
+            <dgm:presOf axis="desOrSelf" ptType="node"/>
+            <dgm:constrLst>
+              <dgm:constr type="userW"/>
+              <dgm:constr type="w" refType="userW" fact="0.1"/>
+              <dgm:constr type="lMarg" refType="primFontSz" fact="0.3"/>
+              <dgm:constr type="rMarg" refType="primFontSz" fact="0.3"/>
+              <dgm:constr type="tMarg"/>
+              <dgm:constr type="bMarg"/>
+            </dgm:constrLst>
+            <dgm:ruleLst>
+              <dgm:rule type="w" val="NaN" fact="1" max="NaN"/>
+              <dgm:rule type="primFontSz" val="5" fact="NaN" max="NaN"/>
+            </dgm:ruleLst>
+          </dgm:layoutNode>
+        </dgm:layoutNode>
+      </dgm:forEach>
+    </dgm:layoutNode>
+  </dgm:layoutNode>
+</dgm:layoutDef>
+</file>
+
+<file path=ppt/diagrams/layout2.xml><?xml version="1.0" encoding="utf-8"?>
 <dgm:layoutDef xmlns:dgm="http://schemas.openxmlformats.org/drawingml/2006/diagram" xmlns:a="http://schemas.openxmlformats.org/drawingml/2006/main" uniqueId="urn:microsoft.com/office/officeart/2008/layout/CircularPictureCallout">
   <dgm:title val=""/>
   <dgm:desc val=""/>
@@ -3588,6 +6008,1040 @@
 </dgm:styleDef>
 </file>
 
+<file path=ppt/diagrams/quickStyle2.xml><?xml version="1.0" encoding="utf-8"?>
+<dgm:styleDef xmlns:dgm="http://schemas.openxmlformats.org/drawingml/2006/diagram" xmlns:a="http://schemas.openxmlformats.org/drawingml/2006/main" uniqueId="urn:microsoft.com/office/officeart/2005/8/quickstyle/simple1">
+  <dgm:title val=""/>
+  <dgm:desc val=""/>
+  <dgm:catLst>
+    <dgm:cat type="simple" pri="10100"/>
+  </dgm:catLst>
+  <dgm:scene3d>
+    <a:camera prst="orthographicFront"/>
+    <a:lightRig rig="threePt" dir="t"/>
+  </dgm:scene3d>
+  <dgm:styleLbl name="node0">
+    <dgm:scene3d>
+      <a:camera prst="orthographicFront"/>
+      <a:lightRig rig="threePt" dir="t"/>
+    </dgm:scene3d>
+    <dgm:sp3d/>
+    <dgm:txPr/>
+    <dgm:style>
+      <a:lnRef idx="2">
+        <a:scrgbClr r="0" g="0" b="0"/>
+      </a:lnRef>
+      <a:fillRef idx="1">
+        <a:scrgbClr r="0" g="0" b="0"/>
+      </a:fillRef>
+      <a:effectRef idx="0">
+        <a:scrgbClr r="0" g="0" b="0"/>
+      </a:effectRef>
+      <a:fontRef idx="minor">
+        <a:schemeClr val="lt1"/>
+      </a:fontRef>
+    </dgm:style>
+  </dgm:styleLbl>
+  <dgm:styleLbl name="lnNode1">
+    <dgm:scene3d>
+      <a:camera prst="orthographicFront"/>
+      <a:lightRig rig="threePt" dir="t"/>
+    </dgm:scene3d>
+    <dgm:sp3d/>
+    <dgm:txPr/>
+    <dgm:style>
+      <a:lnRef idx="2">
+        <a:scrgbClr r="0" g="0" b="0"/>
+      </a:lnRef>
+      <a:fillRef idx="1">
+        <a:scrgbClr r="0" g="0" b="0"/>
+      </a:fillRef>
+      <a:effectRef idx="0">
+        <a:scrgbClr r="0" g="0" b="0"/>
+      </a:effectRef>
+      <a:fontRef idx="minor">
+        <a:schemeClr val="lt1"/>
+      </a:fontRef>
+    </dgm:style>
+  </dgm:styleLbl>
+  <dgm:styleLbl name="vennNode1">
+    <dgm:scene3d>
+      <a:camera prst="orthographicFront"/>
+      <a:lightRig rig="threePt" dir="t"/>
+    </dgm:scene3d>
+    <dgm:sp3d/>
+    <dgm:txPr/>
+    <dgm:style>
+      <a:lnRef idx="2">
+        <a:scrgbClr r="0" g="0" b="0"/>
+      </a:lnRef>
+      <a:fillRef idx="1">
+        <a:scrgbClr r="0" g="0" b="0"/>
+      </a:fillRef>
+      <a:effectRef idx="0">
+        <a:scrgbClr r="0" g="0" b="0"/>
+      </a:effectRef>
+      <a:fontRef idx="minor">
+        <a:schemeClr val="tx1"/>
+      </a:fontRef>
+    </dgm:style>
+  </dgm:styleLbl>
+  <dgm:styleLbl name="alignNode1">
+    <dgm:scene3d>
+      <a:camera prst="orthographicFront"/>
+      <a:lightRig rig="threePt" dir="t"/>
+    </dgm:scene3d>
+    <dgm:sp3d/>
+    <dgm:txPr/>
+    <dgm:style>
+      <a:lnRef idx="2">
+        <a:scrgbClr r="0" g="0" b="0"/>
+      </a:lnRef>
+      <a:fillRef idx="1">
+        <a:scrgbClr r="0" g="0" b="0"/>
+      </a:fillRef>
+      <a:effectRef idx="0">
+        <a:scrgbClr r="0" g="0" b="0"/>
+      </a:effectRef>
+      <a:fontRef idx="minor">
+        <a:schemeClr val="lt1"/>
+      </a:fontRef>
+    </dgm:style>
+  </dgm:styleLbl>
+  <dgm:styleLbl name="node1">
+    <dgm:scene3d>
+      <a:camera prst="orthographicFront"/>
+      <a:lightRig rig="threePt" dir="t"/>
+    </dgm:scene3d>
+    <dgm:sp3d/>
+    <dgm:txPr/>
+    <dgm:style>
+      <a:lnRef idx="2">
+        <a:scrgbClr r="0" g="0" b="0"/>
+      </a:lnRef>
+      <a:fillRef idx="1">
+        <a:scrgbClr r="0" g="0" b="0"/>
+      </a:fillRef>
+      <a:effectRef idx="0">
+        <a:scrgbClr r="0" g="0" b="0"/>
+      </a:effectRef>
+      <a:fontRef idx="minor">
+        <a:schemeClr val="lt1"/>
+      </a:fontRef>
+    </dgm:style>
+  </dgm:styleLbl>
+  <dgm:styleLbl name="node2">
+    <dgm:scene3d>
+      <a:camera prst="orthographicFront"/>
+      <a:lightRig rig="threePt" dir="t"/>
+    </dgm:scene3d>
+    <dgm:sp3d/>
+    <dgm:txPr/>
+    <dgm:style>
+      <a:lnRef idx="2">
+        <a:scrgbClr r="0" g="0" b="0"/>
+      </a:lnRef>
+      <a:fillRef idx="1">
+        <a:scrgbClr r="0" g="0" b="0"/>
+      </a:fillRef>
+      <a:effectRef idx="0">
+        <a:scrgbClr r="0" g="0" b="0"/>
+      </a:effectRef>
+      <a:fontRef idx="minor">
+        <a:schemeClr val="lt1"/>
+      </a:fontRef>
+    </dgm:style>
+  </dgm:styleLbl>
+  <dgm:styleLbl name="node3">
+    <dgm:scene3d>
+      <a:camera prst="orthographicFront"/>
+      <a:lightRig rig="threePt" dir="t"/>
+    </dgm:scene3d>
+    <dgm:sp3d/>
+    <dgm:txPr/>
+    <dgm:style>
+      <a:lnRef idx="2">
+        <a:scrgbClr r="0" g="0" b="0"/>
+      </a:lnRef>
+      <a:fillRef idx="1">
+        <a:scrgbClr r="0" g="0" b="0"/>
+      </a:fillRef>
+      <a:effectRef idx="0">
+        <a:scrgbClr r="0" g="0" b="0"/>
+      </a:effectRef>
+      <a:fontRef idx="minor">
+        <a:schemeClr val="lt1"/>
+      </a:fontRef>
+    </dgm:style>
+  </dgm:styleLbl>
+  <dgm:styleLbl name="node4">
+    <dgm:scene3d>
+      <a:camera prst="orthographicFront"/>
+      <a:lightRig rig="threePt" dir="t"/>
+    </dgm:scene3d>
+    <dgm:sp3d/>
+    <dgm:txPr/>
+    <dgm:style>
+      <a:lnRef idx="2">
+        <a:scrgbClr r="0" g="0" b="0"/>
+      </a:lnRef>
+      <a:fillRef idx="1">
+        <a:scrgbClr r="0" g="0" b="0"/>
+      </a:fillRef>
+      <a:effectRef idx="0">
+        <a:scrgbClr r="0" g="0" b="0"/>
+      </a:effectRef>
+      <a:fontRef idx="minor">
+        <a:schemeClr val="lt1"/>
+      </a:fontRef>
+    </dgm:style>
+  </dgm:styleLbl>
+  <dgm:styleLbl name="fgImgPlace1">
+    <dgm:scene3d>
+      <a:camera prst="orthographicFront"/>
+      <a:lightRig rig="threePt" dir="t"/>
+    </dgm:scene3d>
+    <dgm:sp3d/>
+    <dgm:txPr/>
+    <dgm:style>
+      <a:lnRef idx="2">
+        <a:scrgbClr r="0" g="0" b="0"/>
+      </a:lnRef>
+      <a:fillRef idx="1">
+        <a:scrgbClr r="0" g="0" b="0"/>
+      </a:fillRef>
+      <a:effectRef idx="0">
+        <a:scrgbClr r="0" g="0" b="0"/>
+      </a:effectRef>
+      <a:fontRef idx="minor"/>
+    </dgm:style>
+  </dgm:styleLbl>
+  <dgm:styleLbl name="alignImgPlace1">
+    <dgm:scene3d>
+      <a:camera prst="orthographicFront"/>
+      <a:lightRig rig="threePt" dir="t"/>
+    </dgm:scene3d>
+    <dgm:sp3d/>
+    <dgm:txPr/>
+    <dgm:style>
+      <a:lnRef idx="2">
+        <a:scrgbClr r="0" g="0" b="0"/>
+      </a:lnRef>
+      <a:fillRef idx="1">
+        <a:scrgbClr r="0" g="0" b="0"/>
+      </a:fillRef>
+      <a:effectRef idx="0">
+        <a:scrgbClr r="0" g="0" b="0"/>
+      </a:effectRef>
+      <a:fontRef idx="minor"/>
+    </dgm:style>
+  </dgm:styleLbl>
+  <dgm:styleLbl name="bgImgPlace1">
+    <dgm:scene3d>
+      <a:camera prst="orthographicFront"/>
+      <a:lightRig rig="threePt" dir="t"/>
+    </dgm:scene3d>
+    <dgm:sp3d/>
+    <dgm:txPr/>
+    <dgm:style>
+      <a:lnRef idx="2">
+        <a:scrgbClr r="0" g="0" b="0"/>
+      </a:lnRef>
+      <a:fillRef idx="1">
+        <a:scrgbClr r="0" g="0" b="0"/>
+      </a:fillRef>
+      <a:effectRef idx="0">
+        <a:scrgbClr r="0" g="0" b="0"/>
+      </a:effectRef>
+      <a:fontRef idx="minor"/>
+    </dgm:style>
+  </dgm:styleLbl>
+  <dgm:styleLbl name="sibTrans2D1">
+    <dgm:scene3d>
+      <a:camera prst="orthographicFront"/>
+      <a:lightRig rig="threePt" dir="t"/>
+    </dgm:scene3d>
+    <dgm:sp3d/>
+    <dgm:txPr/>
+    <dgm:style>
+      <a:lnRef idx="0">
+        <a:scrgbClr r="0" g="0" b="0"/>
+      </a:lnRef>
+      <a:fillRef idx="1">
+        <a:scrgbClr r="0" g="0" b="0"/>
+      </a:fillRef>
+      <a:effectRef idx="0">
+        <a:scrgbClr r="0" g="0" b="0"/>
+      </a:effectRef>
+      <a:fontRef idx="minor">
+        <a:schemeClr val="lt1"/>
+      </a:fontRef>
+    </dgm:style>
+  </dgm:styleLbl>
+  <dgm:styleLbl name="fgSibTrans2D1">
+    <dgm:scene3d>
+      <a:camera prst="orthographicFront"/>
+      <a:lightRig rig="threePt" dir="t"/>
+    </dgm:scene3d>
+    <dgm:sp3d/>
+    <dgm:txPr/>
+    <dgm:style>
+      <a:lnRef idx="0">
+        <a:scrgbClr r="0" g="0" b="0"/>
+      </a:lnRef>
+      <a:fillRef idx="1">
+        <a:scrgbClr r="0" g="0" b="0"/>
+      </a:fillRef>
+      <a:effectRef idx="0">
+        <a:scrgbClr r="0" g="0" b="0"/>
+      </a:effectRef>
+      <a:fontRef idx="minor">
+        <a:schemeClr val="lt1"/>
+      </a:fontRef>
+    </dgm:style>
+  </dgm:styleLbl>
+  <dgm:styleLbl name="bgSibTrans2D1">
+    <dgm:scene3d>
+      <a:camera prst="orthographicFront"/>
+      <a:lightRig rig="threePt" dir="t"/>
+    </dgm:scene3d>
+    <dgm:sp3d/>
+    <dgm:txPr/>
+    <dgm:style>
+      <a:lnRef idx="0">
+        <a:scrgbClr r="0" g="0" b="0"/>
+      </a:lnRef>
+      <a:fillRef idx="1">
+        <a:scrgbClr r="0" g="0" b="0"/>
+      </a:fillRef>
+      <a:effectRef idx="0">
+        <a:scrgbClr r="0" g="0" b="0"/>
+      </a:effectRef>
+      <a:fontRef idx="minor">
+        <a:schemeClr val="lt1"/>
+      </a:fontRef>
+    </dgm:style>
+  </dgm:styleLbl>
+  <dgm:styleLbl name="sibTrans1D1">
+    <dgm:scene3d>
+      <a:camera prst="orthographicFront"/>
+      <a:lightRig rig="threePt" dir="t"/>
+    </dgm:scene3d>
+    <dgm:sp3d/>
+    <dgm:txPr/>
+    <dgm:style>
+      <a:lnRef idx="1">
+        <a:scrgbClr r="0" g="0" b="0"/>
+      </a:lnRef>
+      <a:fillRef idx="0">
+        <a:scrgbClr r="0" g="0" b="0"/>
+      </a:fillRef>
+      <a:effectRef idx="0">
+        <a:scrgbClr r="0" g="0" b="0"/>
+      </a:effectRef>
+      <a:fontRef idx="minor"/>
+    </dgm:style>
+  </dgm:styleLbl>
+  <dgm:styleLbl name="callout">
+    <dgm:scene3d>
+      <a:camera prst="orthographicFront"/>
+      <a:lightRig rig="threePt" dir="t"/>
+    </dgm:scene3d>
+    <dgm:sp3d/>
+    <dgm:txPr/>
+    <dgm:style>
+      <a:lnRef idx="2">
+        <a:scrgbClr r="0" g="0" b="0"/>
+      </a:lnRef>
+      <a:fillRef idx="1">
+        <a:scrgbClr r="0" g="0" b="0"/>
+      </a:fillRef>
+      <a:effectRef idx="0">
+        <a:scrgbClr r="0" g="0" b="0"/>
+      </a:effectRef>
+      <a:fontRef idx="minor"/>
+    </dgm:style>
+  </dgm:styleLbl>
+  <dgm:styleLbl name="asst0">
+    <dgm:scene3d>
+      <a:camera prst="orthographicFront"/>
+      <a:lightRig rig="threePt" dir="t"/>
+    </dgm:scene3d>
+    <dgm:sp3d/>
+    <dgm:txPr/>
+    <dgm:style>
+      <a:lnRef idx="2">
+        <a:scrgbClr r="0" g="0" b="0"/>
+      </a:lnRef>
+      <a:fillRef idx="1">
+        <a:scrgbClr r="0" g="0" b="0"/>
+      </a:fillRef>
+      <a:effectRef idx="0">
+        <a:scrgbClr r="0" g="0" b="0"/>
+      </a:effectRef>
+      <a:fontRef idx="minor">
+        <a:schemeClr val="lt1"/>
+      </a:fontRef>
+    </dgm:style>
+  </dgm:styleLbl>
+  <dgm:styleLbl name="asst1">
+    <dgm:scene3d>
+      <a:camera prst="orthographicFront"/>
+      <a:lightRig rig="threePt" dir="t"/>
+    </dgm:scene3d>
+    <dgm:sp3d/>
+    <dgm:txPr/>
+    <dgm:style>
+      <a:lnRef idx="2">
+        <a:scrgbClr r="0" g="0" b="0"/>
+      </a:lnRef>
+      <a:fillRef idx="1">
+        <a:scrgbClr r="0" g="0" b="0"/>
+      </a:fillRef>
+      <a:effectRef idx="0">
+        <a:scrgbClr r="0" g="0" b="0"/>
+      </a:effectRef>
+      <a:fontRef idx="minor">
+        <a:schemeClr val="lt1"/>
+      </a:fontRef>
+    </dgm:style>
+  </dgm:styleLbl>
+  <dgm:styleLbl name="asst2">
+    <dgm:scene3d>
+      <a:camera prst="orthographicFront"/>
+      <a:lightRig rig="threePt" dir="t"/>
+    </dgm:scene3d>
+    <dgm:sp3d/>
+    <dgm:txPr/>
+    <dgm:style>
+      <a:lnRef idx="2">
+        <a:scrgbClr r="0" g="0" b="0"/>
+      </a:lnRef>
+      <a:fillRef idx="1">
+        <a:scrgbClr r="0" g="0" b="0"/>
+      </a:fillRef>
+      <a:effectRef idx="0">
+        <a:scrgbClr r="0" g="0" b="0"/>
+      </a:effectRef>
+      <a:fontRef idx="minor">
+        <a:schemeClr val="lt1"/>
+      </a:fontRef>
+    </dgm:style>
+  </dgm:styleLbl>
+  <dgm:styleLbl name="asst3">
+    <dgm:scene3d>
+      <a:camera prst="orthographicFront"/>
+      <a:lightRig rig="threePt" dir="t"/>
+    </dgm:scene3d>
+    <dgm:sp3d/>
+    <dgm:txPr/>
+    <dgm:style>
+      <a:lnRef idx="2">
+        <a:scrgbClr r="0" g="0" b="0"/>
+      </a:lnRef>
+      <a:fillRef idx="1">
+        <a:scrgbClr r="0" g="0" b="0"/>
+      </a:fillRef>
+      <a:effectRef idx="0">
+        <a:scrgbClr r="0" g="0" b="0"/>
+      </a:effectRef>
+      <a:fontRef idx="minor">
+        <a:schemeClr val="lt1"/>
+      </a:fontRef>
+    </dgm:style>
+  </dgm:styleLbl>
+  <dgm:styleLbl name="asst4">
+    <dgm:scene3d>
+      <a:camera prst="orthographicFront"/>
+      <a:lightRig rig="threePt" dir="t"/>
+    </dgm:scene3d>
+    <dgm:sp3d/>
+    <dgm:txPr/>
+    <dgm:style>
+      <a:lnRef idx="2">
+        <a:scrgbClr r="0" g="0" b="0"/>
+      </a:lnRef>
+      <a:fillRef idx="1">
+        <a:scrgbClr r="0" g="0" b="0"/>
+      </a:fillRef>
+      <a:effectRef idx="0">
+        <a:scrgbClr r="0" g="0" b="0"/>
+      </a:effectRef>
+      <a:fontRef idx="minor">
+        <a:schemeClr val="lt1"/>
+      </a:fontRef>
+    </dgm:style>
+  </dgm:styleLbl>
+  <dgm:styleLbl name="parChTrans2D1">
+    <dgm:scene3d>
+      <a:camera prst="orthographicFront"/>
+      <a:lightRig rig="threePt" dir="t"/>
+    </dgm:scene3d>
+    <dgm:sp3d/>
+    <dgm:txPr/>
+    <dgm:style>
+      <a:lnRef idx="2">
+        <a:scrgbClr r="0" g="0" b="0"/>
+      </a:lnRef>
+      <a:fillRef idx="1">
+        <a:scrgbClr r="0" g="0" b="0"/>
+      </a:fillRef>
+      <a:effectRef idx="0">
+        <a:scrgbClr r="0" g="0" b="0"/>
+      </a:effectRef>
+      <a:fontRef idx="minor">
+        <a:schemeClr val="lt1"/>
+      </a:fontRef>
+    </dgm:style>
+  </dgm:styleLbl>
+  <dgm:styleLbl name="parChTrans2D2">
+    <dgm:scene3d>
+      <a:camera prst="orthographicFront"/>
+      <a:lightRig rig="threePt" dir="t"/>
+    </dgm:scene3d>
+    <dgm:sp3d/>
+    <dgm:txPr/>
+    <dgm:style>
+      <a:lnRef idx="2">
+        <a:scrgbClr r="0" g="0" b="0"/>
+      </a:lnRef>
+      <a:fillRef idx="1">
+        <a:scrgbClr r="0" g="0" b="0"/>
+      </a:fillRef>
+      <a:effectRef idx="0">
+        <a:scrgbClr r="0" g="0" b="0"/>
+      </a:effectRef>
+      <a:fontRef idx="minor">
+        <a:schemeClr val="lt1"/>
+      </a:fontRef>
+    </dgm:style>
+  </dgm:styleLbl>
+  <dgm:styleLbl name="parChTrans2D3">
+    <dgm:scene3d>
+      <a:camera prst="orthographicFront"/>
+      <a:lightRig rig="threePt" dir="t"/>
+    </dgm:scene3d>
+    <dgm:sp3d/>
+    <dgm:txPr/>
+    <dgm:style>
+      <a:lnRef idx="2">
+        <a:scrgbClr r="0" g="0" b="0"/>
+      </a:lnRef>
+      <a:fillRef idx="1">
+        <a:scrgbClr r="0" g="0" b="0"/>
+      </a:fillRef>
+      <a:effectRef idx="0">
+        <a:scrgbClr r="0" g="0" b="0"/>
+      </a:effectRef>
+      <a:fontRef idx="minor">
+        <a:schemeClr val="lt1"/>
+      </a:fontRef>
+    </dgm:style>
+  </dgm:styleLbl>
+  <dgm:styleLbl name="parChTrans2D4">
+    <dgm:scene3d>
+      <a:camera prst="orthographicFront"/>
+      <a:lightRig rig="threePt" dir="t"/>
+    </dgm:scene3d>
+    <dgm:sp3d/>
+    <dgm:txPr/>
+    <dgm:style>
+      <a:lnRef idx="2">
+        <a:scrgbClr r="0" g="0" b="0"/>
+      </a:lnRef>
+      <a:fillRef idx="1">
+        <a:scrgbClr r="0" g="0" b="0"/>
+      </a:fillRef>
+      <a:effectRef idx="0">
+        <a:scrgbClr r="0" g="0" b="0"/>
+      </a:effectRef>
+      <a:fontRef idx="minor">
+        <a:schemeClr val="lt1"/>
+      </a:fontRef>
+    </dgm:style>
+  </dgm:styleLbl>
+  <dgm:styleLbl name="parChTrans1D1">
+    <dgm:scene3d>
+      <a:camera prst="orthographicFront"/>
+      <a:lightRig rig="threePt" dir="t"/>
+    </dgm:scene3d>
+    <dgm:sp3d/>
+    <dgm:txPr/>
+    <dgm:style>
+      <a:lnRef idx="2">
+        <a:scrgbClr r="0" g="0" b="0"/>
+      </a:lnRef>
+      <a:fillRef idx="0">
+        <a:scrgbClr r="0" g="0" b="0"/>
+      </a:fillRef>
+      <a:effectRef idx="0">
+        <a:scrgbClr r="0" g="0" b="0"/>
+      </a:effectRef>
+      <a:fontRef idx="minor"/>
+    </dgm:style>
+  </dgm:styleLbl>
+  <dgm:styleLbl name="parChTrans1D2">
+    <dgm:scene3d>
+      <a:camera prst="orthographicFront"/>
+      <a:lightRig rig="threePt" dir="t"/>
+    </dgm:scene3d>
+    <dgm:sp3d/>
+    <dgm:txPr/>
+    <dgm:style>
+      <a:lnRef idx="2">
+        <a:scrgbClr r="0" g="0" b="0"/>
+      </a:lnRef>
+      <a:fillRef idx="0">
+        <a:scrgbClr r="0" g="0" b="0"/>
+      </a:fillRef>
+      <a:effectRef idx="0">
+        <a:scrgbClr r="0" g="0" b="0"/>
+      </a:effectRef>
+      <a:fontRef idx="minor"/>
+    </dgm:style>
+  </dgm:styleLbl>
+  <dgm:styleLbl name="parChTrans1D3">
+    <dgm:scene3d>
+      <a:camera prst="orthographicFront"/>
+      <a:lightRig rig="threePt" dir="t"/>
+    </dgm:scene3d>
+    <dgm:sp3d/>
+    <dgm:txPr/>
+    <dgm:style>
+      <a:lnRef idx="2">
+        <a:scrgbClr r="0" g="0" b="0"/>
+      </a:lnRef>
+      <a:fillRef idx="0">
+        <a:scrgbClr r="0" g="0" b="0"/>
+      </a:fillRef>
+      <a:effectRef idx="0">
+        <a:scrgbClr r="0" g="0" b="0"/>
+      </a:effectRef>
+      <a:fontRef idx="minor"/>
+    </dgm:style>
+  </dgm:styleLbl>
+  <dgm:styleLbl name="parChTrans1D4">
+    <dgm:scene3d>
+      <a:camera prst="orthographicFront"/>
+      <a:lightRig rig="threePt" dir="t"/>
+    </dgm:scene3d>
+    <dgm:sp3d/>
+    <dgm:txPr/>
+    <dgm:style>
+      <a:lnRef idx="2">
+        <a:scrgbClr r="0" g="0" b="0"/>
+      </a:lnRef>
+      <a:fillRef idx="0">
+        <a:scrgbClr r="0" g="0" b="0"/>
+      </a:fillRef>
+      <a:effectRef idx="0">
+        <a:scrgbClr r="0" g="0" b="0"/>
+      </a:effectRef>
+      <a:fontRef idx="minor"/>
+    </dgm:style>
+  </dgm:styleLbl>
+  <dgm:styleLbl name="fgAcc1">
+    <dgm:scene3d>
+      <a:camera prst="orthographicFront"/>
+      <a:lightRig rig="threePt" dir="t"/>
+    </dgm:scene3d>
+    <dgm:sp3d/>
+    <dgm:txPr/>
+    <dgm:style>
+      <a:lnRef idx="2">
+        <a:scrgbClr r="0" g="0" b="0"/>
+      </a:lnRef>
+      <a:fillRef idx="1">
+        <a:scrgbClr r="0" g="0" b="0"/>
+      </a:fillRef>
+      <a:effectRef idx="0">
+        <a:scrgbClr r="0" g="0" b="0"/>
+      </a:effectRef>
+      <a:fontRef idx="minor"/>
+    </dgm:style>
+  </dgm:styleLbl>
+  <dgm:styleLbl name="conFgAcc1">
+    <dgm:scene3d>
+      <a:camera prst="orthographicFront"/>
+      <a:lightRig rig="threePt" dir="t"/>
+    </dgm:scene3d>
+    <dgm:sp3d/>
+    <dgm:txPr/>
+    <dgm:style>
+      <a:lnRef idx="2">
+        <a:scrgbClr r="0" g="0" b="0"/>
+      </a:lnRef>
+      <a:fillRef idx="1">
+        <a:scrgbClr r="0" g="0" b="0"/>
+      </a:fillRef>
+      <a:effectRef idx="0">
+        <a:scrgbClr r="0" g="0" b="0"/>
+      </a:effectRef>
+      <a:fontRef idx="minor"/>
+    </dgm:style>
+  </dgm:styleLbl>
+  <dgm:styleLbl name="alignAcc1">
+    <dgm:scene3d>
+      <a:camera prst="orthographicFront"/>
+      <a:lightRig rig="threePt" dir="t"/>
+    </dgm:scene3d>
+    <dgm:sp3d/>
+    <dgm:txPr/>
+    <dgm:style>
+      <a:lnRef idx="2">
+        <a:scrgbClr r="0" g="0" b="0"/>
+      </a:lnRef>
+      <a:fillRef idx="1">
+        <a:scrgbClr r="0" g="0" b="0"/>
+      </a:fillRef>
+      <a:effectRef idx="0">
+        <a:scrgbClr r="0" g="0" b="0"/>
+      </a:effectRef>
+      <a:fontRef idx="minor"/>
+    </dgm:style>
+  </dgm:styleLbl>
+  <dgm:styleLbl name="trAlignAcc1">
+    <dgm:scene3d>
+      <a:camera prst="orthographicFront"/>
+      <a:lightRig rig="threePt" dir="t"/>
+    </dgm:scene3d>
+    <dgm:sp3d/>
+    <dgm:txPr/>
+    <dgm:style>
+      <a:lnRef idx="1">
+        <a:scrgbClr r="0" g="0" b="0"/>
+      </a:lnRef>
+      <a:fillRef idx="1">
+        <a:scrgbClr r="0" g="0" b="0"/>
+      </a:fillRef>
+      <a:effectRef idx="0">
+        <a:scrgbClr r="0" g="0" b="0"/>
+      </a:effectRef>
+      <a:fontRef idx="minor"/>
+    </dgm:style>
+  </dgm:styleLbl>
+  <dgm:styleLbl name="bgAcc1">
+    <dgm:scene3d>
+      <a:camera prst="orthographicFront"/>
+      <a:lightRig rig="threePt" dir="t"/>
+    </dgm:scene3d>
+    <dgm:sp3d/>
+    <dgm:txPr/>
+    <dgm:style>
+      <a:lnRef idx="2">
+        <a:scrgbClr r="0" g="0" b="0"/>
+      </a:lnRef>
+      <a:fillRef idx="1">
+        <a:scrgbClr r="0" g="0" b="0"/>
+      </a:fillRef>
+      <a:effectRef idx="0">
+        <a:scrgbClr r="0" g="0" b="0"/>
+      </a:effectRef>
+      <a:fontRef idx="minor"/>
+    </dgm:style>
+  </dgm:styleLbl>
+  <dgm:styleLbl name="solidFgAcc1">
+    <dgm:scene3d>
+      <a:camera prst="orthographicFront"/>
+      <a:lightRig rig="threePt" dir="t"/>
+    </dgm:scene3d>
+    <dgm:sp3d/>
+    <dgm:txPr/>
+    <dgm:style>
+      <a:lnRef idx="2">
+        <a:scrgbClr r="0" g="0" b="0"/>
+      </a:lnRef>
+      <a:fillRef idx="1">
+        <a:scrgbClr r="0" g="0" b="0"/>
+      </a:fillRef>
+      <a:effectRef idx="0">
+        <a:scrgbClr r="0" g="0" b="0"/>
+      </a:effectRef>
+      <a:fontRef idx="minor"/>
+    </dgm:style>
+  </dgm:styleLbl>
+  <dgm:styleLbl name="solidAlignAcc1">
+    <dgm:scene3d>
+      <a:camera prst="orthographicFront"/>
+      <a:lightRig rig="threePt" dir="t"/>
+    </dgm:scene3d>
+    <dgm:sp3d/>
+    <dgm:txPr/>
+    <dgm:style>
+      <a:lnRef idx="2">
+        <a:scrgbClr r="0" g="0" b="0"/>
+      </a:lnRef>
+      <a:fillRef idx="1">
+        <a:scrgbClr r="0" g="0" b="0"/>
+      </a:fillRef>
+      <a:effectRef idx="0">
+        <a:scrgbClr r="0" g="0" b="0"/>
+      </a:effectRef>
+      <a:fontRef idx="minor"/>
+    </dgm:style>
+  </dgm:styleLbl>
+  <dgm:styleLbl name="solidBgAcc1">
+    <dgm:scene3d>
+      <a:camera prst="orthographicFront"/>
+      <a:lightRig rig="threePt" dir="t"/>
+    </dgm:scene3d>
+    <dgm:sp3d/>
+    <dgm:txPr/>
+    <dgm:style>
+      <a:lnRef idx="2">
+        <a:scrgbClr r="0" g="0" b="0"/>
+      </a:lnRef>
+      <a:fillRef idx="1">
+        <a:scrgbClr r="0" g="0" b="0"/>
+      </a:fillRef>
+      <a:effectRef idx="0">
+        <a:scrgbClr r="0" g="0" b="0"/>
+      </a:effectRef>
+      <a:fontRef idx="minor"/>
+    </dgm:style>
+  </dgm:styleLbl>
+  <dgm:styleLbl name="fgAccFollowNode1">
+    <dgm:scene3d>
+      <a:camera prst="orthographicFront"/>
+      <a:lightRig rig="threePt" dir="t"/>
+    </dgm:scene3d>
+    <dgm:sp3d/>
+    <dgm:txPr/>
+    <dgm:style>
+      <a:lnRef idx="2">
+        <a:scrgbClr r="0" g="0" b="0"/>
+      </a:lnRef>
+      <a:fillRef idx="1">
+        <a:scrgbClr r="0" g="0" b="0"/>
+      </a:fillRef>
+      <a:effectRef idx="0">
+        <a:scrgbClr r="0" g="0" b="0"/>
+      </a:effectRef>
+      <a:fontRef idx="minor"/>
+    </dgm:style>
+  </dgm:styleLbl>
+  <dgm:styleLbl name="alignAccFollowNode1">
+    <dgm:scene3d>
+      <a:camera prst="orthographicFront"/>
+      <a:lightRig rig="threePt" dir="t"/>
+    </dgm:scene3d>
+    <dgm:sp3d/>
+    <dgm:txPr/>
+    <dgm:style>
+      <a:lnRef idx="2">
+        <a:scrgbClr r="0" g="0" b="0"/>
+      </a:lnRef>
+      <a:fillRef idx="1">
+        <a:scrgbClr r="0" g="0" b="0"/>
+      </a:fillRef>
+      <a:effectRef idx="0">
+        <a:scrgbClr r="0" g="0" b="0"/>
+      </a:effectRef>
+      <a:fontRef idx="minor"/>
+    </dgm:style>
+  </dgm:styleLbl>
+  <dgm:styleLbl name="bgAccFollowNode1">
+    <dgm:scene3d>
+      <a:camera prst="orthographicFront"/>
+      <a:lightRig rig="threePt" dir="t"/>
+    </dgm:scene3d>
+    <dgm:sp3d/>
+    <dgm:txPr/>
+    <dgm:style>
+      <a:lnRef idx="2">
+        <a:scrgbClr r="0" g="0" b="0"/>
+      </a:lnRef>
+      <a:fillRef idx="1">
+        <a:scrgbClr r="0" g="0" b="0"/>
+      </a:fillRef>
+      <a:effectRef idx="0">
+        <a:scrgbClr r="0" g="0" b="0"/>
+      </a:effectRef>
+      <a:fontRef idx="minor"/>
+    </dgm:style>
+  </dgm:styleLbl>
+  <dgm:styleLbl name="fgAcc0">
+    <dgm:scene3d>
+      <a:camera prst="orthographicFront"/>
+      <a:lightRig rig="threePt" dir="t"/>
+    </dgm:scene3d>
+    <dgm:sp3d/>
+    <dgm:txPr/>
+    <dgm:style>
+      <a:lnRef idx="2">
+        <a:scrgbClr r="0" g="0" b="0"/>
+      </a:lnRef>
+      <a:fillRef idx="1">
+        <a:scrgbClr r="0" g="0" b="0"/>
+      </a:fillRef>
+      <a:effectRef idx="0">
+        <a:scrgbClr r="0" g="0" b="0"/>
+      </a:effectRef>
+      <a:fontRef idx="minor"/>
+    </dgm:style>
+  </dgm:styleLbl>
+  <dgm:styleLbl name="fgAcc2">
+    <dgm:scene3d>
+      <a:camera prst="orthographicFront"/>
+      <a:lightRig rig="threePt" dir="t"/>
+    </dgm:scene3d>
+    <dgm:sp3d/>
+    <dgm:txPr/>
+    <dgm:style>
+      <a:lnRef idx="2">
+        <a:scrgbClr r="0" g="0" b="0"/>
+      </a:lnRef>
+      <a:fillRef idx="1">
+        <a:scrgbClr r="0" g="0" b="0"/>
+      </a:fillRef>
+      <a:effectRef idx="0">
+        <a:scrgbClr r="0" g="0" b="0"/>
+      </a:effectRef>
+      <a:fontRef idx="minor"/>
+    </dgm:style>
+  </dgm:styleLbl>
+  <dgm:styleLbl name="fgAcc3">
+    <dgm:scene3d>
+      <a:camera prst="orthographicFront"/>
+      <a:lightRig rig="threePt" dir="t"/>
+    </dgm:scene3d>
+    <dgm:sp3d/>
+    <dgm:txPr/>
+    <dgm:style>
+      <a:lnRef idx="2">
+        <a:scrgbClr r="0" g="0" b="0"/>
+      </a:lnRef>
+      <a:fillRef idx="1">
+        <a:scrgbClr r="0" g="0" b="0"/>
+      </a:fillRef>
+      <a:effectRef idx="0">
+        <a:scrgbClr r="0" g="0" b="0"/>
+      </a:effectRef>
+      <a:fontRef idx="minor"/>
+    </dgm:style>
+  </dgm:styleLbl>
+  <dgm:styleLbl name="fgAcc4">
+    <dgm:scene3d>
+      <a:camera prst="orthographicFront"/>
+      <a:lightRig rig="threePt" dir="t"/>
+    </dgm:scene3d>
+    <dgm:sp3d/>
+    <dgm:txPr/>
+    <dgm:style>
+      <a:lnRef idx="2">
+        <a:scrgbClr r="0" g="0" b="0"/>
+      </a:lnRef>
+      <a:fillRef idx="1">
+        <a:scrgbClr r="0" g="0" b="0"/>
+      </a:fillRef>
+      <a:effectRef idx="0">
+        <a:scrgbClr r="0" g="0" b="0"/>
+      </a:effectRef>
+      <a:fontRef idx="minor"/>
+    </dgm:style>
+  </dgm:styleLbl>
+  <dgm:styleLbl name="bgShp">
+    <dgm:scene3d>
+      <a:camera prst="orthographicFront"/>
+      <a:lightRig rig="threePt" dir="t"/>
+    </dgm:scene3d>
+    <dgm:sp3d/>
+    <dgm:txPr/>
+    <dgm:style>
+      <a:lnRef idx="0">
+        <a:scrgbClr r="0" g="0" b="0"/>
+      </a:lnRef>
+      <a:fillRef idx="1">
+        <a:scrgbClr r="0" g="0" b="0"/>
+      </a:fillRef>
+      <a:effectRef idx="0">
+        <a:scrgbClr r="0" g="0" b="0"/>
+      </a:effectRef>
+      <a:fontRef idx="minor"/>
+    </dgm:style>
+  </dgm:styleLbl>
+  <dgm:styleLbl name="dkBgShp">
+    <dgm:scene3d>
+      <a:camera prst="orthographicFront"/>
+      <a:lightRig rig="threePt" dir="t"/>
+    </dgm:scene3d>
+    <dgm:sp3d/>
+    <dgm:txPr/>
+    <dgm:style>
+      <a:lnRef idx="0">
+        <a:scrgbClr r="0" g="0" b="0"/>
+      </a:lnRef>
+      <a:fillRef idx="1">
+        <a:scrgbClr r="0" g="0" b="0"/>
+      </a:fillRef>
+      <a:effectRef idx="0">
+        <a:scrgbClr r="0" g="0" b="0"/>
+      </a:effectRef>
+      <a:fontRef idx="minor"/>
+    </dgm:style>
+  </dgm:styleLbl>
+  <dgm:styleLbl name="trBgShp">
+    <dgm:scene3d>
+      <a:camera prst="orthographicFront"/>
+      <a:lightRig rig="threePt" dir="t"/>
+    </dgm:scene3d>
+    <dgm:sp3d/>
+    <dgm:txPr/>
+    <dgm:style>
+      <a:lnRef idx="0">
+        <a:scrgbClr r="0" g="0" b="0"/>
+      </a:lnRef>
+      <a:fillRef idx="1">
+        <a:scrgbClr r="0" g="0" b="0"/>
+      </a:fillRef>
+      <a:effectRef idx="0">
+        <a:scrgbClr r="0" g="0" b="0"/>
+      </a:effectRef>
+      <a:fontRef idx="minor"/>
+    </dgm:style>
+  </dgm:styleLbl>
+  <dgm:styleLbl name="fgShp">
+    <dgm:scene3d>
+      <a:camera prst="orthographicFront"/>
+      <a:lightRig rig="threePt" dir="t"/>
+    </dgm:scene3d>
+    <dgm:sp3d/>
+    <dgm:txPr/>
+    <dgm:style>
+      <a:lnRef idx="2">
+        <a:scrgbClr r="0" g="0" b="0"/>
+      </a:lnRef>
+      <a:fillRef idx="1">
+        <a:scrgbClr r="0" g="0" b="0"/>
+      </a:fillRef>
+      <a:effectRef idx="0">
+        <a:scrgbClr r="0" g="0" b="0"/>
+      </a:effectRef>
+      <a:fontRef idx="minor"/>
+    </dgm:style>
+  </dgm:styleLbl>
+  <dgm:styleLbl name="revTx">
+    <dgm:scene3d>
+      <a:camera prst="orthographicFront"/>
+      <a:lightRig rig="threePt" dir="t"/>
+    </dgm:scene3d>
+    <dgm:sp3d/>
+    <dgm:txPr/>
+    <dgm:style>
+      <a:lnRef idx="0">
+        <a:scrgbClr r="0" g="0" b="0"/>
+      </a:lnRef>
+      <a:fillRef idx="0">
+        <a:scrgbClr r="0" g="0" b="0"/>
+      </a:fillRef>
+      <a:effectRef idx="0">
+        <a:scrgbClr r="0" g="0" b="0"/>
+      </a:effectRef>
+      <a:fontRef idx="minor"/>
+    </dgm:style>
+  </dgm:styleLbl>
+</dgm:styleDef>
+</file>
+
 <file path=ppt/slideLayouts/slideLayout1.xml><?xml version="1.0" encoding="utf-8"?>
 <p:sldLayout xmlns:a="http://schemas.openxmlformats.org/drawingml/2006/main" xmlns:r="http://schemas.openxmlformats.org/officeDocument/2006/relationships" xmlns:p="http://schemas.openxmlformats.org/presentationml/2006/main" type="title" preserve="1">
   <p:cSld name="Заглавен слайд">
@@ -8517,14 +11971,14 @@
           <p:nvPr>
             <p:extLst>
               <p:ext uri="{D42A27DB-BD31-4B8C-83A1-F6EECF244321}">
-                <p14:modId xmlns:p14="http://schemas.microsoft.com/office/powerpoint/2010/main" val="2226468548"/>
+                <p14:modId xmlns:p14="http://schemas.microsoft.com/office/powerpoint/2010/main" val="2152078522"/>
               </p:ext>
             </p:extLst>
           </p:nvPr>
         </p:nvGraphicFramePr>
         <p:xfrm>
-          <a:off x="1826489" y="1885285"/>
-          <a:ext cx="4094020" cy="3803075"/>
+          <a:off x="1150805" y="1320801"/>
+          <a:ext cx="4224758" cy="3803075"/>
         </p:xfrm>
         <a:graphic>
           <a:graphicData uri="http://schemas.openxmlformats.org/drawingml/2006/diagram">
@@ -8598,8 +12052,8 @@
         </p:nvSpPr>
         <p:spPr>
           <a:xfrm>
-            <a:off x="6720291" y="5601028"/>
-            <a:ext cx="3735272" cy="923330"/>
+            <a:off x="6474692" y="5297128"/>
+            <a:ext cx="4557267" cy="1200329"/>
           </a:xfrm>
           <a:prstGeom prst="rect">
             <a:avLst/>
@@ -8612,17 +12066,19 @@
           </a:bodyPr>
           <a:lstStyle/>
           <a:p>
+            <a:pPr algn="ctr"/>
             <a:r>
-              <a:rPr lang="en-US" dirty="0"/>
+              <a:rPr lang="en-US" sz="2400" dirty="0"/>
               <a:t>Former barman.</a:t>
             </a:r>
           </a:p>
           <a:p>
+            <a:pPr algn="ctr"/>
             <a:r>
-              <a:rPr lang="en-US" dirty="0"/>
-              <a:t>Turns into a master debugger after a glass of wine.</a:t>
+              <a:rPr lang="en-US" sz="2400" dirty="0"/>
+              <a:t>Turns into a proficient debugger after a glass of wine.</a:t>
             </a:r>
-            <a:endParaRPr lang="en-GB" dirty="0"/>
+            <a:endParaRPr lang="en-GB" sz="2400" dirty="0"/>
           </a:p>
         </p:txBody>
       </p:sp>
@@ -8640,8 +12096,8 @@
         </p:nvSpPr>
         <p:spPr>
           <a:xfrm>
-            <a:off x="1926619" y="5688360"/>
-            <a:ext cx="3735272" cy="1200329"/>
+            <a:off x="984550" y="5297128"/>
+            <a:ext cx="4557267" cy="1569660"/>
           </a:xfrm>
           <a:prstGeom prst="rect">
             <a:avLst/>
@@ -8654,22 +12110,53 @@
           </a:bodyPr>
           <a:lstStyle/>
           <a:p>
+            <a:pPr algn="ctr"/>
             <a:r>
-              <a:rPr lang="en-US" dirty="0"/>
+              <a:rPr lang="en-US" sz="2400" dirty="0"/>
               <a:t>Medical student.</a:t>
             </a:r>
           </a:p>
           <a:p>
+            <a:pPr algn="ctr"/>
             <a:r>
-              <a:rPr lang="en-US" dirty="0"/>
-              <a:t>Found out he might have OCD, while working on the project.</a:t>
+              <a:rPr lang="en-US" sz="2400" dirty="0"/>
+              <a:t>Might have developed OCD over the past few weeks.</a:t>
             </a:r>
           </a:p>
           <a:p>
-            <a:endParaRPr lang="en-GB" dirty="0"/>
+            <a:pPr algn="ctr"/>
+            <a:endParaRPr lang="en-GB" sz="2400" dirty="0"/>
           </a:p>
         </p:txBody>
       </p:sp>
+      <p:graphicFrame>
+        <p:nvGraphicFramePr>
+          <p:cNvPr id="5" name="Диаграма 4">
+            <a:extLst>
+              <a:ext uri="{FF2B5EF4-FFF2-40B4-BE49-F238E27FC236}">
+                <a16:creationId xmlns:a16="http://schemas.microsoft.com/office/drawing/2014/main" id="{0C159BA2-3E3D-430E-B837-D027D94B2A25}"/>
+              </a:ext>
+            </a:extLst>
+          </p:cNvPr>
+          <p:cNvGraphicFramePr/>
+          <p:nvPr>
+            <p:extLst>
+              <p:ext uri="{D42A27DB-BD31-4B8C-83A1-F6EECF244321}">
+                <p14:modId xmlns:p14="http://schemas.microsoft.com/office/powerpoint/2010/main" val="306643946"/>
+              </p:ext>
+            </p:extLst>
+          </p:nvPr>
+        </p:nvGraphicFramePr>
+        <p:xfrm>
+          <a:off x="6650185" y="1320802"/>
+          <a:ext cx="4381774" cy="3803074"/>
+        </p:xfrm>
+        <a:graphic>
+          <a:graphicData uri="http://schemas.openxmlformats.org/drawingml/2006/diagram">
+            <dgm:relIds xmlns:dgm="http://schemas.openxmlformats.org/drawingml/2006/diagram" xmlns:r="http://schemas.openxmlformats.org/officeDocument/2006/relationships" r:dm="rId7" r:lo="rId8" r:qs="rId9" r:cs="rId10"/>
+          </a:graphicData>
+        </a:graphic>
+      </p:graphicFrame>
     </p:spTree>
     <p:extLst>
       <p:ext uri="{BB962C8B-B14F-4D97-AF65-F5344CB8AC3E}">
@@ -9047,12 +12534,12 @@
         <p:spPr>
           <a:xfrm>
             <a:off x="1071418" y="1542474"/>
-            <a:ext cx="10021455" cy="4867562"/>
+            <a:ext cx="10021455" cy="6214686"/>
           </a:xfrm>
         </p:spPr>
         <p:txBody>
           <a:bodyPr numCol="2" anchor="t">
-            <a:normAutofit lnSpcReduction="10000"/>
+            <a:normAutofit fontScale="92500" lnSpcReduction="20000"/>
           </a:bodyPr>
           <a:lstStyle/>
           <a:p>
@@ -9061,7 +12548,7 @@
               <a:buChar char="•"/>
             </a:pPr>
             <a:r>
-              <a:rPr lang="en-US" sz="2400" dirty="0"/>
+              <a:rPr lang="en-US" sz="2900" dirty="0"/>
               <a:t>Spring:</a:t>
             </a:r>
           </a:p>
@@ -9071,7 +12558,7 @@
               <a:buChar char="•"/>
             </a:pPr>
             <a:r>
-              <a:rPr lang="en-US" sz="2000" dirty="0"/>
+              <a:rPr lang="en-US" sz="2900" dirty="0"/>
               <a:t>Framework</a:t>
             </a:r>
           </a:p>
@@ -9081,7 +12568,7 @@
               <a:buChar char="•"/>
             </a:pPr>
             <a:r>
-              <a:rPr lang="en-US" sz="2000" dirty="0"/>
+              <a:rPr lang="en-US" sz="2900" dirty="0"/>
               <a:t>Boot + Tomcat</a:t>
             </a:r>
           </a:p>
@@ -9091,7 +12578,7 @@
               <a:buChar char="•"/>
             </a:pPr>
             <a:r>
-              <a:rPr lang="en-US" sz="2000" dirty="0"/>
+              <a:rPr lang="en-US" sz="2900" dirty="0"/>
               <a:t>Security</a:t>
             </a:r>
           </a:p>
@@ -9101,7 +12588,7 @@
               <a:buChar char="•"/>
             </a:pPr>
             <a:r>
-              <a:rPr lang="en-US" sz="2000" dirty="0"/>
+              <a:rPr lang="en-US" sz="2900" dirty="0"/>
               <a:t>Data: JPA + Hibernate</a:t>
             </a:r>
           </a:p>
@@ -9111,8 +12598,8 @@
               <a:buChar char="•"/>
             </a:pPr>
             <a:r>
-              <a:rPr lang="en-US" sz="2000" dirty="0"/>
-              <a:t>Data: REST</a:t>
+              <a:rPr lang="en-US" sz="2900" dirty="0"/>
+              <a:t>MVC: REST</a:t>
             </a:r>
           </a:p>
           <a:p>
@@ -9121,7 +12608,7 @@
               <a:buChar char="•"/>
             </a:pPr>
             <a:r>
-              <a:rPr lang="en-US" sz="2400" dirty="0"/>
+              <a:rPr lang="en-US" sz="2900" dirty="0"/>
               <a:t>Lombok</a:t>
             </a:r>
           </a:p>
@@ -9131,9 +12618,10 @@
               <a:buChar char="•"/>
             </a:pPr>
             <a:r>
-              <a:rPr lang="en-US" sz="2400" dirty="0"/>
-              <a:t>Java Mail Sender</a:t>
+              <a:rPr lang="en-US" sz="2900" dirty="0" err="1"/>
+              <a:t>ModelMapper</a:t>
             </a:r>
+            <a:endParaRPr lang="en-US" sz="2900" dirty="0"/>
           </a:p>
           <a:p>
             <a:pPr lvl="1">
@@ -9141,14 +12629,22 @@
               <a:buChar char="•"/>
             </a:pPr>
             <a:r>
-              <a:rPr lang="en-US" sz="2400" dirty="0"/>
-              <a:t>Apache </a:t>
+              <a:rPr lang="en-US" sz="2900" dirty="0"/>
+              <a:t>Java Mail Sender</a:t>
             </a:r>
-            <a:r>
-              <a:rPr lang="en-US" sz="2400" dirty="0" err="1"/>
-              <a:t>PDFBox</a:t>
-            </a:r>
-            <a:endParaRPr lang="en-US" sz="2400" dirty="0"/>
+          </a:p>
+          <a:p>
+            <a:pPr lvl="1">
+              <a:buFont typeface="Arial" panose="020B0604020202020204" pitchFamily="34" charset="0"/>
+              <a:buChar char="•"/>
+            </a:pPr>
+            <a:endParaRPr lang="en-US" sz="2900" dirty="0"/>
+          </a:p>
+          <a:p>
+            <a:pPr marL="457200" lvl="1" indent="0">
+              <a:buNone/>
+            </a:pPr>
+            <a:endParaRPr lang="en-US" sz="2900" dirty="0"/>
           </a:p>
           <a:p>
             <a:pPr lvl="1">
@@ -9156,10 +12652,14 @@
               <a:buChar char="•"/>
             </a:pPr>
             <a:r>
-              <a:rPr lang="en-US" sz="2400" dirty="0" err="1"/>
-              <a:t>Thymeleaf</a:t>
+              <a:rPr lang="en-US" sz="2900" dirty="0"/>
+              <a:t>Apache </a:t>
             </a:r>
-            <a:endParaRPr lang="en-US" sz="2400" dirty="0"/>
+            <a:r>
+              <a:rPr lang="en-US" sz="2900" dirty="0" err="1"/>
+              <a:t>PDFBox</a:t>
+            </a:r>
+            <a:endParaRPr lang="en-US" sz="2900" dirty="0"/>
           </a:p>
           <a:p>
             <a:pPr lvl="1">
@@ -9167,10 +12667,9 @@
               <a:buChar char="•"/>
             </a:pPr>
             <a:r>
-              <a:rPr lang="en-US" sz="2400" dirty="0" err="1"/>
-              <a:t>Passay</a:t>
+              <a:rPr lang="en-US" sz="2900" dirty="0"/>
+              <a:t>Bean Validation API</a:t>
             </a:r>
-            <a:endParaRPr lang="en-US" sz="2400" dirty="0"/>
           </a:p>
           <a:p>
             <a:pPr lvl="1">
@@ -9178,9 +12677,10 @@
               <a:buChar char="•"/>
             </a:pPr>
             <a:r>
-              <a:rPr lang="en-US" sz="2400" dirty="0"/>
-              <a:t>Maven</a:t>
+              <a:rPr lang="en-US" sz="2900" dirty="0" err="1"/>
+              <a:t>Thymeleaf</a:t>
             </a:r>
+            <a:endParaRPr lang="en-US" sz="2900" dirty="0"/>
           </a:p>
           <a:p>
             <a:pPr lvl="1">
@@ -9188,9 +12688,10 @@
               <a:buChar char="•"/>
             </a:pPr>
             <a:r>
-              <a:rPr lang="en-US" sz="2400" dirty="0"/>
-              <a:t>IntelliJ</a:t>
+              <a:rPr lang="en-US" sz="2900" dirty="0" err="1"/>
+              <a:t>Passay</a:t>
             </a:r>
+            <a:endParaRPr lang="en-US" sz="2900" dirty="0"/>
           </a:p>
           <a:p>
             <a:pPr lvl="1">
@@ -9198,8 +12699,8 @@
               <a:buChar char="•"/>
             </a:pPr>
             <a:r>
-              <a:rPr lang="en-US" sz="2400" dirty="0"/>
-              <a:t>MySQL</a:t>
+              <a:rPr lang="en-US" sz="2900" dirty="0"/>
+              <a:t>Maven</a:t>
             </a:r>
           </a:p>
           <a:p>
@@ -9208,8 +12709,8 @@
               <a:buChar char="•"/>
             </a:pPr>
             <a:r>
-              <a:rPr lang="en-US" sz="2400" dirty="0"/>
-              <a:t>Postman</a:t>
+              <a:rPr lang="en-US" sz="2900" dirty="0"/>
+              <a:t>IntelliJ</a:t>
             </a:r>
           </a:p>
           <a:p>
@@ -9218,8 +12719,8 @@
               <a:buChar char="•"/>
             </a:pPr>
             <a:r>
-              <a:rPr lang="en-US" sz="2400" dirty="0"/>
-              <a:t>Git</a:t>
+              <a:rPr lang="en-US" sz="2900" dirty="0"/>
+              <a:t>MySQL</a:t>
             </a:r>
           </a:p>
           <a:p>
@@ -9227,14 +12728,34 @@
               <a:buFont typeface="Arial" panose="020B0604020202020204" pitchFamily="34" charset="0"/>
               <a:buChar char="•"/>
             </a:pPr>
-            <a:endParaRPr lang="en-US" sz="2400" dirty="0"/>
+            <a:r>
+              <a:rPr lang="en-US" sz="2900" dirty="0"/>
+              <a:t>Postman</a:t>
+            </a:r>
           </a:p>
           <a:p>
             <a:pPr lvl="1">
               <a:buFont typeface="Arial" panose="020B0604020202020204" pitchFamily="34" charset="0"/>
               <a:buChar char="•"/>
             </a:pPr>
-            <a:endParaRPr lang="en-US" sz="2400" dirty="0"/>
+            <a:r>
+              <a:rPr lang="en-US" sz="2900" dirty="0"/>
+              <a:t>Git</a:t>
+            </a:r>
+          </a:p>
+          <a:p>
+            <a:pPr lvl="1">
+              <a:buFont typeface="Arial" panose="020B0604020202020204" pitchFamily="34" charset="0"/>
+              <a:buChar char="•"/>
+            </a:pPr>
+            <a:endParaRPr lang="en-US" sz="2900" dirty="0"/>
+          </a:p>
+          <a:p>
+            <a:pPr lvl="1">
+              <a:buFont typeface="Arial" panose="020B0604020202020204" pitchFamily="34" charset="0"/>
+              <a:buChar char="•"/>
+            </a:pPr>
+            <a:endParaRPr lang="en-US" sz="1600" dirty="0"/>
           </a:p>
         </p:txBody>
       </p:sp>

</xml_diff>

<commit_message>
prepared code for Demo; added maxSessions(2)
</commit_message>
<xml_diff>
--- a/Finance Tracker Web Application.pptx
+++ b/Finance Tracker Web Application.pptx
@@ -7259,7 +7259,7 @@
           <a:p>
             <a:fld id="{E63CA435-D8CB-43EC-841A-A276D6678949}" type="datetimeFigureOut">
               <a:rPr lang="en-GB" smtClean="0"/>
-              <a:t>24/02/2022</a:t>
+              <a:t>25/02/2022</a:t>
             </a:fld>
             <a:endParaRPr lang="en-GB"/>
           </a:p>
@@ -7594,7 +7594,7 @@
           <a:p>
             <a:fld id="{E63CA435-D8CB-43EC-841A-A276D6678949}" type="datetimeFigureOut">
               <a:rPr lang="en-GB" smtClean="0"/>
-              <a:t>24/02/2022</a:t>
+              <a:t>25/02/2022</a:t>
             </a:fld>
             <a:endParaRPr lang="en-GB"/>
           </a:p>
@@ -7897,7 +7897,7 @@
           <a:p>
             <a:fld id="{E63CA435-D8CB-43EC-841A-A276D6678949}" type="datetimeFigureOut">
               <a:rPr lang="en-GB" smtClean="0"/>
-              <a:t>24/02/2022</a:t>
+              <a:t>25/02/2022</a:t>
             </a:fld>
             <a:endParaRPr lang="en-GB"/>
           </a:p>
@@ -8145,7 +8145,7 @@
           <a:p>
             <a:fld id="{E63CA435-D8CB-43EC-841A-A276D6678949}" type="datetimeFigureOut">
               <a:rPr lang="en-GB" smtClean="0"/>
-              <a:t>24/02/2022</a:t>
+              <a:t>25/02/2022</a:t>
             </a:fld>
             <a:endParaRPr lang="en-GB"/>
           </a:p>
@@ -8553,7 +8553,7 @@
           <a:p>
             <a:fld id="{E63CA435-D8CB-43EC-841A-A276D6678949}" type="datetimeFigureOut">
               <a:rPr lang="en-GB" smtClean="0"/>
-              <a:t>24/02/2022</a:t>
+              <a:t>25/02/2022</a:t>
             </a:fld>
             <a:endParaRPr lang="en-GB"/>
           </a:p>
@@ -8868,7 +8868,7 @@
           <a:p>
             <a:fld id="{E63CA435-D8CB-43EC-841A-A276D6678949}" type="datetimeFigureOut">
               <a:rPr lang="en-GB" smtClean="0"/>
-              <a:t>24/02/2022</a:t>
+              <a:t>25/02/2022</a:t>
             </a:fld>
             <a:endParaRPr lang="en-GB"/>
           </a:p>
@@ -9413,7 +9413,7 @@
           <a:p>
             <a:fld id="{E63CA435-D8CB-43EC-841A-A276D6678949}" type="datetimeFigureOut">
               <a:rPr lang="en-GB" smtClean="0"/>
-              <a:t>24/02/2022</a:t>
+              <a:t>25/02/2022</a:t>
             </a:fld>
             <a:endParaRPr lang="en-GB"/>
           </a:p>
@@ -9609,7 +9609,7 @@
           <a:p>
             <a:fld id="{E63CA435-D8CB-43EC-841A-A276D6678949}" type="datetimeFigureOut">
               <a:rPr lang="en-GB" smtClean="0"/>
-              <a:t>24/02/2022</a:t>
+              <a:t>25/02/2022</a:t>
             </a:fld>
             <a:endParaRPr lang="en-GB"/>
           </a:p>
@@ -9823,7 +9823,7 @@
           <a:p>
             <a:fld id="{E63CA435-D8CB-43EC-841A-A276D6678949}" type="datetimeFigureOut">
               <a:rPr lang="en-GB" smtClean="0"/>
-              <a:t>24/02/2022</a:t>
+              <a:t>25/02/2022</a:t>
             </a:fld>
             <a:endParaRPr lang="en-GB"/>
           </a:p>
@@ -10193,7 +10193,7 @@
           <a:p>
             <a:fld id="{E63CA435-D8CB-43EC-841A-A276D6678949}" type="datetimeFigureOut">
               <a:rPr lang="en-GB" smtClean="0"/>
-              <a:t>24/02/2022</a:t>
+              <a:t>25/02/2022</a:t>
             </a:fld>
             <a:endParaRPr lang="en-GB"/>
           </a:p>
@@ -10597,7 +10597,7 @@
           <a:p>
             <a:fld id="{E63CA435-D8CB-43EC-841A-A276D6678949}" type="datetimeFigureOut">
               <a:rPr lang="en-GB" smtClean="0"/>
-              <a:t>24/02/2022</a:t>
+              <a:t>25/02/2022</a:t>
             </a:fld>
             <a:endParaRPr lang="en-GB"/>
           </a:p>
@@ -10909,7 +10909,7 @@
           <a:p>
             <a:fld id="{E63CA435-D8CB-43EC-841A-A276D6678949}" type="datetimeFigureOut">
               <a:rPr lang="en-GB" smtClean="0"/>
-              <a:t>24/02/2022</a:t>
+              <a:t>25/02/2022</a:t>
             </a:fld>
             <a:endParaRPr lang="en-GB"/>
           </a:p>
@@ -12069,7 +12069,7 @@
             <a:pPr algn="ctr"/>
             <a:r>
               <a:rPr lang="en-US" sz="2400" dirty="0"/>
-              <a:t>Former barman.</a:t>
+              <a:t>Former bartender.</a:t>
             </a:r>
           </a:p>
           <a:p>
@@ -14166,16 +14166,15 @@
           </p:cNvPicPr>
           <p:nvPr/>
         </p:nvPicPr>
-        <p:blipFill>
+        <p:blipFill rotWithShape="1">
           <a:blip r:embed="rId5"/>
-          <a:stretch>
-            <a:fillRect/>
-          </a:stretch>
+          <a:srcRect b="5980"/>
+          <a:stretch/>
         </p:blipFill>
         <p:spPr>
           <a:xfrm>
-            <a:off x="8394046" y="2041082"/>
-            <a:ext cx="2867765" cy="4025693"/>
+            <a:off x="8394046" y="2084628"/>
+            <a:ext cx="2867765" cy="3784952"/>
           </a:xfrm>
           <a:prstGeom prst="rect">
             <a:avLst/>
@@ -14212,7 +14211,7 @@
           <a:p>
             <a:pPr algn="ctr"/>
             <a:r>
-              <a:rPr lang="en-US" sz="2400" dirty="0">
+              <a:rPr lang="en-US" sz="2400" b="1" dirty="0">
                 <a:solidFill>
                   <a:schemeClr val="accent1">
                     <a:lumMod val="60000"/>
@@ -14222,7 +14221,7 @@
               </a:rPr>
               <a:t>HTMLs</a:t>
             </a:r>
-            <a:endParaRPr lang="en-GB" sz="2400" dirty="0">
+            <a:endParaRPr lang="en-GB" sz="2400" b="1" dirty="0">
               <a:solidFill>
                 <a:schemeClr val="accent1">
                   <a:lumMod val="60000"/>

</xml_diff>

<commit_message>
added ResponseEntity as return type in uploadProfilePjhoto method
</commit_message>
<xml_diff>
--- a/Finance Tracker Web Application.pptx
+++ b/Finance Tracker Web Application.pptx
@@ -11611,13 +11611,13 @@
         </p:nvSpPr>
         <p:spPr>
           <a:xfrm>
-            <a:off x="2116834" y="2890385"/>
-            <a:ext cx="7958331" cy="1077229"/>
+            <a:off x="2116834" y="2498138"/>
+            <a:ext cx="7958331" cy="1861723"/>
           </a:xfrm>
         </p:spPr>
         <p:txBody>
           <a:bodyPr anchor="ctr">
-            <a:normAutofit/>
+            <a:normAutofit fontScale="90000"/>
           </a:bodyPr>
           <a:lstStyle/>
           <a:p>
@@ -11632,6 +11632,37 @@
                 </a:solidFill>
               </a:rPr>
               <a:t>DEMONSTRATION</a:t>
+            </a:r>
+            <a:br>
+              <a:rPr lang="en-US" sz="4400" b="1" dirty="0">
+                <a:solidFill>
+                  <a:schemeClr val="accent1">
+                    <a:lumMod val="60000"/>
+                    <a:lumOff val="40000"/>
+                  </a:schemeClr>
+                </a:solidFill>
+              </a:rPr>
+            </a:br>
+            <a:br>
+              <a:rPr lang="en-US" sz="4400" b="1" dirty="0">
+                <a:solidFill>
+                  <a:schemeClr val="accent1">
+                    <a:lumMod val="60000"/>
+                    <a:lumOff val="40000"/>
+                  </a:schemeClr>
+                </a:solidFill>
+              </a:rPr>
+            </a:br>
+            <a:r>
+              <a:rPr lang="en-US" sz="4400" b="1" dirty="0">
+                <a:solidFill>
+                  <a:schemeClr val="accent1">
+                    <a:lumMod val="60000"/>
+                    <a:lumOff val="40000"/>
+                  </a:schemeClr>
+                </a:solidFill>
+              </a:rPr>
+              <a:t>(Disclaimer)</a:t>
             </a:r>
             <a:endParaRPr lang="en-GB" sz="4000" dirty="0"/>
           </a:p>
@@ -12375,6 +12406,16 @@
             </a:r>
           </a:p>
           <a:p>
+            <a:pPr>
+              <a:buFont typeface="Arial" panose="020B0604020202020204" pitchFamily="34" charset="0"/>
+              <a:buChar char="•"/>
+            </a:pPr>
+            <a:r>
+              <a:rPr lang="en-US" sz="2400" dirty="0"/>
+              <a:t>Roles: User, Admin</a:t>
+            </a:r>
+          </a:p>
+          <a:p>
             <a:pPr lvl="1">
               <a:buFont typeface="Arial" panose="020B0604020202020204" pitchFamily="34" charset="0"/>
               <a:buChar char="•"/>
@@ -12927,6 +12968,48 @@
           </a:prstGeom>
         </p:spPr>
       </p:pic>
+      <p:cxnSp>
+        <p:nvCxnSpPr>
+          <p:cNvPr id="3" name="Съединител &quot;права стрелка&quot; 2">
+            <a:extLst>
+              <a:ext uri="{FF2B5EF4-FFF2-40B4-BE49-F238E27FC236}">
+                <a16:creationId xmlns:a16="http://schemas.microsoft.com/office/drawing/2014/main" id="{6094566A-E387-4530-A3FE-1637C1953D56}"/>
+              </a:ext>
+            </a:extLst>
+          </p:cNvPr>
+          <p:cNvCxnSpPr/>
+          <p:nvPr/>
+        </p:nvCxnSpPr>
+        <p:spPr>
+          <a:xfrm flipH="1">
+            <a:off x="2854036" y="3870036"/>
+            <a:ext cx="748146" cy="73891"/>
+          </a:xfrm>
+          <a:prstGeom prst="straightConnector1">
+            <a:avLst/>
+          </a:prstGeom>
+          <a:ln w="76200">
+            <a:solidFill>
+              <a:srgbClr val="FF0000"/>
+            </a:solidFill>
+            <a:tailEnd type="triangle"/>
+          </a:ln>
+        </p:spPr>
+        <p:style>
+          <a:lnRef idx="1">
+            <a:schemeClr val="accent1"/>
+          </a:lnRef>
+          <a:fillRef idx="0">
+            <a:schemeClr val="accent1"/>
+          </a:fillRef>
+          <a:effectRef idx="0">
+            <a:schemeClr val="accent1"/>
+          </a:effectRef>
+          <a:fontRef idx="minor">
+            <a:schemeClr val="tx1"/>
+          </a:fontRef>
+        </p:style>
+      </p:cxnSp>
     </p:spTree>
     <p:extLst>
       <p:ext uri="{BB962C8B-B14F-4D97-AF65-F5344CB8AC3E}">

</xml_diff>

<commit_message>
added logout functionality to deleteUser()
</commit_message>
<xml_diff>
--- a/Finance Tracker Web Application.pptx
+++ b/Finance Tracker Web Application.pptx
@@ -12099,17 +12099,17 @@
           <a:p>
             <a:pPr algn="ctr"/>
             <a:r>
-              <a:rPr lang="en-US" sz="2400" dirty="0"/>
+              <a:rPr lang="en-US" sz="2400" i="1" dirty="0"/>
               <a:t>Former bartender.</a:t>
             </a:r>
           </a:p>
           <a:p>
             <a:pPr algn="ctr"/>
             <a:r>
-              <a:rPr lang="en-US" sz="2400" dirty="0"/>
+              <a:rPr lang="en-US" sz="2400" i="1" dirty="0"/>
               <a:t>Turns into a proficient debugger after a glass of wine.</a:t>
             </a:r>
-            <a:endParaRPr lang="en-GB" sz="2400" dirty="0"/>
+            <a:endParaRPr lang="en-GB" sz="2400" i="1" dirty="0"/>
           </a:p>
         </p:txBody>
       </p:sp>
@@ -12143,20 +12143,20 @@
           <a:p>
             <a:pPr algn="ctr"/>
             <a:r>
-              <a:rPr lang="en-US" sz="2400" dirty="0"/>
+              <a:rPr lang="en-US" sz="2400" i="1" dirty="0"/>
               <a:t>Medical student.</a:t>
             </a:r>
           </a:p>
           <a:p>
             <a:pPr algn="ctr"/>
             <a:r>
-              <a:rPr lang="en-US" sz="2400" dirty="0"/>
+              <a:rPr lang="en-US" sz="2400" i="1" dirty="0"/>
               <a:t>Might have developed OCD over the past few weeks.</a:t>
             </a:r>
           </a:p>
           <a:p>
             <a:pPr algn="ctr"/>
-            <a:endParaRPr lang="en-GB" sz="2400" dirty="0"/>
+            <a:endParaRPr lang="en-GB" sz="2400" i="1" dirty="0"/>
           </a:p>
         </p:txBody>
       </p:sp>

</xml_diff>

<commit_message>
Panayot finally sent me a photo of his
</commit_message>
<xml_diff>
--- a/Finance Tracker Web Application.pptx
+++ b/Finance Tracker Web Application.pptx
@@ -1759,11 +1759,11 @@
 <file path=ppt/diagrams/data2.xml><?xml version="1.0" encoding="utf-8"?>
 <dgm:dataModel xmlns:dgm="http://schemas.openxmlformats.org/drawingml/2006/diagram" xmlns:a="http://schemas.openxmlformats.org/drawingml/2006/main">
   <dgm:ptLst>
-    <dgm:pt modelId="{8C8570ED-5A10-4DFA-B0E3-C416060C1E39}" type="doc">
+    <dgm:pt modelId="{AACC6559-4069-4699-934C-94A58A1D87D9}" type="doc">
       <dgm:prSet loTypeId="urn:microsoft.com/office/officeart/2008/layout/CircularPictureCallout" loCatId="picture" qsTypeId="urn:microsoft.com/office/officeart/2005/8/quickstyle/simple1" qsCatId="simple" csTypeId="urn:microsoft.com/office/officeart/2005/8/colors/accent1_2" csCatId="accent1" phldr="1"/>
       <dgm:spPr/>
     </dgm:pt>
-    <dgm:pt modelId="{F489FB91-293E-41FF-A017-DE0F026E5089}">
+    <dgm:pt modelId="{FD936A68-4F49-4EDB-BBBD-B98B7EA11235}">
       <dgm:prSet phldrT="[Текст]" custT="1"/>
       <dgm:spPr/>
       <dgm:t>
@@ -1786,7 +1786,7 @@
         </a:p>
       </dgm:t>
     </dgm:pt>
-    <dgm:pt modelId="{09AAD854-45F4-4901-A005-259D153A6887}" type="parTrans" cxnId="{83489F75-B6C2-4263-9A88-0C24C109A3E3}">
+    <dgm:pt modelId="{611B1A90-735D-4CA7-96F3-BB87EB7E2F50}" type="parTrans" cxnId="{9EA10038-DB7A-46A7-B8FC-4DA743D1553B}">
       <dgm:prSet/>
       <dgm:spPr/>
       <dgm:t>
@@ -1797,20 +1797,14 @@
         </a:p>
       </dgm:t>
     </dgm:pt>
-    <dgm:pt modelId="{18FCC3CF-10FD-4856-B5D1-BB542384E666}" type="sibTrans" cxnId="{83489F75-B6C2-4263-9A88-0C24C109A3E3}">
+    <dgm:pt modelId="{6E422F5D-08C0-418F-97AD-E80B69E6CA43}" type="sibTrans" cxnId="{9EA10038-DB7A-46A7-B8FC-4DA743D1553B}">
       <dgm:prSet/>
       <dgm:spPr>
-        <a:blipFill>
-          <a:blip xmlns:r="http://schemas.openxmlformats.org/officeDocument/2006/relationships" r:embed="rId1">
-            <a:extLst>
-              <a:ext uri="{28A0092B-C50C-407E-A947-70E740481C1C}">
-                <a14:useLocalDpi xmlns:a14="http://schemas.microsoft.com/office/drawing/2010/main" val="0"/>
-              </a:ext>
-            </a:extLst>
-          </a:blip>
+        <a:blipFill rotWithShape="1">
+          <a:blip xmlns:r="http://schemas.openxmlformats.org/officeDocument/2006/relationships" r:embed="rId1"/>
           <a:srcRect/>
           <a:stretch>
-            <a:fillRect l="-11000" r="-11000"/>
+            <a:fillRect t="-17000" b="-17000"/>
           </a:stretch>
         </a:blipFill>
       </dgm:spPr>
@@ -1821,20 +1815,9 @@
           <a:endParaRPr lang="en-GB"/>
         </a:p>
       </dgm:t>
-      <dgm:extLst>
-        <a:ext uri="{E40237B7-FDA0-4F09-8148-C483321AD2D9}">
-          <dgm14:cNvPr xmlns:dgm14="http://schemas.microsoft.com/office/drawing/2010/diagram" id="0" name="" descr="Goat Manure Fertilizer: Goat Manure In The Garden">
-            <a:extLst>
-              <a:ext uri="{FF2B5EF4-FFF2-40B4-BE49-F238E27FC236}">
-                <a16:creationId xmlns:a16="http://schemas.microsoft.com/office/drawing/2014/main" id="{E804613B-3E0B-4ADF-8E35-F816C97C90E8}"/>
-              </a:ext>
-            </a:extLst>
-          </dgm14:cNvPr>
-        </a:ext>
-      </dgm:extLst>
     </dgm:pt>
-    <dgm:pt modelId="{B182DB9E-35BB-4BA0-880E-1B3FDF4688BA}" type="pres">
-      <dgm:prSet presAssocID="{8C8570ED-5A10-4DFA-B0E3-C416060C1E39}" presName="Name0" presStyleCnt="0">
+    <dgm:pt modelId="{9FB968B9-19B3-4FF2-9445-783D550D91B0}" type="pres">
+      <dgm:prSet presAssocID="{AACC6559-4069-4699-934C-94A58A1D87D9}" presName="Name0" presStyleCnt="0">
         <dgm:presLayoutVars>
           <dgm:chMax val="7"/>
           <dgm:chPref val="7"/>
@@ -1843,20 +1826,20 @@
       </dgm:prSet>
       <dgm:spPr/>
     </dgm:pt>
-    <dgm:pt modelId="{6EB75FB9-0F66-43F4-970E-C7DAF289B143}" type="pres">
-      <dgm:prSet presAssocID="{8C8570ED-5A10-4DFA-B0E3-C416060C1E39}" presName="Name1" presStyleCnt="0"/>
+    <dgm:pt modelId="{7C10EA1E-2FAB-4CEE-A5BE-CE7DE0443057}" type="pres">
+      <dgm:prSet presAssocID="{AACC6559-4069-4699-934C-94A58A1D87D9}" presName="Name1" presStyleCnt="0"/>
       <dgm:spPr/>
     </dgm:pt>
-    <dgm:pt modelId="{72F3CBB1-EA9D-4C0D-B757-25C43A5C8470}" type="pres">
-      <dgm:prSet presAssocID="{18FCC3CF-10FD-4856-B5D1-BB542384E666}" presName="picture_1" presStyleCnt="0"/>
+    <dgm:pt modelId="{4E0DF41B-5C2D-4EA0-8C26-D206E97663FE}" type="pres">
+      <dgm:prSet presAssocID="{6E422F5D-08C0-418F-97AD-E80B69E6CA43}" presName="picture_1" presStyleCnt="0"/>
       <dgm:spPr/>
     </dgm:pt>
-    <dgm:pt modelId="{796D380E-3B3D-4D34-90B6-05C5AB193999}" type="pres">
-      <dgm:prSet presAssocID="{18FCC3CF-10FD-4856-B5D1-BB542384E666}" presName="pictureRepeatNode" presStyleLbl="alignImgPlace1" presStyleIdx="0" presStyleCnt="1" custScaleX="153859" custScaleY="147322" custLinFactNeighborX="-56" custLinFactNeighborY="-15405"/>
+    <dgm:pt modelId="{BA975004-3941-470C-820C-BF9D5F2A1CDD}" type="pres">
+      <dgm:prSet presAssocID="{6E422F5D-08C0-418F-97AD-E80B69E6CA43}" presName="pictureRepeatNode" presStyleLbl="alignImgPlace1" presStyleIdx="0" presStyleCnt="1" custScaleX="153143" custScaleY="153144" custLinFactNeighborX="878" custLinFactNeighborY="-13447"/>
       <dgm:spPr/>
     </dgm:pt>
-    <dgm:pt modelId="{C0ACFB64-268E-4BF0-904F-A08643FC82C4}" type="pres">
-      <dgm:prSet presAssocID="{F489FB91-293E-41FF-A017-DE0F026E5089}" presName="text_1" presStyleLbl="node1" presStyleIdx="0" presStyleCnt="0" custScaleX="312500" custLinFactY="100000" custLinFactNeighborX="5896" custLinFactNeighborY="137968">
+    <dgm:pt modelId="{73973F8B-29CE-4FE5-95E7-9310AC2195CD}" type="pres">
+      <dgm:prSet presAssocID="{FD936A68-4F49-4EDB-BBBD-B98B7EA11235}" presName="text_1" presStyleLbl="node1" presStyleIdx="0" presStyleCnt="0" custScaleX="312500" custLinFactY="85983" custLinFactNeighborX="-10248" custLinFactNeighborY="100000">
         <dgm:presLayoutVars>
           <dgm:bulletEnabled val="1"/>
         </dgm:presLayoutVars>
@@ -1865,14 +1848,14 @@
     </dgm:pt>
   </dgm:ptLst>
   <dgm:cxnLst>
-    <dgm:cxn modelId="{6B38F411-AF4F-45AC-B100-575F5E9C4403}" type="presOf" srcId="{8C8570ED-5A10-4DFA-B0E3-C416060C1E39}" destId="{B182DB9E-35BB-4BA0-880E-1B3FDF4688BA}" srcOrd="0" destOrd="0" presId="urn:microsoft.com/office/officeart/2008/layout/CircularPictureCallout"/>
-    <dgm:cxn modelId="{83489F75-B6C2-4263-9A88-0C24C109A3E3}" srcId="{8C8570ED-5A10-4DFA-B0E3-C416060C1E39}" destId="{F489FB91-293E-41FF-A017-DE0F026E5089}" srcOrd="0" destOrd="0" parTransId="{09AAD854-45F4-4901-A005-259D153A6887}" sibTransId="{18FCC3CF-10FD-4856-B5D1-BB542384E666}"/>
-    <dgm:cxn modelId="{116AB494-482B-46DB-9F28-B3ABC9240664}" type="presOf" srcId="{F489FB91-293E-41FF-A017-DE0F026E5089}" destId="{C0ACFB64-268E-4BF0-904F-A08643FC82C4}" srcOrd="0" destOrd="0" presId="urn:microsoft.com/office/officeart/2008/layout/CircularPictureCallout"/>
-    <dgm:cxn modelId="{83C69FDF-185C-427B-AC96-F24F9AA0DDAF}" type="presOf" srcId="{18FCC3CF-10FD-4856-B5D1-BB542384E666}" destId="{796D380E-3B3D-4D34-90B6-05C5AB193999}" srcOrd="0" destOrd="0" presId="urn:microsoft.com/office/officeart/2008/layout/CircularPictureCallout"/>
-    <dgm:cxn modelId="{828D9AD6-F262-49FD-A67C-D2BF455D7A7C}" type="presParOf" srcId="{B182DB9E-35BB-4BA0-880E-1B3FDF4688BA}" destId="{6EB75FB9-0F66-43F4-970E-C7DAF289B143}" srcOrd="0" destOrd="0" presId="urn:microsoft.com/office/officeart/2008/layout/CircularPictureCallout"/>
-    <dgm:cxn modelId="{EB1531FC-064D-4A79-8EB4-A50A1D17972F}" type="presParOf" srcId="{6EB75FB9-0F66-43F4-970E-C7DAF289B143}" destId="{72F3CBB1-EA9D-4C0D-B757-25C43A5C8470}" srcOrd="0" destOrd="0" presId="urn:microsoft.com/office/officeart/2008/layout/CircularPictureCallout"/>
-    <dgm:cxn modelId="{39BD4893-21FC-49A3-9E49-EB947EB6E4C8}" type="presParOf" srcId="{72F3CBB1-EA9D-4C0D-B757-25C43A5C8470}" destId="{796D380E-3B3D-4D34-90B6-05C5AB193999}" srcOrd="0" destOrd="0" presId="urn:microsoft.com/office/officeart/2008/layout/CircularPictureCallout"/>
-    <dgm:cxn modelId="{48F4A97C-10BF-44A6-8A5E-D27548BB7F5A}" type="presParOf" srcId="{6EB75FB9-0F66-43F4-970E-C7DAF289B143}" destId="{C0ACFB64-268E-4BF0-904F-A08643FC82C4}" srcOrd="1" destOrd="0" presId="urn:microsoft.com/office/officeart/2008/layout/CircularPictureCallout"/>
+    <dgm:cxn modelId="{9EA10038-DB7A-46A7-B8FC-4DA743D1553B}" srcId="{AACC6559-4069-4699-934C-94A58A1D87D9}" destId="{FD936A68-4F49-4EDB-BBBD-B98B7EA11235}" srcOrd="0" destOrd="0" parTransId="{611B1A90-735D-4CA7-96F3-BB87EB7E2F50}" sibTransId="{6E422F5D-08C0-418F-97AD-E80B69E6CA43}"/>
+    <dgm:cxn modelId="{645A858A-3208-48BF-9161-A75F7B721E60}" type="presOf" srcId="{AACC6559-4069-4699-934C-94A58A1D87D9}" destId="{9FB968B9-19B3-4FF2-9445-783D550D91B0}" srcOrd="0" destOrd="0" presId="urn:microsoft.com/office/officeart/2008/layout/CircularPictureCallout"/>
+    <dgm:cxn modelId="{710E5B94-7DE5-4784-A87F-914F676DEA9F}" type="presOf" srcId="{6E422F5D-08C0-418F-97AD-E80B69E6CA43}" destId="{BA975004-3941-470C-820C-BF9D5F2A1CDD}" srcOrd="0" destOrd="0" presId="urn:microsoft.com/office/officeart/2008/layout/CircularPictureCallout"/>
+    <dgm:cxn modelId="{BB2CDBE7-06B1-4389-8A80-ABEC9DA66489}" type="presOf" srcId="{FD936A68-4F49-4EDB-BBBD-B98B7EA11235}" destId="{73973F8B-29CE-4FE5-95E7-9310AC2195CD}" srcOrd="0" destOrd="0" presId="urn:microsoft.com/office/officeart/2008/layout/CircularPictureCallout"/>
+    <dgm:cxn modelId="{E047E52B-2CFC-45A1-8EED-71E8C98CA7F0}" type="presParOf" srcId="{9FB968B9-19B3-4FF2-9445-783D550D91B0}" destId="{7C10EA1E-2FAB-4CEE-A5BE-CE7DE0443057}" srcOrd="0" destOrd="0" presId="urn:microsoft.com/office/officeart/2008/layout/CircularPictureCallout"/>
+    <dgm:cxn modelId="{212D20D9-5A79-4ACA-B5D0-DDF1028A7CC5}" type="presParOf" srcId="{7C10EA1E-2FAB-4CEE-A5BE-CE7DE0443057}" destId="{4E0DF41B-5C2D-4EA0-8C26-D206E97663FE}" srcOrd="0" destOrd="0" presId="urn:microsoft.com/office/officeart/2008/layout/CircularPictureCallout"/>
+    <dgm:cxn modelId="{F6C5DDCE-19B4-4E81-AE7D-ABFBCAEF95B2}" type="presParOf" srcId="{4E0DF41B-5C2D-4EA0-8C26-D206E97663FE}" destId="{BA975004-3941-470C-820C-BF9D5F2A1CDD}" srcOrd="0" destOrd="0" presId="urn:microsoft.com/office/officeart/2008/layout/CircularPictureCallout"/>
+    <dgm:cxn modelId="{A7B9EA9B-6309-4FD4-858A-0309D3D12174}" type="presParOf" srcId="{7C10EA1E-2FAB-4CEE-A5BE-CE7DE0443057}" destId="{73973F8B-29CE-4FE5-95E7-9310AC2195CD}" srcOrd="1" destOrd="0" presId="urn:microsoft.com/office/officeart/2008/layout/CircularPictureCallout"/>
   </dgm:cxnLst>
   <dgm:bg/>
   <dgm:whole/>
@@ -2029,30 +2012,24 @@
       <dsp:cNvGrpSpPr/>
     </dsp:nvGrpSpPr>
     <dsp:grpSpPr/>
-    <dsp:sp modelId="{796D380E-3B3D-4D34-90B6-05C5AB193999}">
+    <dsp:sp modelId="{BA975004-3941-470C-820C-BF9D5F2A1CDD}">
       <dsp:nvSpPr>
         <dsp:cNvPr id="0" name=""/>
         <dsp:cNvSpPr/>
       </dsp:nvSpPr>
       <dsp:spPr>
         <a:xfrm>
-          <a:off x="504221" y="0"/>
-          <a:ext cx="3370876" cy="3227658"/>
+          <a:off x="513445" y="0"/>
+          <a:ext cx="3234960" cy="3234981"/>
         </a:xfrm>
         <a:prstGeom prst="ellipse">
           <a:avLst/>
         </a:prstGeom>
-        <a:blipFill>
-          <a:blip xmlns:r="http://schemas.openxmlformats.org/officeDocument/2006/relationships" r:embed="rId1">
-            <a:extLst>
-              <a:ext uri="{28A0092B-C50C-407E-A947-70E740481C1C}">
-                <a14:useLocalDpi xmlns:a14="http://schemas.microsoft.com/office/drawing/2010/main" val="0"/>
-              </a:ext>
-            </a:extLst>
-          </a:blip>
+        <a:blipFill rotWithShape="1">
+          <a:blip xmlns:r="http://schemas.openxmlformats.org/officeDocument/2006/relationships" r:embed="rId1"/>
           <a:srcRect/>
           <a:stretch>
-            <a:fillRect l="-11000" r="-11000"/>
+            <a:fillRect t="-17000" b="-17000"/>
           </a:stretch>
         </a:blipFill>
         <a:ln w="15875" cap="flat" cmpd="sng" algn="ctr">
@@ -2081,15 +2058,15 @@
         <a:fontRef idx="minor"/>
       </dsp:style>
     </dsp:sp>
-    <dsp:sp modelId="{C0ACFB64-268E-4BF0-904F-A08643FC82C4}">
+    <dsp:sp modelId="{73973F8B-29CE-4FE5-95E7-9310AC2195CD}">
       <dsp:nvSpPr>
         <dsp:cNvPr id="0" name=""/>
         <dsp:cNvSpPr/>
       </dsp:nvSpPr>
       <dsp:spPr>
         <a:xfrm>
-          <a:off x="0" y="3080081"/>
-          <a:ext cx="4381774" cy="722992"/>
+          <a:off x="0" y="3105989"/>
+          <a:ext cx="4224758" cy="697085"/>
         </a:xfrm>
         <a:prstGeom prst="rect">
           <a:avLst/>
@@ -2150,8 +2127,8 @@
         </a:p>
       </dsp:txBody>
       <dsp:txXfrm>
-        <a:off x="0" y="3080081"/>
-        <a:ext cx="4381774" cy="722992"/>
+        <a:off x="0" y="3105989"/>
+        <a:ext cx="4224758" cy="697085"/>
       </dsp:txXfrm>
     </dsp:sp>
   </dsp:spTree>
@@ -11957,7 +11934,7 @@
         </p:nvSpPr>
         <p:spPr>
           <a:xfrm>
-            <a:off x="2639517" y="447838"/>
+            <a:off x="2639517" y="318534"/>
             <a:ext cx="7958331" cy="1077229"/>
           </a:xfrm>
         </p:spPr>
@@ -12083,7 +12060,7 @@
         </p:nvSpPr>
         <p:spPr>
           <a:xfrm>
-            <a:off x="6474692" y="5297128"/>
+            <a:off x="6308437" y="5275037"/>
             <a:ext cx="4557267" cy="1200329"/>
           </a:xfrm>
           <a:prstGeom prst="rect">
@@ -12127,7 +12104,7 @@
         </p:nvSpPr>
         <p:spPr>
           <a:xfrm>
-            <a:off x="984550" y="5297128"/>
+            <a:off x="984550" y="5275037"/>
             <a:ext cx="4557267" cy="1569660"/>
           </a:xfrm>
           <a:prstGeom prst="rect">
@@ -12162,10 +12139,10 @@
       </p:sp>
       <p:graphicFrame>
         <p:nvGraphicFramePr>
-          <p:cNvPr id="5" name="Диаграма 4">
+          <p:cNvPr id="10" name="Диаграма 9">
             <a:extLst>
               <a:ext uri="{FF2B5EF4-FFF2-40B4-BE49-F238E27FC236}">
-                <a16:creationId xmlns:a16="http://schemas.microsoft.com/office/drawing/2014/main" id="{0C159BA2-3E3D-430E-B837-D027D94B2A25}"/>
+                <a16:creationId xmlns:a16="http://schemas.microsoft.com/office/drawing/2014/main" id="{08397958-B223-428B-B38C-341609B24733}"/>
               </a:ext>
             </a:extLst>
           </p:cNvPr>
@@ -12173,14 +12150,14 @@
           <p:nvPr>
             <p:extLst>
               <p:ext uri="{D42A27DB-BD31-4B8C-83A1-F6EECF244321}">
-                <p14:modId xmlns:p14="http://schemas.microsoft.com/office/powerpoint/2010/main" val="306643946"/>
+                <p14:modId xmlns:p14="http://schemas.microsoft.com/office/powerpoint/2010/main" val="758949733"/>
               </p:ext>
             </p:extLst>
           </p:nvPr>
         </p:nvGraphicFramePr>
         <p:xfrm>
-          <a:off x="6650185" y="1320802"/>
-          <a:ext cx="4381774" cy="3803074"/>
+          <a:off x="6474692" y="1320800"/>
+          <a:ext cx="4224758" cy="3803075"/>
         </p:xfrm>
         <a:graphic>
           <a:graphicData uri="http://schemas.openxmlformats.org/drawingml/2006/diagram">

</xml_diff>

<commit_message>
added cross-parameter functionality on the PasswordConstraintValidator
</commit_message>
<xml_diff>
--- a/Finance Tracker Web Application.pptx
+++ b/Finance Tracker Web Application.pptx
@@ -12263,13 +12263,13 @@
         </p:nvSpPr>
         <p:spPr>
           <a:xfrm>
-            <a:off x="1431636" y="1334656"/>
+            <a:off x="1422399" y="1242292"/>
             <a:ext cx="9642764" cy="5523344"/>
           </a:xfrm>
         </p:spPr>
         <p:txBody>
           <a:bodyPr numCol="2" anchor="t">
-            <a:normAutofit lnSpcReduction="10000"/>
+            <a:normAutofit fontScale="92500"/>
           </a:bodyPr>
           <a:lstStyle/>
           <a:p>
@@ -12379,7 +12379,7 @@
             </a:pPr>
             <a:r>
               <a:rPr lang="en-US" sz="2400" dirty="0"/>
-              <a:t>View statistics filtered by various criteria </a:t>
+              <a:t>Accurately convert account balance to a different currency</a:t>
             </a:r>
           </a:p>
           <a:p>
@@ -12389,7 +12389,33 @@
             </a:pPr>
             <a:r>
               <a:rPr lang="en-US" sz="2400" dirty="0"/>
-              <a:t>Roles: User, Admin</a:t>
+              <a:t>View </a:t>
+            </a:r>
+            <a:r>
+              <a:rPr lang="en-GB" sz="2400" dirty="0"/>
+              <a:t>entities </a:t>
+            </a:r>
+            <a:r>
+              <a:rPr lang="en-US" sz="2400" dirty="0"/>
+              <a:t>filtered by various criteria </a:t>
+            </a:r>
+            <a:r>
+              <a:rPr lang="en-GB" sz="2400" dirty="0"/>
+              <a:t>and </a:t>
+            </a:r>
+            <a:r>
+              <a:rPr lang="en-US" sz="2400" dirty="0"/>
+              <a:t>statistics  </a:t>
+            </a:r>
+          </a:p>
+          <a:p>
+            <a:pPr>
+              <a:buFont typeface="Arial" panose="020B0604020202020204" pitchFamily="34" charset="0"/>
+              <a:buChar char="•"/>
+            </a:pPr>
+            <a:r>
+              <a:rPr lang="en-US" sz="2400" dirty="0"/>
+              <a:t>*Roles: User, Admin</a:t>
             </a:r>
           </a:p>
           <a:p>
@@ -12567,7 +12593,7 @@
             </a:pPr>
             <a:r>
               <a:rPr lang="en-US" sz="2400" dirty="0"/>
-              <a:t>Java 11, Html5</a:t>
+              <a:t>Java 15, Html5</a:t>
             </a:r>
           </a:p>
           <a:p>

</xml_diff>